<commit_message>
Draft 1 of poster
</commit_message>
<xml_diff>
--- a/Poster_Dances.pptx
+++ b/Poster_Dances.pptx
@@ -128,9 +128,9 @@
           <c:layoutTarget val="inner"/>
           <c:xMode val="edge"/>
           <c:yMode val="edge"/>
-          <c:x val="0.102654932839277"/>
+          <c:x val="0.14742052490162622"/>
           <c:y val="5.1595043815087602E-2"/>
-          <c:w val="0.83292033348772598"/>
+          <c:w val="0.78815464720234873"/>
           <c:h val="0.76368780748010767"/>
         </c:manualLayout>
       </c:layout>
@@ -4171,8 +4171,8 @@
         </p:nvSpPr>
         <p:spPr>
           <a:xfrm>
-            <a:off x="15087600" y="30861000"/>
-            <a:ext cx="13868400" cy="1231106"/>
+            <a:off x="14767560" y="27768947"/>
+            <a:ext cx="14170022" cy="1231106"/>
           </a:xfrm>
           <a:prstGeom prst="rect">
             <a:avLst/>
@@ -4322,8 +4322,8 @@
           </a:p>
         </p:txBody>
       </p:sp>
-      <mc:AlternateContent xmlns:mc="http://schemas.openxmlformats.org/markup-compatibility/2006" xmlns:a14="http://schemas.microsoft.com/office/drawing/2010/main">
-        <mc:Choice Requires="a14">
+      <mc:AlternateContent xmlns:mc="http://schemas.openxmlformats.org/markup-compatibility/2006">
+        <mc:Choice xmlns:a14="http://schemas.microsoft.com/office/drawing/2010/main" Requires="a14">
           <p:graphicFrame>
             <p:nvGraphicFramePr>
               <p:cNvPr id="32" name="Table 31"/>
@@ -4333,14 +4333,14 @@
               <p:nvPr>
                 <p:extLst>
                   <p:ext uri="{D42A27DB-BD31-4B8C-83A1-F6EECF244321}">
-                    <p14:modId xmlns:p14="http://schemas.microsoft.com/office/powerpoint/2010/main" val="1409676382"/>
+                    <p14:modId xmlns:p14="http://schemas.microsoft.com/office/powerpoint/2010/main" val="307490919"/>
                   </p:ext>
                 </p:extLst>
               </p:nvPr>
             </p:nvGraphicFramePr>
             <p:xfrm>
-              <a:off x="21640800" y="7848600"/>
-              <a:ext cx="7123933" cy="9509758"/>
+              <a:off x="23012399" y="7848600"/>
+              <a:ext cx="5752333" cy="10868296"/>
             </p:xfrm>
             <a:graphic>
               <a:graphicData uri="http://schemas.openxmlformats.org/drawingml/2006/table">
@@ -4349,10 +4349,10 @@
                     <a:tableStyleId>{B301B821-A1FF-4177-AEE7-76D212191A09}</a:tableStyleId>
                   </a:tblPr>
                   <a:tblGrid>
-                    <a:gridCol w="2583404"/>
-                    <a:gridCol w="1643984"/>
-                    <a:gridCol w="1643984"/>
-                    <a:gridCol w="1252561"/>
+                    <a:gridCol w="2086011"/>
+                    <a:gridCol w="1327461"/>
+                    <a:gridCol w="1327461"/>
+                    <a:gridCol w="1011400"/>
                   </a:tblGrid>
                   <a:tr h="522514">
                     <a:tc>
@@ -6529,7 +6529,7 @@
             </a:graphic>
           </p:graphicFrame>
         </mc:Choice>
-        <mc:Fallback xmlns="">
+        <mc:Fallback>
           <p:graphicFrame>
             <p:nvGraphicFramePr>
               <p:cNvPr id="32" name="Table 31"/>
@@ -6539,14 +6539,14 @@
               <p:nvPr>
                 <p:extLst>
                   <p:ext uri="{D42A27DB-BD31-4B8C-83A1-F6EECF244321}">
-                    <p14:modId xmlns:p14="http://schemas.microsoft.com/office/powerpoint/2010/main" val="1409676382"/>
+                    <p14:modId xmlns:p14="http://schemas.microsoft.com/office/powerpoint/2010/main" val="307490919"/>
                   </p:ext>
                 </p:extLst>
               </p:nvPr>
             </p:nvGraphicFramePr>
             <p:xfrm>
-              <a:off x="21640800" y="7848600"/>
-              <a:ext cx="7123933" cy="9509758"/>
+              <a:off x="23012399" y="7848600"/>
+              <a:ext cx="5752333" cy="10868296"/>
             </p:xfrm>
             <a:graphic>
               <a:graphicData uri="http://schemas.openxmlformats.org/drawingml/2006/table">
@@ -6555,10 +6555,10 @@
                     <a:tableStyleId>{B301B821-A1FF-4177-AEE7-76D212191A09}</a:tableStyleId>
                   </a:tblPr>
                   <a:tblGrid>
-                    <a:gridCol w="2583404"/>
-                    <a:gridCol w="1643984"/>
-                    <a:gridCol w="1643984"/>
-                    <a:gridCol w="1252561"/>
+                    <a:gridCol w="2086011"/>
+                    <a:gridCol w="1327461"/>
+                    <a:gridCol w="1327461"/>
+                    <a:gridCol w="1011400"/>
                   </a:tblGrid>
                   <a:tr h="522514">
                     <a:tc>
@@ -6678,7 +6678,7 @@
                         <a:blipFill rotWithShape="1">
                           <a:blip r:embed="rId3"/>
                           <a:stretch>
-                            <a:fillRect l="-157037" t="-104706" r="-175926" b="-1669412"/>
+                            <a:fillRect l="-156881" t="-104706" r="-176147" b="-1931765"/>
                           </a:stretch>
                         </a:blipFill>
                       </a:tcPr>
@@ -6742,7 +6742,7 @@
                       <a:tcPr marL="68580" marR="68580" marT="0" marB="0" anchor="ctr"/>
                     </a:tc>
                   </a:tr>
-                  <a:tr h="522514">
+                  <a:tr h="731520">
                     <a:tc>
                       <a:txBody>
                         <a:bodyPr/>
@@ -6783,7 +6783,7 @@
                         <a:blipFill rotWithShape="1">
                           <a:blip r:embed="rId3"/>
                           <a:stretch>
-                            <a:fillRect l="-157037" t="-202326" r="-175926" b="-1550000"/>
+                            <a:fillRect l="-156881" t="-145000" r="-176147" b="-1268333"/>
                           </a:stretch>
                         </a:blipFill>
                       </a:tcPr>
@@ -6888,7 +6888,7 @@
                         <a:blipFill rotWithShape="1">
                           <a:blip r:embed="rId3"/>
                           <a:stretch>
-                            <a:fillRect l="-157037" t="-216667" r="-175926" b="-1010833"/>
+                            <a:fillRect l="-156881" t="-245000" r="-176147" b="-1168333"/>
                           </a:stretch>
                         </a:blipFill>
                       </a:tcPr>
@@ -6934,13 +6934,13 @@
                         <a:blipFill rotWithShape="1">
                           <a:blip r:embed="rId3"/>
                           <a:stretch>
-                            <a:fillRect l="-467476" t="-216667" b="-1010833"/>
+                            <a:fillRect l="-468675" t="-245000" b="-1168333"/>
                           </a:stretch>
                         </a:blipFill>
                       </a:tcPr>
                     </a:tc>
                   </a:tr>
-                  <a:tr h="731520">
+                  <a:tr h="1097280">
                     <a:tc>
                       <a:txBody>
                         <a:bodyPr/>
@@ -6981,7 +6981,7 @@
                         <a:blipFill rotWithShape="1">
                           <a:blip r:embed="rId3"/>
                           <a:stretch>
-                            <a:fillRect l="-157037" t="-316667" r="-175926" b="-910833"/>
+                            <a:fillRect l="-156881" t="-230000" r="-176147" b="-678889"/>
                           </a:stretch>
                         </a:blipFill>
                       </a:tcPr>
@@ -7045,7 +7045,7 @@
                       <a:tcPr marL="68580" marR="68580" marT="0" marB="0" anchor="ctr"/>
                     </a:tc>
                   </a:tr>
-                  <a:tr h="522514">
+                  <a:tr h="731520">
                     <a:tc>
                       <a:txBody>
                         <a:bodyPr/>
@@ -7086,7 +7086,7 @@
                         <a:blipFill rotWithShape="1">
                           <a:blip r:embed="rId3"/>
                           <a:stretch>
-                            <a:fillRect l="-157037" t="-588235" r="-175926" b="-1185882"/>
+                            <a:fillRect l="-156881" t="-495000" r="-176147" b="-918333"/>
                           </a:stretch>
                         </a:blipFill>
                       </a:tcPr>
@@ -7191,7 +7191,7 @@
                         <a:blipFill rotWithShape="1">
                           <a:blip r:embed="rId3"/>
                           <a:stretch>
-                            <a:fillRect l="-157037" t="-680233" r="-175926" b="-1072093"/>
+                            <a:fillRect l="-156881" t="-830233" r="-176147" b="-1181395"/>
                           </a:stretch>
                         </a:blipFill>
                       </a:tcPr>
@@ -7296,7 +7296,7 @@
                         <a:blipFill rotWithShape="1">
                           <a:blip r:embed="rId3"/>
                           <a:stretch>
-                            <a:fillRect l="-157037" t="-559167" r="-175926" b="-668333"/>
+                            <a:fillRect l="-156881" t="-666667" r="-176147" b="-746667"/>
                           </a:stretch>
                         </a:blipFill>
                       </a:tcPr>
@@ -7401,7 +7401,7 @@
                         <a:blipFill rotWithShape="1">
                           <a:blip r:embed="rId3"/>
                           <a:stretch>
-                            <a:fillRect l="-157037" t="-659167" r="-175926" b="-568333"/>
+                            <a:fillRect l="-156881" t="-766667" r="-176147" b="-646667"/>
                           </a:stretch>
                         </a:blipFill>
                       </a:tcPr>
@@ -7506,7 +7506,7 @@
                         <a:blipFill rotWithShape="1">
                           <a:blip r:embed="rId3"/>
                           <a:stretch>
-                            <a:fillRect l="-157037" t="-1059302" r="-175926" b="-693023"/>
+                            <a:fillRect l="-156881" t="-1223529" r="-176147" b="-812941"/>
                           </a:stretch>
                         </a:blipFill>
                       </a:tcPr>
@@ -7611,7 +7611,7 @@
                         <a:blipFill rotWithShape="1">
                           <a:blip r:embed="rId3"/>
                           <a:stretch>
-                            <a:fillRect l="-157037" t="-830833" r="-175926" b="-396667"/>
+                            <a:fillRect l="-156881" t="-937500" r="-176147" b="-475833"/>
                           </a:stretch>
                         </a:blipFill>
                       </a:tcPr>
@@ -7675,7 +7675,7 @@
                       <a:tcPr marL="68580" marR="68580" marT="0" marB="0" anchor="ctr"/>
                     </a:tc>
                   </a:tr>
-                  <a:tr h="522514">
+                  <a:tr h="731520">
                     <a:tc>
                       <a:txBody>
                         <a:bodyPr/>
@@ -7716,7 +7716,7 @@
                         <a:blipFill rotWithShape="1">
                           <a:blip r:embed="rId3"/>
                           <a:stretch>
-                            <a:fillRect l="-157037" t="-1314118" r="-175926" b="-460000"/>
+                            <a:fillRect l="-156881" t="-1037500" r="-176147" b="-375833"/>
                           </a:stretch>
                         </a:blipFill>
                       </a:tcPr>
@@ -7821,7 +7821,7 @@
                         <a:blipFill rotWithShape="1">
                           <a:blip r:embed="rId3"/>
                           <a:stretch>
-                            <a:fillRect l="-157037" t="-1001667" r="-175926" b="-225833"/>
+                            <a:fillRect l="-156881" t="-1137500" r="-176147" b="-275833"/>
                           </a:stretch>
                         </a:blipFill>
                       </a:tcPr>
@@ -7926,7 +7926,7 @@
                         <a:blipFill rotWithShape="1">
                           <a:blip r:embed="rId3"/>
                           <a:stretch>
-                            <a:fillRect l="-157037" t="-1101667" r="-175926" b="-125833"/>
+                            <a:fillRect l="-156881" t="-1237500" r="-176147" b="-175833"/>
                           </a:stretch>
                         </a:blipFill>
                       </a:tcPr>
@@ -7990,7 +7990,7 @@
                       <a:tcPr marL="68580" marR="68580" marT="0" marB="0" anchor="ctr"/>
                     </a:tc>
                   </a:tr>
-                  <a:tr h="731520">
+                  <a:tr h="1097280">
                     <a:tc>
                       <a:txBody>
                         <a:bodyPr/>
@@ -8040,7 +8040,7 @@
                         <a:blipFill rotWithShape="1">
                           <a:blip r:embed="rId3"/>
                           <a:stretch>
-                            <a:fillRect l="-157037" t="-1201667" r="-175926" b="-25833"/>
+                            <a:fillRect l="-156881" t="-891667" r="-176147" b="-17222"/>
                           </a:stretch>
                         </a:blipFill>
                       </a:tcPr>
@@ -8119,7 +8119,7 @@
         <p:spPr>
           <a:xfrm>
             <a:off x="15087600" y="7757795"/>
-            <a:ext cx="6172200" cy="5093702"/>
+            <a:ext cx="6934200" cy="4573560"/>
           </a:xfrm>
           <a:prstGeom prst="rect">
             <a:avLst/>
@@ -8215,7 +8215,7 @@
                 <a:ea typeface="Calibri"/>
                 <a:cs typeface="Times New Roman"/>
               </a:rPr>
-              <a:t>Steady state condition can be obtained independently for each axial level</a:t>
+              <a:t>Constant material properties</a:t>
             </a:r>
           </a:p>
           <a:p>
@@ -8232,7 +8232,14 @@
               <a:buFont typeface="Arial"/>
               <a:buChar char="•"/>
             </a:pPr>
-            <a:endParaRPr lang="en-US" sz="2600" dirty="0" smtClean="0">
+            <a:r>
+              <a:rPr lang="en-US" sz="2800" dirty="0" smtClean="0">
+                <a:ea typeface="Calibri"/>
+                <a:cs typeface="Times New Roman"/>
+              </a:rPr>
+              <a:t>Analytical solution for relative rod temperature in solid volume</a:t>
+            </a:r>
+            <a:endParaRPr lang="en-US" sz="2800" dirty="0" smtClean="0">
               <a:ea typeface="Calibri"/>
               <a:cs typeface="Times New Roman"/>
             </a:endParaRPr>
@@ -8318,45 +8325,6 @@
           <a:p>
             <a:pPr algn="ctr"/>
             <a:endParaRPr lang="en-US"/>
-          </a:p>
-        </p:txBody>
-      </p:sp>
-      <p:sp>
-        <p:nvSpPr>
-          <p:cNvPr id="36" name="TextBox 35"/>
-          <p:cNvSpPr txBox="1"/>
-          <p:nvPr/>
-        </p:nvSpPr>
-        <p:spPr>
-          <a:xfrm>
-            <a:off x="3962400" y="22408524"/>
-            <a:ext cx="6705600" cy="707886"/>
-          </a:xfrm>
-          <a:prstGeom prst="rect">
-            <a:avLst/>
-          </a:prstGeom>
-          <a:noFill/>
-        </p:spPr>
-        <p:txBody>
-          <a:bodyPr wrap="square" rtlCol="0">
-            <a:spAutoFit/>
-          </a:bodyPr>
-          <a:lstStyle/>
-          <a:p>
-            <a:pPr algn="ctr"/>
-            <a:r>
-              <a:rPr lang="en-US" sz="4000" b="1" dirty="0" smtClean="0">
-                <a:solidFill>
-                  <a:srgbClr val="003399"/>
-                </a:solidFill>
-              </a:rPr>
-              <a:t>Analytical Result</a:t>
-            </a:r>
-            <a:endParaRPr lang="en-US" sz="4000" b="1" dirty="0">
-              <a:solidFill>
-                <a:srgbClr val="003399"/>
-              </a:solidFill>
-            </a:endParaRPr>
           </a:p>
         </p:txBody>
       </p:sp>
@@ -8409,8 +8377,8 @@
         </p:nvSpPr>
         <p:spPr>
           <a:xfrm>
-            <a:off x="14935200" y="31927800"/>
-            <a:ext cx="13868400" cy="4093428"/>
+            <a:off x="15488710" y="29308246"/>
+            <a:ext cx="13173287" cy="6555641"/>
           </a:xfrm>
           <a:prstGeom prst="rect">
             <a:avLst/>
@@ -8422,52 +8390,11 @@
           </a:bodyPr>
           <a:lstStyle/>
           <a:p>
-            <a:pPr algn="just"/>
+            <a:pPr algn="just" hangingPunct="0"/>
             <a:r>
-              <a:rPr lang="en-US" sz="2600" dirty="0" smtClean="0"/>
-              <a:t>The residual formulation of CTF allows for a numerical computation of the multivariable </a:t>
+              <a:rPr lang="en-US" sz="2800" dirty="0"/>
+              <a:t>The residual formulation of the one-dimensional single-phase liquid and solid residual formulations were listed. Combining the liquid and solid equations into a single Jacobian matrix allowed for easy explicit or implicit coupling. This solution method was tested against the analytical solution for a single rod with uniform heat generation. Similar results were obtained between the two solutions, and the ability to exceed the time step limitations of the semi-implicit method was demonstrated. Future work will involve performing a more in depth verification analysis of the steady state and transient solutions. Further work will also include examining more challenging test problems that can properly demonstrate the advantages of the implicitly coupled fluid solid Jacobian matrix.  The effect of temperature dependent material properties and dynamic gap conductance will also be considered. A homogenous energy equation can now be easily implemented by adding the liquid and solid conservation equations. Future work will be analyzing the homogeneous energy approximation over a state space to see when the approximation is valid. The conduction equations will be extended into the azimuthal and axial directions for more realistic heat transfer.</a:t>
             </a:r>
-            <a:r>
-              <a:rPr lang="en-US" sz="2600" dirty="0" err="1" smtClean="0"/>
-              <a:t>Jacobian</a:t>
-            </a:r>
-            <a:r>
-              <a:rPr lang="en-US" sz="2600" dirty="0" smtClean="0"/>
-              <a:t> matrix compared to the original analytical derivation of a pressure matrix. The 1-D isokinetic single phase liquid verification problem is a good verification problem due its isolation of the order of accuracies through modified equation analysis. The discretization error for both versions of the code converged to zero with decreasing time step and axial mesh size. The order of accuracy for the temporal and spatial refinements matched very closely with the modified equation analysis for both codes. For all of these data points, the residual formulation of the code showed discretization errors that were very close with the original version of the </a:t>
-            </a:r>
-            <a:r>
-              <a:rPr lang="en-US" sz="2600" dirty="0"/>
-              <a:t>code. This work will be expanded to </a:t>
-            </a:r>
-            <a:r>
-              <a:rPr lang="en-US" sz="2600" dirty="0" smtClean="0"/>
-              <a:t>perform verification </a:t>
-            </a:r>
-            <a:r>
-              <a:rPr lang="en-US" sz="2600" dirty="0"/>
-              <a:t>on the single phase equations in both axial and transverse </a:t>
-            </a:r>
-            <a:r>
-              <a:rPr lang="en-US" sz="2600" dirty="0" smtClean="0"/>
-              <a:t>dimensions, </a:t>
-            </a:r>
-            <a:r>
-              <a:rPr lang="en-US" sz="2600" dirty="0"/>
-              <a:t>and </a:t>
-            </a:r>
-            <a:r>
-              <a:rPr lang="en-US" sz="2600" dirty="0" smtClean="0"/>
-              <a:t>coupled fluid </a:t>
-            </a:r>
-            <a:r>
-              <a:rPr lang="en-US" sz="2600" dirty="0"/>
-              <a:t>heat </a:t>
-            </a:r>
-            <a:r>
-              <a:rPr lang="en-US" sz="2600" dirty="0" smtClean="0"/>
-              <a:t>conduction. </a:t>
-            </a:r>
-            <a:endParaRPr lang="en-US" sz="2600" dirty="0"/>
           </a:p>
         </p:txBody>
       </p:sp>
@@ -8500,123 +8427,13 @@
                   <a:srgbClr val="003399"/>
                 </a:solidFill>
               </a:rPr>
-              <a:t>Transient</a:t>
+              <a:t>Transient Results</a:t>
             </a:r>
             <a:endParaRPr lang="en-US" b="1" dirty="0">
               <a:solidFill>
                 <a:srgbClr val="003399"/>
               </a:solidFill>
             </a:endParaRPr>
-          </a:p>
-        </p:txBody>
-      </p:sp>
-      <p:sp>
-        <p:nvSpPr>
-          <p:cNvPr id="51" name="Rectangle 50"/>
-          <p:cNvSpPr/>
-          <p:nvPr/>
-        </p:nvSpPr>
-        <p:spPr>
-          <a:xfrm>
-            <a:off x="15011400" y="28803600"/>
-            <a:ext cx="13716000" cy="2152897"/>
-          </a:xfrm>
-          <a:prstGeom prst="rect">
-            <a:avLst/>
-          </a:prstGeom>
-        </p:spPr>
-        <p:txBody>
-          <a:bodyPr wrap="square">
-            <a:spAutoFit/>
-          </a:bodyPr>
-          <a:lstStyle/>
-          <a:p>
-            <a:pPr marL="457200" marR="0" lvl="0" indent="-457200">
-              <a:lnSpc>
-                <a:spcPct val="130000"/>
-              </a:lnSpc>
-              <a:spcBef>
-                <a:spcPts val="0"/>
-              </a:spcBef>
-              <a:spcAft>
-                <a:spcPts val="0"/>
-              </a:spcAft>
-              <a:buFont typeface="Arial"/>
-              <a:buChar char="•"/>
-            </a:pPr>
-            <a:r>
-              <a:rPr lang="en-US" sz="2600" dirty="0" smtClean="0">
-                <a:ea typeface="Calibri"/>
-                <a:cs typeface="Times New Roman"/>
-              </a:rPr>
-              <a:t>The numerical error will propagate through the solution resulting in more error at the outlet</a:t>
-            </a:r>
-          </a:p>
-          <a:p>
-            <a:pPr marL="457200" marR="0" lvl="0" indent="-457200">
-              <a:lnSpc>
-                <a:spcPct val="130000"/>
-              </a:lnSpc>
-              <a:spcBef>
-                <a:spcPts val="0"/>
-              </a:spcBef>
-              <a:spcAft>
-                <a:spcPts val="0"/>
-              </a:spcAft>
-              <a:buFont typeface="Arial"/>
-              <a:buChar char="•"/>
-            </a:pPr>
-            <a:r>
-              <a:rPr lang="en-US" sz="2600" dirty="0" smtClean="0">
-                <a:ea typeface="Calibri"/>
-                <a:cs typeface="Times New Roman"/>
-              </a:rPr>
-              <a:t>The expected error can be computed from the known solution, and compared to the observed</a:t>
-            </a:r>
-          </a:p>
-          <a:p>
-            <a:pPr marL="457200" marR="0" lvl="0" indent="-457200">
-              <a:lnSpc>
-                <a:spcPct val="130000"/>
-              </a:lnSpc>
-              <a:spcBef>
-                <a:spcPts val="0"/>
-              </a:spcBef>
-              <a:spcAft>
-                <a:spcPts val="0"/>
-              </a:spcAft>
-              <a:buFont typeface="Arial"/>
-              <a:buChar char="•"/>
-            </a:pPr>
-            <a:r>
-              <a:rPr lang="en-US" sz="2600" dirty="0" smtClean="0">
-                <a:ea typeface="Calibri"/>
-                <a:cs typeface="Times New Roman"/>
-              </a:rPr>
-              <a:t>The expected error is local, and was found to scale by dimensionless length</a:t>
-            </a:r>
-          </a:p>
-          <a:p>
-            <a:pPr marL="457200" marR="0" lvl="0" indent="-457200">
-              <a:lnSpc>
-                <a:spcPct val="130000"/>
-              </a:lnSpc>
-              <a:spcBef>
-                <a:spcPts val="0"/>
-              </a:spcBef>
-              <a:spcAft>
-                <a:spcPts val="0"/>
-              </a:spcAft>
-              <a:buFont typeface="Arial"/>
-              <a:buChar char="•"/>
-            </a:pPr>
-            <a:r>
-              <a:rPr lang="en-US" sz="2600" dirty="0" smtClean="0">
-                <a:ea typeface="Calibri"/>
-                <a:cs typeface="Times New Roman"/>
-              </a:rPr>
-              <a:t>Scaled expected error matches closely with observed error while in asymptotic range</a:t>
-            </a:r>
           </a:p>
         </p:txBody>
       </p:sp>
@@ -8629,7 +8446,7 @@
         <p:spPr>
           <a:xfrm>
             <a:off x="304800" y="8001000"/>
-            <a:ext cx="10287000" cy="707886"/>
+            <a:ext cx="8953500" cy="707886"/>
           </a:xfrm>
           <a:prstGeom prst="rect">
             <a:avLst/>
@@ -8649,7 +8466,7 @@
                   <a:srgbClr val="003399"/>
                 </a:solidFill>
               </a:rPr>
-              <a:t>Finite Difference Conservation Equations</a:t>
+              <a:t>Partial Differential Equations</a:t>
             </a:r>
             <a:endParaRPr lang="en-US" sz="4000" b="1" dirty="0">
               <a:solidFill>
@@ -8667,8 +8484,8 @@
         </p:nvSpPr>
         <p:spPr>
           <a:xfrm>
-            <a:off x="-361409" y="14706600"/>
-            <a:ext cx="6705600" cy="707886"/>
+            <a:off x="833094" y="13792200"/>
+            <a:ext cx="4615205" cy="707886"/>
           </a:xfrm>
           <a:prstGeom prst="rect">
             <a:avLst/>
@@ -8688,7 +8505,7 @@
                   <a:srgbClr val="003399"/>
                 </a:solidFill>
               </a:rPr>
-              <a:t>Residual Formulation</a:t>
+              <a:t>Uncoupled Jacobian</a:t>
             </a:r>
             <a:endParaRPr lang="en-US" sz="4000" b="1" dirty="0">
               <a:solidFill>
@@ -8706,8 +8523,8 @@
         </p:nvSpPr>
         <p:spPr>
           <a:xfrm>
-            <a:off x="457200" y="9067800"/>
-            <a:ext cx="890263" cy="492443"/>
+            <a:off x="769917" y="8879169"/>
+            <a:ext cx="1077539" cy="892552"/>
           </a:xfrm>
           <a:prstGeom prst="rect">
             <a:avLst/>
@@ -8722,6 +8539,13 @@
           <a:p>
             <a:r>
               <a:rPr lang="en-US" sz="2600" dirty="0" smtClean="0"/>
+              <a:t>Liquid </a:t>
+            </a:r>
+            <a:br>
+              <a:rPr lang="en-US" sz="2600" dirty="0" smtClean="0"/>
+            </a:br>
+            <a:r>
+              <a:rPr lang="en-US" sz="2600" dirty="0" smtClean="0"/>
               <a:t>Mass</a:t>
             </a:r>
             <a:endParaRPr lang="en-US" sz="2600" dirty="0"/>
@@ -8736,8 +8560,8 @@
         </p:nvSpPr>
         <p:spPr>
           <a:xfrm>
-            <a:off x="381000" y="10134600"/>
-            <a:ext cx="996086" cy="492443"/>
+            <a:off x="407575" y="9906000"/>
+            <a:ext cx="1802225" cy="892552"/>
           </a:xfrm>
           <a:prstGeom prst="rect">
             <a:avLst/>
@@ -8750,9 +8574,17 @@
           </a:bodyPr>
           <a:lstStyle/>
           <a:p>
+            <a:pPr algn="ctr"/>
             <a:r>
               <a:rPr lang="en-US" sz="2600" dirty="0" smtClean="0"/>
-              <a:t>Mom.</a:t>
+              <a:t>Liquid </a:t>
+            </a:r>
+            <a:br>
+              <a:rPr lang="en-US" sz="2600" dirty="0" smtClean="0"/>
+            </a:br>
+            <a:r>
+              <a:rPr lang="en-US" sz="2600" dirty="0" smtClean="0"/>
+              <a:t>Momentum</a:t>
             </a:r>
             <a:endParaRPr lang="en-US" sz="2600" dirty="0"/>
           </a:p>
@@ -8766,8 +8598,8 @@
         </p:nvSpPr>
         <p:spPr>
           <a:xfrm>
-            <a:off x="228600" y="11547157"/>
-            <a:ext cx="1120820" cy="492443"/>
+            <a:off x="696318" y="11222236"/>
+            <a:ext cx="1108252" cy="892552"/>
           </a:xfrm>
           <a:prstGeom prst="rect">
             <a:avLst/>
@@ -8780,6 +8612,14 @@
           </a:bodyPr>
           <a:lstStyle/>
           <a:p>
+            <a:pPr algn="ctr"/>
+            <a:r>
+              <a:rPr lang="en-US" sz="2600" dirty="0" smtClean="0"/>
+              <a:t>Liquid</a:t>
+            </a:r>
+            <a:br>
+              <a:rPr lang="en-US" sz="2600" dirty="0" smtClean="0"/>
+            </a:br>
             <a:r>
               <a:rPr lang="en-US" sz="2600" dirty="0" smtClean="0"/>
               <a:t>Energy</a:t>
@@ -8788,385 +8628,6 @@
           </a:p>
         </p:txBody>
       </p:sp>
-      <mc:AlternateContent xmlns:mc="http://schemas.openxmlformats.org/markup-compatibility/2006" xmlns:a14="http://schemas.microsoft.com/office/drawing/2010/main">
-        <mc:Choice Requires="a14">
-          <p:sp>
-            <p:nvSpPr>
-              <p:cNvPr id="65" name="TextBox 64"/>
-              <p:cNvSpPr txBox="1"/>
-              <p:nvPr/>
-            </p:nvSpPr>
-            <p:spPr>
-              <a:xfrm>
-                <a:off x="3425483" y="23116410"/>
-                <a:ext cx="6268511" cy="1060483"/>
-              </a:xfrm>
-              <a:prstGeom prst="rect">
-                <a:avLst/>
-              </a:prstGeom>
-              <a:noFill/>
-            </p:spPr>
-            <p:txBody>
-              <a:bodyPr wrap="none" rtlCol="0">
-                <a:spAutoFit/>
-              </a:bodyPr>
-              <a:lstStyle/>
-              <a:p>
-                <a14:m>
-                  <m:oMath xmlns:m="http://schemas.openxmlformats.org/officeDocument/2006/math">
-                    <m:r>
-                      <a:rPr lang="en-US" sz="2800" i="1">
-                        <a:latin typeface="Cambria Math"/>
-                      </a:rPr>
-                      <m:t>𝑇</m:t>
-                    </m:r>
-                    <m:d>
-                      <m:dPr>
-                        <m:ctrlPr>
-                          <a:rPr lang="en-US" sz="2800" i="1">
-                            <a:latin typeface="Cambria Math"/>
-                          </a:rPr>
-                        </m:ctrlPr>
-                      </m:dPr>
-                      <m:e>
-                        <m:r>
-                          <a:rPr lang="en-US" sz="2800" i="1">
-                            <a:latin typeface="Cambria Math"/>
-                          </a:rPr>
-                          <m:t>𝑟</m:t>
-                        </m:r>
-                        <m:r>
-                          <a:rPr lang="en-US" sz="2800">
-                            <a:latin typeface="Cambria Math"/>
-                          </a:rPr>
-                          <m:t>,</m:t>
-                        </m:r>
-                        <m:r>
-                          <a:rPr lang="en-US" sz="2800" i="1">
-                            <a:latin typeface="Cambria Math"/>
-                          </a:rPr>
-                          <m:t>𝑧</m:t>
-                        </m:r>
-                      </m:e>
-                    </m:d>
-                    <m:r>
-                      <a:rPr lang="en-US" sz="2800" i="1" smtClean="0">
-                        <a:latin typeface="Cambria Math"/>
-                      </a:rPr>
-                      <m:t>−</m:t>
-                    </m:r>
-                    <m:r>
-                      <a:rPr lang="en-US" sz="2800" i="1" smtClean="0">
-                        <a:latin typeface="Cambria Math"/>
-                      </a:rPr>
-                      <m:t>𝑇</m:t>
-                    </m:r>
-                    <m:d>
-                      <m:dPr>
-                        <m:ctrlPr>
-                          <a:rPr lang="en-US" sz="2800" i="1">
-                            <a:latin typeface="Cambria Math"/>
-                          </a:rPr>
-                        </m:ctrlPr>
-                      </m:dPr>
-                      <m:e>
-                        <m:sSub>
-                          <m:sSubPr>
-                            <m:ctrlPr>
-                              <a:rPr lang="en-US" sz="2800" i="1">
-                                <a:latin typeface="Cambria Math"/>
-                              </a:rPr>
-                            </m:ctrlPr>
-                          </m:sSubPr>
-                          <m:e>
-                            <m:r>
-                              <a:rPr lang="en-US" sz="2800" i="1">
-                                <a:latin typeface="Cambria Math"/>
-                              </a:rPr>
-                              <m:t>𝑟</m:t>
-                            </m:r>
-                          </m:e>
-                          <m:sub>
-                            <m:r>
-                              <a:rPr lang="en-US" sz="2800" i="1">
-                                <a:latin typeface="Cambria Math"/>
-                              </a:rPr>
-                              <m:t>𝑓𝑢𝑒𝑙</m:t>
-                            </m:r>
-                          </m:sub>
-                        </m:sSub>
-                        <m:r>
-                          <a:rPr lang="en-US" sz="2800" i="1">
-                            <a:latin typeface="Cambria Math"/>
-                          </a:rPr>
-                          <m:t>,</m:t>
-                        </m:r>
-                        <m:r>
-                          <a:rPr lang="en-US" sz="2800" i="1">
-                            <a:latin typeface="Cambria Math"/>
-                          </a:rPr>
-                          <m:t>𝑧</m:t>
-                        </m:r>
-                      </m:e>
-                    </m:d>
-                    <m:r>
-                      <a:rPr lang="en-US" sz="2800">
-                        <a:latin typeface="Cambria Math"/>
-                      </a:rPr>
-                      <m:t>=</m:t>
-                    </m:r>
-                    <m:f>
-                      <m:fPr>
-                        <m:ctrlPr>
-                          <a:rPr lang="en-US" sz="2800" i="1">
-                            <a:latin typeface="Cambria Math"/>
-                          </a:rPr>
-                        </m:ctrlPr>
-                      </m:fPr>
-                      <m:num>
-                        <m:sSup>
-                          <m:sSupPr>
-                            <m:ctrlPr>
-                              <a:rPr lang="en-US" sz="2800" i="1">
-                                <a:latin typeface="Cambria Math"/>
-                              </a:rPr>
-                            </m:ctrlPr>
-                          </m:sSupPr>
-                          <m:e>
-                            <m:r>
-                              <a:rPr lang="en-US" sz="2800" i="1">
-                                <a:latin typeface="Cambria Math"/>
-                              </a:rPr>
-                              <m:t>𝑞</m:t>
-                            </m:r>
-                          </m:e>
-                          <m:sup>
-                            <m:r>
-                              <a:rPr lang="en-US" sz="2800" i="1">
-                                <a:latin typeface="Cambria Math"/>
-                              </a:rPr>
-                              <m:t>′′′</m:t>
-                            </m:r>
-                          </m:sup>
-                        </m:sSup>
-                        <m:r>
-                          <a:rPr lang="en-US" sz="2800">
-                            <a:latin typeface="Cambria Math"/>
-                          </a:rPr>
-                          <m:t> </m:t>
-                        </m:r>
-                        <m:sSubSup>
-                          <m:sSubSupPr>
-                            <m:ctrlPr>
-                              <a:rPr lang="en-US" sz="2800" i="1">
-                                <a:latin typeface="Cambria Math"/>
-                              </a:rPr>
-                            </m:ctrlPr>
-                          </m:sSubSupPr>
-                          <m:e>
-                            <m:r>
-                              <a:rPr lang="en-US" sz="2800" i="1">
-                                <a:latin typeface="Cambria Math"/>
-                              </a:rPr>
-                              <m:t>𝑟</m:t>
-                            </m:r>
-                          </m:e>
-                          <m:sub>
-                            <m:r>
-                              <a:rPr lang="en-US" sz="2800" i="1">
-                                <a:latin typeface="Cambria Math"/>
-                              </a:rPr>
-                              <m:t>𝑓𝑢𝑒𝑙</m:t>
-                            </m:r>
-                          </m:sub>
-                          <m:sup>
-                            <m:r>
-                              <a:rPr lang="en-US" sz="2800">
-                                <a:latin typeface="Cambria Math"/>
-                              </a:rPr>
-                              <m:t>2</m:t>
-                            </m:r>
-                          </m:sup>
-                        </m:sSubSup>
-                      </m:num>
-                      <m:den>
-                        <m:r>
-                          <a:rPr lang="en-US" sz="2800">
-                            <a:latin typeface="Cambria Math"/>
-                          </a:rPr>
-                          <m:t>4 </m:t>
-                        </m:r>
-                        <m:sSub>
-                          <m:sSubPr>
-                            <m:ctrlPr>
-                              <a:rPr lang="en-US" sz="2800" i="1">
-                                <a:latin typeface="Cambria Math"/>
-                              </a:rPr>
-                            </m:ctrlPr>
-                          </m:sSubPr>
-                          <m:e>
-                            <m:r>
-                              <a:rPr lang="en-US" sz="2800" i="1">
-                                <a:latin typeface="Cambria Math"/>
-                              </a:rPr>
-                              <m:t>𝑘</m:t>
-                            </m:r>
-                          </m:e>
-                          <m:sub>
-                            <m:r>
-                              <a:rPr lang="en-US" sz="2800" i="1">
-                                <a:latin typeface="Cambria Math"/>
-                              </a:rPr>
-                              <m:t>𝑓𝑢𝑒𝑙</m:t>
-                            </m:r>
-                          </m:sub>
-                        </m:sSub>
-                      </m:den>
-                    </m:f>
-                    <m:d>
-                      <m:dPr>
-                        <m:ctrlPr>
-                          <a:rPr lang="en-US" sz="2800" i="1">
-                            <a:latin typeface="Cambria Math"/>
-                          </a:rPr>
-                        </m:ctrlPr>
-                      </m:dPr>
-                      <m:e>
-                        <m:r>
-                          <a:rPr lang="en-US" sz="2800">
-                            <a:latin typeface="Cambria Math"/>
-                          </a:rPr>
-                          <m:t>1</m:t>
-                        </m:r>
-                        <m:r>
-                          <a:rPr lang="en-US" sz="2800" i="1">
-                            <a:latin typeface="Cambria Math"/>
-                          </a:rPr>
-                          <m:t>−</m:t>
-                        </m:r>
-                        <m:f>
-                          <m:fPr>
-                            <m:ctrlPr>
-                              <a:rPr lang="en-US" sz="2800" i="1">
-                                <a:latin typeface="Cambria Math"/>
-                              </a:rPr>
-                            </m:ctrlPr>
-                          </m:fPr>
-                          <m:num>
-                            <m:sSup>
-                              <m:sSupPr>
-                                <m:ctrlPr>
-                                  <a:rPr lang="en-US" sz="2800" i="1">
-                                    <a:latin typeface="Cambria Math"/>
-                                  </a:rPr>
-                                </m:ctrlPr>
-                              </m:sSupPr>
-                              <m:e>
-                                <m:r>
-                                  <a:rPr lang="en-US" sz="2800" i="1">
-                                    <a:latin typeface="Cambria Math"/>
-                                  </a:rPr>
-                                  <m:t>𝑟</m:t>
-                                </m:r>
-                              </m:e>
-                              <m:sup>
-                                <m:r>
-                                  <a:rPr lang="en-US" sz="2800">
-                                    <a:latin typeface="Cambria Math"/>
-                                  </a:rPr>
-                                  <m:t>2</m:t>
-                                </m:r>
-                              </m:sup>
-                            </m:sSup>
-                          </m:num>
-                          <m:den>
-                            <m:sSubSup>
-                              <m:sSubSupPr>
-                                <m:ctrlPr>
-                                  <a:rPr lang="en-US" sz="2800" i="1">
-                                    <a:latin typeface="Cambria Math"/>
-                                  </a:rPr>
-                                </m:ctrlPr>
-                              </m:sSubSupPr>
-                              <m:e>
-                                <m:r>
-                                  <a:rPr lang="en-US" sz="2800" i="1">
-                                    <a:latin typeface="Cambria Math"/>
-                                  </a:rPr>
-                                  <m:t>𝑟</m:t>
-                                </m:r>
-                              </m:e>
-                              <m:sub>
-                                <m:r>
-                                  <a:rPr lang="en-US" sz="2800" i="1">
-                                    <a:latin typeface="Cambria Math"/>
-                                  </a:rPr>
-                                  <m:t>𝑓𝑢𝑒𝑙</m:t>
-                                </m:r>
-                              </m:sub>
-                              <m:sup>
-                                <m:r>
-                                  <a:rPr lang="en-US" sz="2800">
-                                    <a:latin typeface="Cambria Math"/>
-                                  </a:rPr>
-                                  <m:t>2</m:t>
-                                </m:r>
-                              </m:sup>
-                            </m:sSubSup>
-                          </m:den>
-                        </m:f>
-                      </m:e>
-                    </m:d>
-                  </m:oMath>
-                </a14:m>
-                <a:r>
-                  <a:rPr lang="en-US" sz="2800" b="1" dirty="0"/>
-                  <a:t> </a:t>
-                </a:r>
-                <a:endParaRPr lang="en-US" sz="2600" dirty="0"/>
-              </a:p>
-            </p:txBody>
-          </p:sp>
-        </mc:Choice>
-        <mc:Fallback xmlns="">
-          <p:sp>
-            <p:nvSpPr>
-              <p:cNvPr id="65" name="TextBox 64"/>
-              <p:cNvSpPr txBox="1">
-                <a:spLocks noRot="1" noChangeAspect="1" noMove="1" noResize="1" noEditPoints="1" noAdjustHandles="1" noChangeArrowheads="1" noChangeShapeType="1" noTextEdit="1"/>
-              </p:cNvSpPr>
-              <p:nvPr/>
-            </p:nvSpPr>
-            <p:spPr>
-              <a:xfrm>
-                <a:off x="3425483" y="23116410"/>
-                <a:ext cx="6268511" cy="1060483"/>
-              </a:xfrm>
-              <a:prstGeom prst="rect">
-                <a:avLst/>
-              </a:prstGeom>
-              <a:blipFill rotWithShape="1">
-                <a:blip r:embed="rId4"/>
-                <a:stretch>
-                  <a:fillRect/>
-                </a:stretch>
-              </a:blipFill>
-            </p:spPr>
-            <p:txBody>
-              <a:bodyPr/>
-              <a:lstStyle/>
-              <a:p>
-                <a:r>
-                  <a:rPr lang="en-US">
-                    <a:noFill/>
-                  </a:rPr>
-                  <a:t> </a:t>
-                </a:r>
-              </a:p>
-            </p:txBody>
-          </p:sp>
-        </mc:Fallback>
-      </mc:AlternateContent>
       <p:sp>
         <p:nvSpPr>
           <p:cNvPr id="66" name="Rectangle 65"/>
@@ -9217,34 +8678,6 @@
           </a:p>
         </p:txBody>
       </p:sp>
-      <p:pic>
-        <p:nvPicPr>
-          <p:cNvPr id="60" name="Picture 59"/>
-          <p:cNvPicPr/>
-          <p:nvPr/>
-        </p:nvPicPr>
-        <p:blipFill>
-          <a:blip r:embed="rId5">
-            <a:extLst>
-              <a:ext uri="{28A0092B-C50C-407E-A947-70E740481C1C}">
-                <a14:useLocalDpi xmlns:a14="http://schemas.microsoft.com/office/drawing/2010/main" val="0"/>
-              </a:ext>
-            </a:extLst>
-          </a:blip>
-          <a:stretch>
-            <a:fillRect/>
-          </a:stretch>
-        </p:blipFill>
-        <p:spPr>
-          <a:xfrm>
-            <a:off x="9944872" y="15868139"/>
-            <a:ext cx="4218326" cy="4153922"/>
-          </a:xfrm>
-          <a:prstGeom prst="rect">
-            <a:avLst/>
-          </a:prstGeom>
-        </p:spPr>
-      </p:pic>
       <p:sp>
         <p:nvSpPr>
           <p:cNvPr id="71" name="TextBox 70"/>
@@ -9253,8 +8686,8 @@
         </p:nvSpPr>
         <p:spPr>
           <a:xfrm>
-            <a:off x="381000" y="13909357"/>
-            <a:ext cx="1744388" cy="492443"/>
+            <a:off x="696318" y="12563306"/>
+            <a:ext cx="1744388" cy="892552"/>
           </a:xfrm>
           <a:prstGeom prst="rect">
             <a:avLst/>
@@ -9267,6 +8700,14 @@
           </a:bodyPr>
           <a:lstStyle/>
           <a:p>
+            <a:pPr algn="ctr"/>
+            <a:r>
+              <a:rPr lang="en-US" sz="2600" dirty="0" smtClean="0"/>
+              <a:t>Solid</a:t>
+            </a:r>
+            <a:br>
+              <a:rPr lang="en-US" sz="2600" dirty="0" smtClean="0"/>
+            </a:br>
             <a:r>
               <a:rPr lang="en-US" sz="2600" dirty="0" smtClean="0"/>
               <a:t>Conduction</a:t>
@@ -9275,8 +8716,8 @@
           </a:p>
         </p:txBody>
       </p:sp>
-      <mc:AlternateContent xmlns:mc="http://schemas.openxmlformats.org/markup-compatibility/2006" xmlns:a14="http://schemas.microsoft.com/office/drawing/2010/main">
-        <mc:Choice Requires="a14">
+      <mc:AlternateContent xmlns:mc="http://schemas.openxmlformats.org/markup-compatibility/2006">
+        <mc:Choice xmlns:a14="http://schemas.microsoft.com/office/drawing/2010/main" Requires="a14">
           <p:sp>
             <p:nvSpPr>
               <p:cNvPr id="9" name="Rectangle 8"/>
@@ -9285,7 +8726,7 @@
             </p:nvSpPr>
             <p:spPr>
               <a:xfrm>
-                <a:off x="1556655" y="11274806"/>
+                <a:off x="2209800" y="11149940"/>
                 <a:ext cx="7249193" cy="1037143"/>
               </a:xfrm>
               <a:prstGeom prst="rect">
@@ -9615,7 +9056,7 @@
             </p:txBody>
           </p:sp>
         </mc:Choice>
-        <mc:Fallback xmlns="">
+        <mc:Fallback>
           <p:sp>
             <p:nvSpPr>
               <p:cNvPr id="9" name="Rectangle 8"/>
@@ -9626,14 +9067,14 @@
             </p:nvSpPr>
             <p:spPr>
               <a:xfrm>
-                <a:off x="1556655" y="11274806"/>
+                <a:off x="2209800" y="11149940"/>
                 <a:ext cx="7249193" cy="1037143"/>
               </a:xfrm>
               <a:prstGeom prst="rect">
                 <a:avLst/>
               </a:prstGeom>
               <a:blipFill rotWithShape="1">
-                <a:blip r:embed="rId6"/>
+                <a:blip r:embed="rId4"/>
                 <a:stretch>
                   <a:fillRect/>
                 </a:stretch>
@@ -9654,8 +9095,8 @@
           </p:sp>
         </mc:Fallback>
       </mc:AlternateContent>
-      <mc:AlternateContent xmlns:mc="http://schemas.openxmlformats.org/markup-compatibility/2006" xmlns:a14="http://schemas.microsoft.com/office/drawing/2010/main">
-        <mc:Choice Requires="a14">
+      <mc:AlternateContent xmlns:mc="http://schemas.openxmlformats.org/markup-compatibility/2006">
+        <mc:Choice xmlns:a14="http://schemas.microsoft.com/office/drawing/2010/main" Requires="a14">
           <p:sp>
             <p:nvSpPr>
               <p:cNvPr id="12" name="Rectangle 11"/>
@@ -9664,7 +9105,7 @@
             </p:nvSpPr>
             <p:spPr>
               <a:xfrm>
-                <a:off x="1765229" y="10160919"/>
+                <a:off x="3544028" y="10089715"/>
                 <a:ext cx="3808543" cy="775084"/>
               </a:xfrm>
               <a:prstGeom prst="rect">
@@ -9873,7 +9314,7 @@
             </p:txBody>
           </p:sp>
         </mc:Choice>
-        <mc:Fallback xmlns="">
+        <mc:Fallback>
           <p:sp>
             <p:nvSpPr>
               <p:cNvPr id="12" name="Rectangle 11"/>
@@ -9884,14 +9325,14 @@
             </p:nvSpPr>
             <p:spPr>
               <a:xfrm>
-                <a:off x="1765229" y="10160919"/>
+                <a:off x="3544028" y="10089715"/>
                 <a:ext cx="3808543" cy="775084"/>
               </a:xfrm>
               <a:prstGeom prst="rect">
                 <a:avLst/>
               </a:prstGeom>
               <a:blipFill rotWithShape="1">
-                <a:blip r:embed="rId7"/>
+                <a:blip r:embed="rId5"/>
                 <a:stretch>
                   <a:fillRect/>
                 </a:stretch>
@@ -9912,8 +9353,8 @@
           </p:sp>
         </mc:Fallback>
       </mc:AlternateContent>
-      <mc:AlternateContent xmlns:mc="http://schemas.openxmlformats.org/markup-compatibility/2006" xmlns:a14="http://schemas.microsoft.com/office/drawing/2010/main">
-        <mc:Choice Requires="a14">
+      <mc:AlternateContent xmlns:mc="http://schemas.openxmlformats.org/markup-compatibility/2006">
+        <mc:Choice xmlns:a14="http://schemas.microsoft.com/office/drawing/2010/main" Requires="a14">
           <p:sp>
             <p:nvSpPr>
               <p:cNvPr id="13" name="Rectangle 12"/>
@@ -9922,8 +9363,8 @@
             </p:nvSpPr>
             <p:spPr>
               <a:xfrm>
-                <a:off x="1614129" y="8916700"/>
-                <a:ext cx="2055371" cy="794641"/>
+                <a:off x="4255986" y="8764848"/>
+                <a:ext cx="2384627" cy="911596"/>
               </a:xfrm>
               <a:prstGeom prst="rect">
                 <a:avLst/>
@@ -9945,14 +9386,14 @@
                       <m:f>
                         <m:fPr>
                           <m:ctrlPr>
-                            <a:rPr lang="en-US" sz="2400" i="1">
+                            <a:rPr lang="en-US" sz="2800" i="1">
                               <a:latin typeface="Cambria Math"/>
                             </a:rPr>
                           </m:ctrlPr>
                         </m:fPr>
                         <m:num>
                           <m:r>
-                            <a:rPr lang="en-US" sz="2400" i="1">
+                            <a:rPr lang="en-US" sz="2800" i="1">
                               <a:latin typeface="Cambria Math"/>
                             </a:rPr>
                             <m:t>𝜕𝜌</m:t>
@@ -9960,13 +9401,13 @@
                         </m:num>
                         <m:den>
                           <m:r>
-                            <a:rPr lang="en-US" sz="2400" i="1">
+                            <a:rPr lang="en-US" sz="2800" i="1">
                               <a:latin typeface="Cambria Math"/>
                             </a:rPr>
                             <m:t>𝜕</m:t>
                           </m:r>
                           <m:r>
-                            <a:rPr lang="en-US" sz="2400" i="1">
+                            <a:rPr lang="en-US" sz="2800" i="1">
                               <a:latin typeface="Cambria Math"/>
                             </a:rPr>
                             <m:t>𝑡</m:t>
@@ -9974,7 +9415,7 @@
                         </m:den>
                       </m:f>
                       <m:r>
-                        <a:rPr lang="en-US" sz="2400">
+                        <a:rPr lang="en-US" sz="2800">
                           <a:latin typeface="Cambria Math"/>
                         </a:rPr>
                         <m:t>+</m:t>
@@ -9982,20 +9423,20 @@
                       <m:f>
                         <m:fPr>
                           <m:ctrlPr>
-                            <a:rPr lang="en-US" sz="2400" i="1">
+                            <a:rPr lang="en-US" sz="2800" i="1">
                               <a:latin typeface="Cambria Math"/>
                             </a:rPr>
                           </m:ctrlPr>
                         </m:fPr>
                         <m:num>
                           <m:r>
-                            <a:rPr lang="en-US" sz="2400" i="1">
+                            <a:rPr lang="en-US" sz="2800" i="1">
                               <a:latin typeface="Cambria Math"/>
                             </a:rPr>
                             <m:t>𝜕𝜌</m:t>
                           </m:r>
                           <m:r>
-                            <a:rPr lang="en-US" sz="2400" i="1">
+                            <a:rPr lang="en-US" sz="2800" i="1">
                               <a:latin typeface="Cambria Math"/>
                             </a:rPr>
                             <m:t>𝑢</m:t>
@@ -10003,13 +9444,13 @@
                         </m:num>
                         <m:den>
                           <m:r>
-                            <a:rPr lang="en-US" sz="2400" i="1">
+                            <a:rPr lang="en-US" sz="2800" i="1">
                               <a:latin typeface="Cambria Math"/>
                             </a:rPr>
                             <m:t>𝜕</m:t>
                           </m:r>
                           <m:r>
-                            <a:rPr lang="en-US" sz="2400" i="1">
+                            <a:rPr lang="en-US" sz="2800" i="1">
                               <a:latin typeface="Cambria Math"/>
                             </a:rPr>
                             <m:t>𝑥</m:t>
@@ -10017,7 +9458,7 @@
                         </m:den>
                       </m:f>
                       <m:r>
-                        <a:rPr lang="en-US" sz="2400">
+                        <a:rPr lang="en-US" sz="2800">
                           <a:latin typeface="Cambria Math"/>
                         </a:rPr>
                         <m:t>=0</m:t>
@@ -10025,12 +9466,12 @@
                     </m:oMath>
                   </m:oMathPara>
                 </a14:m>
-                <a:endParaRPr lang="en-US" sz="2400" dirty="0"/>
+                <a:endParaRPr lang="en-US" sz="2800" dirty="0"/>
               </a:p>
             </p:txBody>
           </p:sp>
         </mc:Choice>
-        <mc:Fallback xmlns="">
+        <mc:Fallback>
           <p:sp>
             <p:nvSpPr>
               <p:cNvPr id="13" name="Rectangle 12"/>
@@ -10041,14 +9482,14 @@
             </p:nvSpPr>
             <p:spPr>
               <a:xfrm>
-                <a:off x="1614129" y="8916700"/>
-                <a:ext cx="2055371" cy="794641"/>
+                <a:off x="4255986" y="8764848"/>
+                <a:ext cx="2384627" cy="911596"/>
               </a:xfrm>
               <a:prstGeom prst="rect">
                 <a:avLst/>
               </a:prstGeom>
               <a:blipFill rotWithShape="1">
-                <a:blip r:embed="rId8"/>
+                <a:blip r:embed="rId6"/>
                 <a:stretch>
                   <a:fillRect/>
                 </a:stretch>
@@ -10069,8 +9510,8 @@
           </p:sp>
         </mc:Fallback>
       </mc:AlternateContent>
-      <mc:AlternateContent xmlns:mc="http://schemas.openxmlformats.org/markup-compatibility/2006" xmlns:a14="http://schemas.microsoft.com/office/drawing/2010/main">
-        <mc:Choice Requires="a14">
+      <mc:AlternateContent xmlns:mc="http://schemas.openxmlformats.org/markup-compatibility/2006">
+        <mc:Choice xmlns:a14="http://schemas.microsoft.com/office/drawing/2010/main" Requires="a14">
           <p:sp>
             <p:nvSpPr>
               <p:cNvPr id="14" name="Rectangle 13"/>
@@ -10079,7 +9520,7 @@
             </p:nvSpPr>
             <p:spPr>
               <a:xfrm>
-                <a:off x="2440706" y="13502640"/>
+                <a:off x="2875800" y="12418235"/>
                 <a:ext cx="5144998" cy="1060483"/>
               </a:xfrm>
               <a:prstGeom prst="rect">
@@ -10328,7 +9769,7 @@
             </p:txBody>
           </p:sp>
         </mc:Choice>
-        <mc:Fallback xmlns="">
+        <mc:Fallback>
           <p:sp>
             <p:nvSpPr>
               <p:cNvPr id="14" name="Rectangle 13"/>
@@ -10339,14 +9780,14 @@
             </p:nvSpPr>
             <p:spPr>
               <a:xfrm>
-                <a:off x="2440706" y="13502640"/>
+                <a:off x="2875800" y="12418235"/>
                 <a:ext cx="5144998" cy="1060483"/>
               </a:xfrm>
               <a:prstGeom prst="rect">
                 <a:avLst/>
               </a:prstGeom>
               <a:blipFill rotWithShape="1">
-                <a:blip r:embed="rId9"/>
+                <a:blip r:embed="rId7"/>
                 <a:stretch>
                   <a:fillRect/>
                 </a:stretch>
@@ -10374,7 +9815,7 @@
           <p:nvPr/>
         </p:nvPicPr>
         <p:blipFill rotWithShape="1">
-          <a:blip r:embed="rId10" r:link="rId11">
+          <a:blip r:embed="rId8" r:link="rId9">
             <a:extLst>
               <a:ext uri="{28A0092B-C50C-407E-A947-70E740481C1C}">
                 <a14:useLocalDpi xmlns:a14="http://schemas.microsoft.com/office/drawing/2010/main" val="0"/>
@@ -10386,8 +9827,8 @@
         </p:blipFill>
         <p:spPr bwMode="auto">
           <a:xfrm>
-            <a:off x="902331" y="15240000"/>
-            <a:ext cx="3607505" cy="4782061"/>
+            <a:off x="769917" y="14694209"/>
+            <a:ext cx="4678382" cy="5291880"/>
           </a:xfrm>
           <a:prstGeom prst="rect">
             <a:avLst/>
@@ -10415,7 +9856,7 @@
           <p:nvPr/>
         </p:nvPicPr>
         <p:blipFill rotWithShape="1">
-          <a:blip r:embed="rId12" r:link="rId13">
+          <a:blip r:embed="rId10" r:link="rId11">
             <a:extLst>
               <a:ext uri="{28A0092B-C50C-407E-A947-70E740481C1C}">
                 <a14:useLocalDpi xmlns:a14="http://schemas.microsoft.com/office/drawing/2010/main" val="0"/>
@@ -10427,8 +9868,8 @@
         </p:blipFill>
         <p:spPr bwMode="auto">
           <a:xfrm>
-            <a:off x="5013205" y="15240000"/>
-            <a:ext cx="3661273" cy="4782061"/>
+            <a:off x="5834396" y="14677769"/>
+            <a:ext cx="4678382" cy="5289958"/>
           </a:xfrm>
           <a:prstGeom prst="rect">
             <a:avLst/>
@@ -10456,18 +9897,18 @@
           <p:nvPr>
             <p:extLst>
               <p:ext uri="{D42A27DB-BD31-4B8C-83A1-F6EECF244321}">
-                <p14:modId xmlns:p14="http://schemas.microsoft.com/office/powerpoint/2010/main" val="1342916794"/>
+                <p14:modId xmlns:p14="http://schemas.microsoft.com/office/powerpoint/2010/main" val="4107845813"/>
               </p:ext>
             </p:extLst>
           </p:nvPr>
         </p:nvGraphicFramePr>
         <p:xfrm>
-          <a:off x="2440706" y="24176892"/>
-          <a:ext cx="9141694" cy="4836695"/>
+          <a:off x="5722493" y="23071154"/>
+          <a:ext cx="8227294" cy="4836695"/>
         </p:xfrm>
         <a:graphic>
           <a:graphicData uri="http://schemas.openxmlformats.org/drawingml/2006/chart">
-            <c:chart xmlns:c="http://schemas.openxmlformats.org/drawingml/2006/chart" xmlns:r="http://schemas.openxmlformats.org/officeDocument/2006/relationships" r:id="rId14"/>
+            <c:chart xmlns:c="http://schemas.openxmlformats.org/drawingml/2006/chart" xmlns:r="http://schemas.openxmlformats.org/officeDocument/2006/relationships" r:id="rId12"/>
           </a:graphicData>
         </a:graphic>
       </p:graphicFrame>
@@ -10480,14 +9921,14 @@
           <p:nvPr>
             <p:extLst>
               <p:ext uri="{D42A27DB-BD31-4B8C-83A1-F6EECF244321}">
-                <p14:modId xmlns:p14="http://schemas.microsoft.com/office/powerpoint/2010/main" val="1902942293"/>
+                <p14:modId xmlns:p14="http://schemas.microsoft.com/office/powerpoint/2010/main" val="1192882155"/>
               </p:ext>
             </p:extLst>
           </p:nvPr>
         </p:nvGraphicFramePr>
         <p:xfrm>
-          <a:off x="2641814" y="30196393"/>
-          <a:ext cx="8848254" cy="2194560"/>
+          <a:off x="2965315" y="29376052"/>
+          <a:ext cx="7336488" cy="2194560"/>
         </p:xfrm>
         <a:graphic>
           <a:graphicData uri="http://schemas.openxmlformats.org/drawingml/2006/table">
@@ -10496,11 +9937,11 @@
                 <a:tableStyleId>{B301B821-A1FF-4177-AEE7-76D212191A09}</a:tableStyleId>
               </a:tblPr>
               <a:tblGrid>
-                <a:gridCol w="2058843"/>
-                <a:gridCol w="1759130"/>
-                <a:gridCol w="1542603"/>
-                <a:gridCol w="1706528"/>
-                <a:gridCol w="1781150"/>
+                <a:gridCol w="1707080"/>
+                <a:gridCol w="1458574"/>
+                <a:gridCol w="1279042"/>
+                <a:gridCol w="1414960"/>
+                <a:gridCol w="1476832"/>
               </a:tblGrid>
               <a:tr h="152400">
                 <a:tc>
@@ -10545,12 +9986,12 @@
                         </a:spcAft>
                       </a:pPr>
                       <a:r>
-                        <a:rPr lang="en-US" sz="2400">
+                        <a:rPr lang="en-US" sz="2400" dirty="0">
                           <a:effectLst/>
                         </a:rPr>
                         <a:t>Semi-implicit Transient</a:t>
                       </a:r>
-                      <a:endParaRPr lang="en-US" sz="2400">
+                      <a:endParaRPr lang="en-US" sz="2400" dirty="0">
                         <a:effectLst/>
                         <a:latin typeface="Times New Roman"/>
                         <a:ea typeface="Times New Roman"/>
@@ -10573,12 +10014,12 @@
                         </a:spcAft>
                       </a:pPr>
                       <a:r>
-                        <a:rPr lang="en-US" sz="2400">
+                        <a:rPr lang="en-US" sz="2400" dirty="0">
                           <a:effectLst/>
                         </a:rPr>
                         <a:t>Implicit Transient</a:t>
                       </a:r>
-                      <a:endParaRPr lang="en-US" sz="2400">
+                      <a:endParaRPr lang="en-US" sz="2400" dirty="0">
                         <a:effectLst/>
                         <a:latin typeface="Times New Roman"/>
                         <a:ea typeface="Times New Roman"/>
@@ -10640,7 +10081,7 @@
                         </a:spcAft>
                       </a:pPr>
                       <a:r>
-                        <a:rPr lang="en-US" sz="2400">
+                        <a:rPr lang="en-US" sz="2400" dirty="0">
                           <a:effectLst/>
                         </a:rPr>
                         <a:t>Original</a:t>
@@ -10656,12 +10097,12 @@
                         </a:spcAft>
                       </a:pPr>
                       <a:r>
-                        <a:rPr lang="en-US" sz="2400">
+                        <a:rPr lang="en-US" sz="2400" dirty="0">
                           <a:effectLst/>
                         </a:rPr>
                         <a:t>Steady State</a:t>
                       </a:r>
-                      <a:endParaRPr lang="en-US" sz="2400">
+                      <a:endParaRPr lang="en-US" sz="2400" dirty="0">
                         <a:effectLst/>
                         <a:latin typeface="Times New Roman"/>
                         <a:ea typeface="Times New Roman"/>
@@ -11101,6 +10542,2148 @@
           </a:graphicData>
         </a:graphic>
       </p:graphicFrame>
+      <p:pic>
+        <p:nvPicPr>
+          <p:cNvPr id="37" name="Picture 36" descr="Macintosh HD:Users:chrisdances:Github:Nureth-16:images:rod-diagram.jpg"/>
+          <p:cNvPicPr/>
+          <p:nvPr/>
+        </p:nvPicPr>
+        <p:blipFill rotWithShape="1">
+          <a:blip r:embed="rId13">
+            <a:extLst>
+              <a:ext uri="{28A0092B-C50C-407E-A947-70E740481C1C}">
+                <a14:useLocalDpi xmlns:a14="http://schemas.microsoft.com/office/drawing/2010/main" val="0"/>
+              </a:ext>
+            </a:extLst>
+          </a:blip>
+          <a:srcRect l="10717" t="6227" r="50650" b="5117"/>
+          <a:stretch/>
+        </p:blipFill>
+        <p:spPr bwMode="auto">
+          <a:xfrm>
+            <a:off x="10287000" y="8764848"/>
+            <a:ext cx="2560320" cy="5085431"/>
+          </a:xfrm>
+          <a:prstGeom prst="rect">
+            <a:avLst/>
+          </a:prstGeom>
+          <a:noFill/>
+          <a:ln>
+            <a:noFill/>
+          </a:ln>
+          <a:extLst>
+            <a:ext uri="{53640926-AAD7-44D8-BBD7-CCE9431645EC}">
+              <a14:shadowObscured xmlns:a14="http://schemas.microsoft.com/office/drawing/2010/main"/>
+            </a:ext>
+          </a:extLst>
+        </p:spPr>
+      </p:pic>
+      <p:pic>
+        <p:nvPicPr>
+          <p:cNvPr id="43" name="Picture 42"/>
+          <p:cNvPicPr/>
+          <p:nvPr/>
+        </p:nvPicPr>
+        <p:blipFill rotWithShape="1">
+          <a:blip r:embed="rId14" cstate="print">
+            <a:extLst>
+              <a:ext uri="{28A0092B-C50C-407E-A947-70E740481C1C}">
+                <a14:useLocalDpi xmlns:a14="http://schemas.microsoft.com/office/drawing/2010/main" val="0"/>
+              </a:ext>
+            </a:extLst>
+          </a:blip>
+          <a:srcRect l="2339" r="-1" b="5214"/>
+          <a:stretch/>
+        </p:blipFill>
+        <p:spPr>
+          <a:xfrm>
+            <a:off x="12847320" y="10439400"/>
+            <a:ext cx="1402080" cy="1330468"/>
+          </a:xfrm>
+          <a:prstGeom prst="rect">
+            <a:avLst/>
+          </a:prstGeom>
+          <a:ln>
+            <a:noFill/>
+          </a:ln>
+        </p:spPr>
+      </p:pic>
+      <mc:AlternateContent xmlns:mc="http://schemas.openxmlformats.org/markup-compatibility/2006">
+        <mc:Choice xmlns:a14="http://schemas.microsoft.com/office/drawing/2010/main" Requires="a14">
+          <p:sp>
+            <p:nvSpPr>
+              <p:cNvPr id="2" name="Rectangle 1"/>
+              <p:cNvSpPr/>
+              <p:nvPr/>
+            </p:nvSpPr>
+            <p:spPr>
+              <a:xfrm>
+                <a:off x="10582043" y="16336028"/>
+                <a:ext cx="3495676" cy="1004121"/>
+              </a:xfrm>
+              <a:prstGeom prst="rect">
+                <a:avLst/>
+              </a:prstGeom>
+            </p:spPr>
+            <p:txBody>
+              <a:bodyPr wrap="square">
+                <a:spAutoFit/>
+              </a:bodyPr>
+              <a:lstStyle/>
+              <a:p>
+                <a14:m>
+                  <m:oMathPara xmlns:m="http://schemas.openxmlformats.org/officeDocument/2006/math">
+                    <m:oMathParaPr>
+                      <m:jc m:val="centerGroup"/>
+                    </m:oMathParaPr>
+                    <m:oMath xmlns:m="http://schemas.openxmlformats.org/officeDocument/2006/math">
+                      <m:sSub>
+                        <m:sSubPr>
+                          <m:ctrlPr>
+                            <a:rPr lang="en-US" sz="2800" i="1" smtClean="0"/>
+                          </m:ctrlPr>
+                        </m:sSubPr>
+                        <m:e>
+                          <m:r>
+                            <a:rPr lang="en-US" sz="2800" i="1"/>
+                            <m:t>𝐽</m:t>
+                          </m:r>
+                        </m:e>
+                        <m:sub>
+                          <m:r>
+                            <a:rPr lang="en-US" sz="2800" i="1"/>
+                            <m:t>𝑖</m:t>
+                          </m:r>
+                          <m:r>
+                            <a:rPr lang="en-US" sz="2800"/>
+                            <m:t>,</m:t>
+                          </m:r>
+                          <m:r>
+                            <a:rPr lang="en-US" sz="2800" i="1"/>
+                            <m:t>𝑗</m:t>
+                          </m:r>
+                        </m:sub>
+                      </m:sSub>
+                      <m:r>
+                        <a:rPr lang="en-US" sz="2800"/>
+                        <m:t>=</m:t>
+                      </m:r>
+                      <m:f>
+                        <m:fPr>
+                          <m:ctrlPr>
+                            <a:rPr lang="en-US" sz="2800" i="1"/>
+                          </m:ctrlPr>
+                        </m:fPr>
+                        <m:num>
+                          <m:r>
+                            <a:rPr lang="en-US" sz="2800" i="1"/>
+                            <m:t>𝛿</m:t>
+                          </m:r>
+                          <m:sSub>
+                            <m:sSubPr>
+                              <m:ctrlPr>
+                                <a:rPr lang="en-US" sz="2800" i="1"/>
+                              </m:ctrlPr>
+                            </m:sSubPr>
+                            <m:e>
+                              <m:r>
+                                <a:rPr lang="en-US" sz="2800" i="1"/>
+                                <m:t>𝐹</m:t>
+                              </m:r>
+                            </m:e>
+                            <m:sub>
+                              <m:r>
+                                <a:rPr lang="en-US" sz="2800" i="1"/>
+                                <m:t>𝑗</m:t>
+                              </m:r>
+                            </m:sub>
+                          </m:sSub>
+                          <m:r>
+                            <a:rPr lang="en-US" sz="2800"/>
+                            <m:t>(</m:t>
+                          </m:r>
+                          <m:sSub>
+                            <m:sSubPr>
+                              <m:ctrlPr>
+                                <a:rPr lang="en-US" sz="2800" i="1"/>
+                              </m:ctrlPr>
+                            </m:sSubPr>
+                            <m:e>
+                              <m:r>
+                                <a:rPr lang="en-US" sz="2800" i="1"/>
+                                <m:t>𝑋</m:t>
+                              </m:r>
+                            </m:e>
+                            <m:sub>
+                              <m:r>
+                                <a:rPr lang="en-US" sz="2800" i="1"/>
+                                <m:t>𝑖</m:t>
+                              </m:r>
+                            </m:sub>
+                          </m:sSub>
+                          <m:r>
+                            <a:rPr lang="en-US" sz="2800"/>
+                            <m:t>)</m:t>
+                          </m:r>
+                        </m:num>
+                        <m:den>
+                          <m:r>
+                            <a:rPr lang="en-US" sz="2800" i="1"/>
+                            <m:t>𝛿</m:t>
+                          </m:r>
+                          <m:sSub>
+                            <m:sSubPr>
+                              <m:ctrlPr>
+                                <a:rPr lang="en-US" sz="2800" i="1"/>
+                              </m:ctrlPr>
+                            </m:sSubPr>
+                            <m:e>
+                              <m:r>
+                                <a:rPr lang="en-US" sz="2800" i="1"/>
+                                <m:t>𝑋</m:t>
+                              </m:r>
+                            </m:e>
+                            <m:sub>
+                              <m:r>
+                                <a:rPr lang="en-US" sz="2800" i="1"/>
+                                <m:t>𝑖</m:t>
+                              </m:r>
+                            </m:sub>
+                          </m:sSub>
+                        </m:den>
+                      </m:f>
+                    </m:oMath>
+                  </m:oMathPara>
+                </a14:m>
+                <a:endParaRPr lang="en-US" sz="2800" dirty="0"/>
+              </a:p>
+            </p:txBody>
+          </p:sp>
+        </mc:Choice>
+        <mc:Fallback>
+          <p:sp>
+            <p:nvSpPr>
+              <p:cNvPr id="2" name="Rectangle 1"/>
+              <p:cNvSpPr>
+                <a:spLocks noRot="1" noChangeAspect="1" noMove="1" noResize="1" noEditPoints="1" noAdjustHandles="1" noChangeArrowheads="1" noChangeShapeType="1" noTextEdit="1"/>
+              </p:cNvSpPr>
+              <p:nvPr/>
+            </p:nvSpPr>
+            <p:spPr>
+              <a:xfrm>
+                <a:off x="10582043" y="16336028"/>
+                <a:ext cx="3495676" cy="1004121"/>
+              </a:xfrm>
+              <a:prstGeom prst="rect">
+                <a:avLst/>
+              </a:prstGeom>
+              <a:blipFill rotWithShape="1">
+                <a:blip r:embed="rId15"/>
+                <a:stretch>
+                  <a:fillRect/>
+                </a:stretch>
+              </a:blipFill>
+            </p:spPr>
+            <p:txBody>
+              <a:bodyPr/>
+              <a:lstStyle/>
+              <a:p>
+                <a:r>
+                  <a:rPr lang="en-US">
+                    <a:noFill/>
+                  </a:rPr>
+                  <a:t> </a:t>
+                </a:r>
+              </a:p>
+            </p:txBody>
+          </p:sp>
+        </mc:Fallback>
+      </mc:AlternateContent>
+      <p:pic>
+        <p:nvPicPr>
+          <p:cNvPr id="47" name="Picture 46"/>
+          <p:cNvPicPr/>
+          <p:nvPr/>
+        </p:nvPicPr>
+        <p:blipFill rotWithShape="1">
+          <a:blip r:embed="rId16">
+            <a:extLst>
+              <a:ext uri="{28A0092B-C50C-407E-A947-70E740481C1C}">
+                <a14:useLocalDpi xmlns:a14="http://schemas.microsoft.com/office/drawing/2010/main" val="0"/>
+              </a:ext>
+            </a:extLst>
+          </a:blip>
+          <a:srcRect l="2508" r="7236"/>
+          <a:stretch/>
+        </p:blipFill>
+        <p:spPr bwMode="auto">
+          <a:xfrm>
+            <a:off x="15087600" y="22634049"/>
+            <a:ext cx="6766559" cy="4852583"/>
+          </a:xfrm>
+          <a:prstGeom prst="rect">
+            <a:avLst/>
+          </a:prstGeom>
+          <a:ln>
+            <a:noFill/>
+          </a:ln>
+          <a:extLst>
+            <a:ext uri="{53640926-AAD7-44D8-BBD7-CCE9431645EC}">
+              <a14:shadowObscured xmlns:a14="http://schemas.microsoft.com/office/drawing/2010/main"/>
+            </a:ext>
+          </a:extLst>
+        </p:spPr>
+      </p:pic>
+      <p:pic>
+        <p:nvPicPr>
+          <p:cNvPr id="48" name="Picture 47"/>
+          <p:cNvPicPr/>
+          <p:nvPr/>
+        </p:nvPicPr>
+        <p:blipFill rotWithShape="1">
+          <a:blip r:embed="rId17">
+            <a:extLst>
+              <a:ext uri="{28A0092B-C50C-407E-A947-70E740481C1C}">
+                <a14:useLocalDpi xmlns:a14="http://schemas.microsoft.com/office/drawing/2010/main" val="0"/>
+              </a:ext>
+            </a:extLst>
+          </a:blip>
+          <a:srcRect l="2224" r="7190"/>
+          <a:stretch/>
+        </p:blipFill>
+        <p:spPr bwMode="auto">
+          <a:xfrm>
+            <a:off x="21852571" y="22634049"/>
+            <a:ext cx="6341429" cy="4852583"/>
+          </a:xfrm>
+          <a:prstGeom prst="rect">
+            <a:avLst/>
+          </a:prstGeom>
+          <a:ln>
+            <a:noFill/>
+          </a:ln>
+          <a:extLst>
+            <a:ext uri="{53640926-AAD7-44D8-BBD7-CCE9431645EC}">
+              <a14:shadowObscured xmlns:a14="http://schemas.microsoft.com/office/drawing/2010/main"/>
+            </a:ext>
+          </a:extLst>
+        </p:spPr>
+      </p:pic>
+      <p:graphicFrame>
+        <p:nvGraphicFramePr>
+          <p:cNvPr id="3" name="Table 2"/>
+          <p:cNvGraphicFramePr>
+            <a:graphicFrameLocks noGrp="1"/>
+          </p:cNvGraphicFramePr>
+          <p:nvPr>
+            <p:extLst>
+              <p:ext uri="{D42A27DB-BD31-4B8C-83A1-F6EECF244321}">
+                <p14:modId xmlns:p14="http://schemas.microsoft.com/office/powerpoint/2010/main" val="2843933924"/>
+              </p:ext>
+            </p:extLst>
+          </p:nvPr>
+        </p:nvGraphicFramePr>
+        <p:xfrm>
+          <a:off x="2316480" y="32689800"/>
+          <a:ext cx="9559291" cy="2438400"/>
+        </p:xfrm>
+        <a:graphic>
+          <a:graphicData uri="http://schemas.openxmlformats.org/drawingml/2006/table">
+            <a:tbl>
+              <a:tblPr firstRow="1" firstCol="1" bandRow="1">
+                <a:tableStyleId>{69012ECD-51FC-41F1-AA8D-1B2483CD663E}</a:tableStyleId>
+              </a:tblPr>
+              <a:tblGrid>
+                <a:gridCol w="2238087"/>
+                <a:gridCol w="2497635"/>
+                <a:gridCol w="2393816"/>
+                <a:gridCol w="2429753"/>
+              </a:tblGrid>
+              <a:tr h="685800">
+                <a:tc>
+                  <a:txBody>
+                    <a:bodyPr/>
+                    <a:lstStyle/>
+                    <a:p>
+                      <a:pPr marL="0" marR="0" algn="ctr" hangingPunct="0">
+                        <a:spcBef>
+                          <a:spcPts val="0"/>
+                        </a:spcBef>
+                        <a:spcAft>
+                          <a:spcPts val="0"/>
+                        </a:spcAft>
+                      </a:pPr>
+                      <a:r>
+                        <a:rPr lang="en-US" sz="2000" dirty="0">
+                          <a:effectLst/>
+                        </a:rPr>
+                        <a:t>Code Version</a:t>
+                      </a:r>
+                      <a:endParaRPr lang="en-US" sz="2000" dirty="0">
+                        <a:effectLst/>
+                        <a:latin typeface="Times New Roman"/>
+                        <a:ea typeface="Times New Roman"/>
+                      </a:endParaRPr>
+                    </a:p>
+                  </a:txBody>
+                  <a:tcPr marL="68580" marR="68580" marT="0" marB="0" anchor="ctr"/>
+                </a:tc>
+                <a:tc>
+                  <a:txBody>
+                    <a:bodyPr/>
+                    <a:lstStyle/>
+                    <a:p>
+                      <a:pPr marL="0" marR="0" algn="ctr" hangingPunct="0">
+                        <a:spcBef>
+                          <a:spcPts val="0"/>
+                        </a:spcBef>
+                        <a:spcAft>
+                          <a:spcPts val="0"/>
+                        </a:spcAft>
+                      </a:pPr>
+                      <a:r>
+                        <a:rPr lang="en-US" sz="2000">
+                          <a:effectLst/>
+                        </a:rPr>
+                        <a:t>Solution Method</a:t>
+                      </a:r>
+                      <a:endParaRPr lang="en-US" sz="2000">
+                        <a:effectLst/>
+                        <a:latin typeface="Times New Roman"/>
+                        <a:ea typeface="Times New Roman"/>
+                      </a:endParaRPr>
+                    </a:p>
+                  </a:txBody>
+                  <a:tcPr marL="68580" marR="68580" marT="0" marB="0" anchor="ctr"/>
+                </a:tc>
+                <a:tc>
+                  <a:txBody>
+                    <a:bodyPr/>
+                    <a:lstStyle/>
+                    <a:p>
+                      <a:pPr marL="0" marR="0" algn="ctr" hangingPunct="0">
+                        <a:spcBef>
+                          <a:spcPts val="0"/>
+                        </a:spcBef>
+                        <a:spcAft>
+                          <a:spcPts val="0"/>
+                        </a:spcAft>
+                      </a:pPr>
+                      <a:r>
+                        <a:rPr lang="en-US" sz="2000">
+                          <a:effectLst/>
+                        </a:rPr>
+                        <a:t>Time Step Size [sec]</a:t>
+                      </a:r>
+                      <a:endParaRPr lang="en-US" sz="2000">
+                        <a:effectLst/>
+                        <a:latin typeface="Times New Roman"/>
+                        <a:ea typeface="Times New Roman"/>
+                      </a:endParaRPr>
+                    </a:p>
+                  </a:txBody>
+                  <a:tcPr marL="68580" marR="68580" marT="0" marB="0" anchor="ctr"/>
+                </a:tc>
+                <a:tc>
+                  <a:txBody>
+                    <a:bodyPr/>
+                    <a:lstStyle/>
+                    <a:p>
+                      <a:pPr marL="0" marR="0" algn="ctr" hangingPunct="0">
+                        <a:spcBef>
+                          <a:spcPts val="0"/>
+                        </a:spcBef>
+                        <a:spcAft>
+                          <a:spcPts val="0"/>
+                        </a:spcAft>
+                      </a:pPr>
+                      <a:r>
+                        <a:rPr lang="en-US" sz="2000" dirty="0">
+                          <a:effectLst/>
+                        </a:rPr>
+                        <a:t>Wall Clock Time [sec]</a:t>
+                      </a:r>
+                      <a:endParaRPr lang="en-US" sz="2000" dirty="0">
+                        <a:effectLst/>
+                        <a:latin typeface="Times New Roman"/>
+                        <a:ea typeface="Times New Roman"/>
+                      </a:endParaRPr>
+                    </a:p>
+                  </a:txBody>
+                  <a:tcPr marL="68580" marR="68580" marT="0" marB="0" anchor="ctr"/>
+                </a:tc>
+              </a:tr>
+              <a:tr h="381000">
+                <a:tc>
+                  <a:txBody>
+                    <a:bodyPr/>
+                    <a:lstStyle/>
+                    <a:p>
+                      <a:pPr marL="0" marR="0" algn="ctr" hangingPunct="0">
+                        <a:spcBef>
+                          <a:spcPts val="0"/>
+                        </a:spcBef>
+                        <a:spcAft>
+                          <a:spcPts val="0"/>
+                        </a:spcAft>
+                      </a:pPr>
+                      <a:r>
+                        <a:rPr lang="en-US" sz="2000" b="0" dirty="0">
+                          <a:effectLst/>
+                        </a:rPr>
+                        <a:t>Original</a:t>
+                      </a:r>
+                      <a:endParaRPr lang="en-US" sz="2000" b="0" dirty="0">
+                        <a:effectLst/>
+                        <a:latin typeface="Times New Roman"/>
+                        <a:ea typeface="Times New Roman"/>
+                      </a:endParaRPr>
+                    </a:p>
+                  </a:txBody>
+                  <a:tcPr marL="68580" marR="68580" marT="0" marB="0" anchor="ctr"/>
+                </a:tc>
+                <a:tc>
+                  <a:txBody>
+                    <a:bodyPr/>
+                    <a:lstStyle/>
+                    <a:p>
+                      <a:pPr marL="0" marR="0" algn="ctr" hangingPunct="0">
+                        <a:spcBef>
+                          <a:spcPts val="0"/>
+                        </a:spcBef>
+                        <a:spcAft>
+                          <a:spcPts val="0"/>
+                        </a:spcAft>
+                      </a:pPr>
+                      <a:r>
+                        <a:rPr lang="en-US" sz="2000">
+                          <a:effectLst/>
+                        </a:rPr>
+                        <a:t>Original Semi-Implicit</a:t>
+                      </a:r>
+                      <a:endParaRPr lang="en-US" sz="2000">
+                        <a:effectLst/>
+                        <a:latin typeface="Times New Roman"/>
+                        <a:ea typeface="Times New Roman"/>
+                      </a:endParaRPr>
+                    </a:p>
+                  </a:txBody>
+                  <a:tcPr marL="68580" marR="68580" marT="0" marB="0" anchor="ctr"/>
+                </a:tc>
+                <a:tc>
+                  <a:txBody>
+                    <a:bodyPr/>
+                    <a:lstStyle/>
+                    <a:p>
+                      <a:pPr marL="0" marR="0" algn="ctr" hangingPunct="0">
+                        <a:spcBef>
+                          <a:spcPts val="0"/>
+                        </a:spcBef>
+                        <a:spcAft>
+                          <a:spcPts val="0"/>
+                        </a:spcAft>
+                      </a:pPr>
+                      <a:r>
+                        <a:rPr lang="en-US" sz="2000">
+                          <a:effectLst/>
+                        </a:rPr>
+                        <a:t>0.05</a:t>
+                      </a:r>
+                      <a:endParaRPr lang="en-US" sz="2000">
+                        <a:effectLst/>
+                        <a:latin typeface="Times New Roman"/>
+                        <a:ea typeface="Times New Roman"/>
+                      </a:endParaRPr>
+                    </a:p>
+                  </a:txBody>
+                  <a:tcPr marL="68580" marR="68580" marT="0" marB="0" anchor="ctr"/>
+                </a:tc>
+                <a:tc>
+                  <a:txBody>
+                    <a:bodyPr/>
+                    <a:lstStyle/>
+                    <a:p>
+                      <a:pPr marL="0" marR="0" algn="ctr" hangingPunct="0">
+                        <a:spcBef>
+                          <a:spcPts val="0"/>
+                        </a:spcBef>
+                        <a:spcAft>
+                          <a:spcPts val="0"/>
+                        </a:spcAft>
+                      </a:pPr>
+                      <a:r>
+                        <a:rPr lang="en-US" sz="2000">
+                          <a:effectLst/>
+                        </a:rPr>
+                        <a:t>2.226</a:t>
+                      </a:r>
+                      <a:endParaRPr lang="en-US" sz="2000">
+                        <a:effectLst/>
+                        <a:latin typeface="Times New Roman"/>
+                        <a:ea typeface="Times New Roman"/>
+                      </a:endParaRPr>
+                    </a:p>
+                  </a:txBody>
+                  <a:tcPr marL="68580" marR="68580" marT="0" marB="0" anchor="ctr"/>
+                </a:tc>
+              </a:tr>
+              <a:tr h="342900">
+                <a:tc>
+                  <a:txBody>
+                    <a:bodyPr/>
+                    <a:lstStyle/>
+                    <a:p>
+                      <a:pPr marL="0" marR="0" algn="ctr" hangingPunct="0">
+                        <a:spcBef>
+                          <a:spcPts val="0"/>
+                        </a:spcBef>
+                        <a:spcAft>
+                          <a:spcPts val="0"/>
+                        </a:spcAft>
+                      </a:pPr>
+                      <a:r>
+                        <a:rPr lang="en-US" sz="2000" b="0" dirty="0">
+                          <a:effectLst/>
+                        </a:rPr>
+                        <a:t>Residual</a:t>
+                      </a:r>
+                      <a:endParaRPr lang="en-US" sz="2000" b="0" dirty="0">
+                        <a:effectLst/>
+                        <a:latin typeface="Times New Roman"/>
+                        <a:ea typeface="Times New Roman"/>
+                      </a:endParaRPr>
+                    </a:p>
+                  </a:txBody>
+                  <a:tcPr marL="68580" marR="68580" marT="0" marB="0" anchor="ctr"/>
+                </a:tc>
+                <a:tc>
+                  <a:txBody>
+                    <a:bodyPr/>
+                    <a:lstStyle/>
+                    <a:p>
+                      <a:pPr marL="0" marR="0" algn="ctr" hangingPunct="0">
+                        <a:spcBef>
+                          <a:spcPts val="0"/>
+                        </a:spcBef>
+                        <a:spcAft>
+                          <a:spcPts val="0"/>
+                        </a:spcAft>
+                      </a:pPr>
+                      <a:r>
+                        <a:rPr lang="en-US" sz="2000">
+                          <a:effectLst/>
+                        </a:rPr>
+                        <a:t>Semi-Implicit</a:t>
+                      </a:r>
+                      <a:endParaRPr lang="en-US" sz="2000">
+                        <a:effectLst/>
+                        <a:latin typeface="Times New Roman"/>
+                        <a:ea typeface="Times New Roman"/>
+                      </a:endParaRPr>
+                    </a:p>
+                  </a:txBody>
+                  <a:tcPr marL="68580" marR="68580" marT="0" marB="0" anchor="ctr"/>
+                </a:tc>
+                <a:tc>
+                  <a:txBody>
+                    <a:bodyPr/>
+                    <a:lstStyle/>
+                    <a:p>
+                      <a:pPr marL="0" marR="0" algn="ctr" hangingPunct="0">
+                        <a:spcBef>
+                          <a:spcPts val="0"/>
+                        </a:spcBef>
+                        <a:spcAft>
+                          <a:spcPts val="0"/>
+                        </a:spcAft>
+                      </a:pPr>
+                      <a:r>
+                        <a:rPr lang="en-US" sz="2000">
+                          <a:effectLst/>
+                        </a:rPr>
+                        <a:t>0.05</a:t>
+                      </a:r>
+                      <a:endParaRPr lang="en-US" sz="2000">
+                        <a:effectLst/>
+                        <a:latin typeface="Times New Roman"/>
+                        <a:ea typeface="Times New Roman"/>
+                      </a:endParaRPr>
+                    </a:p>
+                  </a:txBody>
+                  <a:tcPr marL="68580" marR="68580" marT="0" marB="0" anchor="ctr"/>
+                </a:tc>
+                <a:tc>
+                  <a:txBody>
+                    <a:bodyPr/>
+                    <a:lstStyle/>
+                    <a:p>
+                      <a:pPr marL="0" marR="0" algn="ctr" hangingPunct="0">
+                        <a:spcBef>
+                          <a:spcPts val="0"/>
+                        </a:spcBef>
+                        <a:spcAft>
+                          <a:spcPts val="0"/>
+                        </a:spcAft>
+                      </a:pPr>
+                      <a:r>
+                        <a:rPr lang="en-US" sz="2000">
+                          <a:effectLst/>
+                        </a:rPr>
+                        <a:t>8.591</a:t>
+                      </a:r>
+                      <a:endParaRPr lang="en-US" sz="2000">
+                        <a:effectLst/>
+                        <a:latin typeface="Times New Roman"/>
+                        <a:ea typeface="Times New Roman"/>
+                      </a:endParaRPr>
+                    </a:p>
+                  </a:txBody>
+                  <a:tcPr marL="68580" marR="68580" marT="0" marB="0" anchor="ctr"/>
+                </a:tc>
+              </a:tr>
+              <a:tr h="342900">
+                <a:tc>
+                  <a:txBody>
+                    <a:bodyPr/>
+                    <a:lstStyle/>
+                    <a:p>
+                      <a:pPr marL="0" marR="0" algn="ctr" hangingPunct="0">
+                        <a:spcBef>
+                          <a:spcPts val="0"/>
+                        </a:spcBef>
+                        <a:spcAft>
+                          <a:spcPts val="0"/>
+                        </a:spcAft>
+                      </a:pPr>
+                      <a:r>
+                        <a:rPr lang="en-US" sz="2000" b="0" dirty="0">
+                          <a:effectLst/>
+                        </a:rPr>
+                        <a:t>Residual</a:t>
+                      </a:r>
+                      <a:endParaRPr lang="en-US" sz="2000" b="0" dirty="0">
+                        <a:effectLst/>
+                        <a:latin typeface="Times New Roman"/>
+                        <a:ea typeface="Times New Roman"/>
+                      </a:endParaRPr>
+                    </a:p>
+                  </a:txBody>
+                  <a:tcPr marL="68580" marR="68580" marT="0" marB="0" anchor="ctr"/>
+                </a:tc>
+                <a:tc>
+                  <a:txBody>
+                    <a:bodyPr/>
+                    <a:lstStyle/>
+                    <a:p>
+                      <a:pPr marL="0" marR="0" algn="ctr" hangingPunct="0">
+                        <a:spcBef>
+                          <a:spcPts val="0"/>
+                        </a:spcBef>
+                        <a:spcAft>
+                          <a:spcPts val="0"/>
+                        </a:spcAft>
+                      </a:pPr>
+                      <a:r>
+                        <a:rPr lang="en-US" sz="2000" dirty="0">
+                          <a:effectLst/>
+                        </a:rPr>
+                        <a:t>Implicit</a:t>
+                      </a:r>
+                      <a:endParaRPr lang="en-US" sz="2000" dirty="0">
+                        <a:effectLst/>
+                        <a:latin typeface="Times New Roman"/>
+                        <a:ea typeface="Times New Roman"/>
+                      </a:endParaRPr>
+                    </a:p>
+                  </a:txBody>
+                  <a:tcPr marL="68580" marR="68580" marT="0" marB="0" anchor="ctr"/>
+                </a:tc>
+                <a:tc>
+                  <a:txBody>
+                    <a:bodyPr/>
+                    <a:lstStyle/>
+                    <a:p>
+                      <a:pPr marL="0" marR="0" algn="ctr" hangingPunct="0">
+                        <a:spcBef>
+                          <a:spcPts val="0"/>
+                        </a:spcBef>
+                        <a:spcAft>
+                          <a:spcPts val="0"/>
+                        </a:spcAft>
+                      </a:pPr>
+                      <a:r>
+                        <a:rPr lang="en-US" sz="2000">
+                          <a:effectLst/>
+                        </a:rPr>
+                        <a:t>0.05</a:t>
+                      </a:r>
+                      <a:endParaRPr lang="en-US" sz="2000">
+                        <a:effectLst/>
+                        <a:latin typeface="Times New Roman"/>
+                        <a:ea typeface="Times New Roman"/>
+                      </a:endParaRPr>
+                    </a:p>
+                  </a:txBody>
+                  <a:tcPr marL="68580" marR="68580" marT="0" marB="0" anchor="ctr"/>
+                </a:tc>
+                <a:tc>
+                  <a:txBody>
+                    <a:bodyPr/>
+                    <a:lstStyle/>
+                    <a:p>
+                      <a:pPr marL="0" marR="0" algn="ctr" hangingPunct="0">
+                        <a:spcBef>
+                          <a:spcPts val="0"/>
+                        </a:spcBef>
+                        <a:spcAft>
+                          <a:spcPts val="0"/>
+                        </a:spcAft>
+                      </a:pPr>
+                      <a:r>
+                        <a:rPr lang="en-US" sz="2000">
+                          <a:effectLst/>
+                        </a:rPr>
+                        <a:t>36.709</a:t>
+                      </a:r>
+                      <a:endParaRPr lang="en-US" sz="2000">
+                        <a:effectLst/>
+                        <a:latin typeface="Times New Roman"/>
+                        <a:ea typeface="Times New Roman"/>
+                      </a:endParaRPr>
+                    </a:p>
+                  </a:txBody>
+                  <a:tcPr marL="68580" marR="68580" marT="0" marB="0" anchor="ctr"/>
+                </a:tc>
+              </a:tr>
+              <a:tr h="342900">
+                <a:tc>
+                  <a:txBody>
+                    <a:bodyPr/>
+                    <a:lstStyle/>
+                    <a:p>
+                      <a:pPr marL="0" marR="0" algn="ctr" hangingPunct="0">
+                        <a:spcBef>
+                          <a:spcPts val="0"/>
+                        </a:spcBef>
+                        <a:spcAft>
+                          <a:spcPts val="0"/>
+                        </a:spcAft>
+                      </a:pPr>
+                      <a:r>
+                        <a:rPr lang="en-US" sz="2000" b="0" dirty="0">
+                          <a:effectLst/>
+                        </a:rPr>
+                        <a:t>Residual</a:t>
+                      </a:r>
+                      <a:endParaRPr lang="en-US" sz="2000" b="0" dirty="0">
+                        <a:effectLst/>
+                        <a:latin typeface="Times New Roman"/>
+                        <a:ea typeface="Times New Roman"/>
+                      </a:endParaRPr>
+                    </a:p>
+                  </a:txBody>
+                  <a:tcPr marL="68580" marR="68580" marT="0" marB="0" anchor="ctr"/>
+                </a:tc>
+                <a:tc>
+                  <a:txBody>
+                    <a:bodyPr/>
+                    <a:lstStyle/>
+                    <a:p>
+                      <a:pPr marL="0" marR="0" algn="ctr" hangingPunct="0">
+                        <a:spcBef>
+                          <a:spcPts val="0"/>
+                        </a:spcBef>
+                        <a:spcAft>
+                          <a:spcPts val="0"/>
+                        </a:spcAft>
+                      </a:pPr>
+                      <a:r>
+                        <a:rPr lang="en-US" sz="2000">
+                          <a:effectLst/>
+                        </a:rPr>
+                        <a:t>Implicit</a:t>
+                      </a:r>
+                      <a:endParaRPr lang="en-US" sz="2000">
+                        <a:effectLst/>
+                        <a:latin typeface="Times New Roman"/>
+                        <a:ea typeface="Times New Roman"/>
+                      </a:endParaRPr>
+                    </a:p>
+                  </a:txBody>
+                  <a:tcPr marL="68580" marR="68580" marT="0" marB="0" anchor="ctr"/>
+                </a:tc>
+                <a:tc>
+                  <a:txBody>
+                    <a:bodyPr/>
+                    <a:lstStyle/>
+                    <a:p>
+                      <a:pPr marL="0" marR="0" algn="ctr" hangingPunct="0">
+                        <a:spcBef>
+                          <a:spcPts val="0"/>
+                        </a:spcBef>
+                        <a:spcAft>
+                          <a:spcPts val="0"/>
+                        </a:spcAft>
+                      </a:pPr>
+                      <a:r>
+                        <a:rPr lang="en-US" sz="2000" dirty="0">
+                          <a:effectLst/>
+                        </a:rPr>
+                        <a:t>1.00</a:t>
+                      </a:r>
+                      <a:endParaRPr lang="en-US" sz="2000" dirty="0">
+                        <a:effectLst/>
+                        <a:latin typeface="Times New Roman"/>
+                        <a:ea typeface="Times New Roman"/>
+                      </a:endParaRPr>
+                    </a:p>
+                  </a:txBody>
+                  <a:tcPr marL="68580" marR="68580" marT="0" marB="0" anchor="ctr"/>
+                </a:tc>
+                <a:tc>
+                  <a:txBody>
+                    <a:bodyPr/>
+                    <a:lstStyle/>
+                    <a:p>
+                      <a:pPr marL="0" marR="0" algn="ctr" hangingPunct="0">
+                        <a:spcBef>
+                          <a:spcPts val="0"/>
+                        </a:spcBef>
+                        <a:spcAft>
+                          <a:spcPts val="0"/>
+                        </a:spcAft>
+                      </a:pPr>
+                      <a:r>
+                        <a:rPr lang="en-US" sz="2000">
+                          <a:effectLst/>
+                        </a:rPr>
+                        <a:t>2.377</a:t>
+                      </a:r>
+                      <a:endParaRPr lang="en-US" sz="2000">
+                        <a:effectLst/>
+                        <a:latin typeface="Times New Roman"/>
+                        <a:ea typeface="Times New Roman"/>
+                      </a:endParaRPr>
+                    </a:p>
+                  </a:txBody>
+                  <a:tcPr marL="68580" marR="68580" marT="0" marB="0" anchor="ctr"/>
+                </a:tc>
+              </a:tr>
+              <a:tr h="342900">
+                <a:tc>
+                  <a:txBody>
+                    <a:bodyPr/>
+                    <a:lstStyle/>
+                    <a:p>
+                      <a:pPr marL="0" marR="0" algn="ctr" hangingPunct="0">
+                        <a:spcBef>
+                          <a:spcPts val="0"/>
+                        </a:spcBef>
+                        <a:spcAft>
+                          <a:spcPts val="0"/>
+                        </a:spcAft>
+                      </a:pPr>
+                      <a:r>
+                        <a:rPr lang="en-US" sz="2000" b="0" dirty="0">
+                          <a:effectLst/>
+                        </a:rPr>
+                        <a:t>Residual</a:t>
+                      </a:r>
+                      <a:endParaRPr lang="en-US" sz="2000" b="0" dirty="0">
+                        <a:effectLst/>
+                        <a:latin typeface="Times New Roman"/>
+                        <a:ea typeface="Times New Roman"/>
+                      </a:endParaRPr>
+                    </a:p>
+                  </a:txBody>
+                  <a:tcPr marL="68580" marR="68580" marT="0" marB="0" anchor="ctr"/>
+                </a:tc>
+                <a:tc>
+                  <a:txBody>
+                    <a:bodyPr/>
+                    <a:lstStyle/>
+                    <a:p>
+                      <a:pPr marL="0" marR="0" algn="ctr" hangingPunct="0">
+                        <a:spcBef>
+                          <a:spcPts val="0"/>
+                        </a:spcBef>
+                        <a:spcAft>
+                          <a:spcPts val="0"/>
+                        </a:spcAft>
+                      </a:pPr>
+                      <a:r>
+                        <a:rPr lang="en-US" sz="2000">
+                          <a:effectLst/>
+                        </a:rPr>
+                        <a:t>Implicit</a:t>
+                      </a:r>
+                      <a:endParaRPr lang="en-US" sz="2000">
+                        <a:effectLst/>
+                        <a:latin typeface="Times New Roman"/>
+                        <a:ea typeface="Times New Roman"/>
+                      </a:endParaRPr>
+                    </a:p>
+                  </a:txBody>
+                  <a:tcPr marL="68580" marR="68580" marT="0" marB="0" anchor="ctr"/>
+                </a:tc>
+                <a:tc>
+                  <a:txBody>
+                    <a:bodyPr/>
+                    <a:lstStyle/>
+                    <a:p>
+                      <a:pPr marL="0" marR="0" algn="ctr" hangingPunct="0">
+                        <a:spcBef>
+                          <a:spcPts val="0"/>
+                        </a:spcBef>
+                        <a:spcAft>
+                          <a:spcPts val="0"/>
+                        </a:spcAft>
+                      </a:pPr>
+                      <a:r>
+                        <a:rPr lang="en-US" sz="2000">
+                          <a:effectLst/>
+                        </a:rPr>
+                        <a:t>10.00</a:t>
+                      </a:r>
+                      <a:endParaRPr lang="en-US" sz="2000">
+                        <a:effectLst/>
+                        <a:latin typeface="Times New Roman"/>
+                        <a:ea typeface="Times New Roman"/>
+                      </a:endParaRPr>
+                    </a:p>
+                  </a:txBody>
+                  <a:tcPr marL="68580" marR="68580" marT="0" marB="0" anchor="ctr"/>
+                </a:tc>
+                <a:tc>
+                  <a:txBody>
+                    <a:bodyPr/>
+                    <a:lstStyle/>
+                    <a:p>
+                      <a:pPr marL="0" marR="0" algn="ctr" hangingPunct="0">
+                        <a:spcBef>
+                          <a:spcPts val="0"/>
+                        </a:spcBef>
+                        <a:spcAft>
+                          <a:spcPts val="0"/>
+                        </a:spcAft>
+                      </a:pPr>
+                      <a:r>
+                        <a:rPr lang="en-US" sz="2000" dirty="0">
+                          <a:effectLst/>
+                        </a:rPr>
+                        <a:t>0.622</a:t>
+                      </a:r>
+                      <a:endParaRPr lang="en-US" sz="2000" dirty="0">
+                        <a:effectLst/>
+                        <a:latin typeface="Times New Roman"/>
+                        <a:ea typeface="Times New Roman"/>
+                      </a:endParaRPr>
+                    </a:p>
+                  </a:txBody>
+                  <a:tcPr marL="68580" marR="68580" marT="0" marB="0" anchor="ctr"/>
+                </a:tc>
+              </a:tr>
+            </a:tbl>
+          </a:graphicData>
+        </a:graphic>
+      </p:graphicFrame>
+      <p:pic>
+        <p:nvPicPr>
+          <p:cNvPr id="53" name="Picture 52"/>
+          <p:cNvPicPr/>
+          <p:nvPr/>
+        </p:nvPicPr>
+        <p:blipFill rotWithShape="1">
+          <a:blip r:embed="rId18">
+            <a:extLst>
+              <a:ext uri="{28A0092B-C50C-407E-A947-70E740481C1C}">
+                <a14:useLocalDpi xmlns:a14="http://schemas.microsoft.com/office/drawing/2010/main" val="0"/>
+              </a:ext>
+            </a:extLst>
+          </a:blip>
+          <a:srcRect t="9038" r="8345"/>
+          <a:stretch/>
+        </p:blipFill>
+        <p:spPr bwMode="auto">
+          <a:xfrm>
+            <a:off x="685799" y="23110686"/>
+            <a:ext cx="4762499" cy="4925272"/>
+          </a:xfrm>
+          <a:prstGeom prst="rect">
+            <a:avLst/>
+          </a:prstGeom>
+          <a:ln>
+            <a:noFill/>
+          </a:ln>
+          <a:extLst>
+            <a:ext uri="{53640926-AAD7-44D8-BBD7-CCE9431645EC}">
+              <a14:shadowObscured xmlns:a14="http://schemas.microsoft.com/office/drawing/2010/main"/>
+            </a:ext>
+          </a:extLst>
+        </p:spPr>
+      </p:pic>
+      <p:sp>
+        <p:nvSpPr>
+          <p:cNvPr id="54" name="TextBox 53"/>
+          <p:cNvSpPr txBox="1"/>
+          <p:nvPr/>
+        </p:nvSpPr>
+        <p:spPr>
+          <a:xfrm>
+            <a:off x="8991601" y="8056962"/>
+            <a:ext cx="5391150" cy="707886"/>
+          </a:xfrm>
+          <a:prstGeom prst="rect">
+            <a:avLst/>
+          </a:prstGeom>
+          <a:noFill/>
+        </p:spPr>
+        <p:txBody>
+          <a:bodyPr wrap="square" rtlCol="0">
+            <a:spAutoFit/>
+          </a:bodyPr>
+          <a:lstStyle/>
+          <a:p>
+            <a:pPr algn="ctr"/>
+            <a:r>
+              <a:rPr lang="en-US" sz="4000" b="1" dirty="0" smtClean="0">
+                <a:solidFill>
+                  <a:srgbClr val="003399"/>
+                </a:solidFill>
+              </a:rPr>
+              <a:t>Finite Difference Mesh</a:t>
+            </a:r>
+            <a:endParaRPr lang="en-US" sz="4000" b="1" dirty="0">
+              <a:solidFill>
+                <a:srgbClr val="003399"/>
+              </a:solidFill>
+            </a:endParaRPr>
+          </a:p>
+        </p:txBody>
+      </p:sp>
+      <mc:AlternateContent xmlns:mc="http://schemas.openxmlformats.org/markup-compatibility/2006">
+        <mc:Choice xmlns:a14="http://schemas.microsoft.com/office/drawing/2010/main" Requires="a14">
+          <p:sp>
+            <p:nvSpPr>
+              <p:cNvPr id="4" name="Rectangle 3"/>
+              <p:cNvSpPr/>
+              <p:nvPr/>
+            </p:nvSpPr>
+            <p:spPr>
+              <a:xfrm>
+                <a:off x="10604607" y="17983200"/>
+                <a:ext cx="3478003" cy="819776"/>
+              </a:xfrm>
+              <a:prstGeom prst="rect">
+                <a:avLst/>
+              </a:prstGeom>
+            </p:spPr>
+            <p:txBody>
+              <a:bodyPr wrap="none">
+                <a:spAutoFit/>
+              </a:bodyPr>
+              <a:lstStyle/>
+              <a:p>
+                <a14:m>
+                  <m:oMathPara xmlns:m="http://schemas.openxmlformats.org/officeDocument/2006/math">
+                    <m:oMathParaPr>
+                      <m:jc m:val="centerGroup"/>
+                    </m:oMathParaPr>
+                    <m:oMath xmlns:m="http://schemas.openxmlformats.org/officeDocument/2006/math">
+                      <m:sSub>
+                        <m:sSubPr>
+                          <m:ctrlPr>
+                            <a:rPr lang="en-US" sz="2400" i="1">
+                              <a:latin typeface="Cambria Math"/>
+                            </a:rPr>
+                          </m:ctrlPr>
+                        </m:sSubPr>
+                        <m:e>
+                          <m:r>
+                            <a:rPr lang="en-US" sz="2400" i="1">
+                              <a:latin typeface="Cambria Math"/>
+                            </a:rPr>
+                            <m:t>𝐽</m:t>
+                          </m:r>
+                        </m:e>
+                        <m:sub>
+                          <m:r>
+                            <a:rPr lang="en-US" sz="2400" i="1">
+                              <a:latin typeface="Cambria Math"/>
+                            </a:rPr>
+                            <m:t>𝑖</m:t>
+                          </m:r>
+                          <m:r>
+                            <a:rPr lang="en-US" sz="2400">
+                              <a:latin typeface="Cambria Math"/>
+                            </a:rPr>
+                            <m:t>,</m:t>
+                          </m:r>
+                          <m:r>
+                            <a:rPr lang="en-US" sz="2400" i="1">
+                              <a:latin typeface="Cambria Math"/>
+                            </a:rPr>
+                            <m:t>𝑗</m:t>
+                          </m:r>
+                        </m:sub>
+                      </m:sSub>
+                      <m:r>
+                        <a:rPr lang="en-US" sz="2400">
+                          <a:latin typeface="Cambria Math"/>
+                        </a:rPr>
+                        <m:t>≈</m:t>
+                      </m:r>
+                      <m:f>
+                        <m:fPr>
+                          <m:ctrlPr>
+                            <a:rPr lang="en-US" sz="2400" i="1">
+                              <a:latin typeface="Cambria Math"/>
+                            </a:rPr>
+                          </m:ctrlPr>
+                        </m:fPr>
+                        <m:num>
+                          <m:sSub>
+                            <m:sSubPr>
+                              <m:ctrlPr>
+                                <a:rPr lang="en-US" sz="2400" i="1">
+                                  <a:latin typeface="Cambria Math"/>
+                                </a:rPr>
+                              </m:ctrlPr>
+                            </m:sSubPr>
+                            <m:e>
+                              <m:r>
+                                <a:rPr lang="en-US" sz="2400" i="1">
+                                  <a:latin typeface="Cambria Math"/>
+                                </a:rPr>
+                                <m:t>𝐹</m:t>
+                              </m:r>
+                            </m:e>
+                            <m:sub>
+                              <m:r>
+                                <a:rPr lang="en-US" sz="2400" i="1">
+                                  <a:latin typeface="Cambria Math"/>
+                                </a:rPr>
+                                <m:t>𝑗</m:t>
+                              </m:r>
+                            </m:sub>
+                          </m:sSub>
+                          <m:d>
+                            <m:dPr>
+                              <m:ctrlPr>
+                                <a:rPr lang="en-US" sz="2400" i="1">
+                                  <a:latin typeface="Cambria Math"/>
+                                </a:rPr>
+                              </m:ctrlPr>
+                            </m:dPr>
+                            <m:e>
+                              <m:sSub>
+                                <m:sSubPr>
+                                  <m:ctrlPr>
+                                    <a:rPr lang="en-US" sz="2400" i="1">
+                                      <a:latin typeface="Cambria Math"/>
+                                    </a:rPr>
+                                  </m:ctrlPr>
+                                </m:sSubPr>
+                                <m:e>
+                                  <m:r>
+                                    <a:rPr lang="en-US" sz="2400" i="1">
+                                      <a:latin typeface="Cambria Math"/>
+                                    </a:rPr>
+                                    <m:t>𝑋</m:t>
+                                  </m:r>
+                                </m:e>
+                                <m:sub>
+                                  <m:r>
+                                    <a:rPr lang="en-US" sz="2400" i="1">
+                                      <a:latin typeface="Cambria Math"/>
+                                    </a:rPr>
+                                    <m:t>𝑖</m:t>
+                                  </m:r>
+                                </m:sub>
+                              </m:sSub>
+                              <m:r>
+                                <a:rPr lang="en-US" sz="2400">
+                                  <a:latin typeface="Cambria Math"/>
+                                </a:rPr>
+                                <m:t>+</m:t>
+                              </m:r>
+                              <m:r>
+                                <a:rPr lang="en-US" sz="2400" i="1">
+                                  <a:latin typeface="Cambria Math"/>
+                                </a:rPr>
+                                <m:t>𝜖</m:t>
+                              </m:r>
+                            </m:e>
+                          </m:d>
+                          <m:r>
+                            <a:rPr lang="en-US" sz="2400" i="1">
+                              <a:latin typeface="Cambria Math"/>
+                            </a:rPr>
+                            <m:t>−</m:t>
+                          </m:r>
+                          <m:sSub>
+                            <m:sSubPr>
+                              <m:ctrlPr>
+                                <a:rPr lang="en-US" sz="2400" i="1">
+                                  <a:latin typeface="Cambria Math"/>
+                                </a:rPr>
+                              </m:ctrlPr>
+                            </m:sSubPr>
+                            <m:e>
+                              <m:r>
+                                <a:rPr lang="en-US" sz="2400" i="1">
+                                  <a:latin typeface="Cambria Math"/>
+                                </a:rPr>
+                                <m:t>𝐹</m:t>
+                              </m:r>
+                            </m:e>
+                            <m:sub>
+                              <m:r>
+                                <a:rPr lang="en-US" sz="2400" i="1">
+                                  <a:latin typeface="Cambria Math"/>
+                                </a:rPr>
+                                <m:t>𝑗</m:t>
+                              </m:r>
+                            </m:sub>
+                          </m:sSub>
+                          <m:d>
+                            <m:dPr>
+                              <m:ctrlPr>
+                                <a:rPr lang="en-US" sz="2400" i="1">
+                                  <a:latin typeface="Cambria Math"/>
+                                </a:rPr>
+                              </m:ctrlPr>
+                            </m:dPr>
+                            <m:e>
+                              <m:sSub>
+                                <m:sSubPr>
+                                  <m:ctrlPr>
+                                    <a:rPr lang="en-US" sz="2400" i="1">
+                                      <a:latin typeface="Cambria Math"/>
+                                    </a:rPr>
+                                  </m:ctrlPr>
+                                </m:sSubPr>
+                                <m:e>
+                                  <m:r>
+                                    <a:rPr lang="en-US" sz="2400" i="1">
+                                      <a:latin typeface="Cambria Math"/>
+                                    </a:rPr>
+                                    <m:t>𝑋</m:t>
+                                  </m:r>
+                                </m:e>
+                                <m:sub>
+                                  <m:r>
+                                    <a:rPr lang="en-US" sz="2400" i="1">
+                                      <a:latin typeface="Cambria Math"/>
+                                    </a:rPr>
+                                    <m:t>𝑖</m:t>
+                                  </m:r>
+                                </m:sub>
+                              </m:sSub>
+                            </m:e>
+                          </m:d>
+                        </m:num>
+                        <m:den>
+                          <m:r>
+                            <a:rPr lang="en-US" sz="2400" i="1">
+                              <a:latin typeface="Cambria Math"/>
+                            </a:rPr>
+                            <m:t>𝜖</m:t>
+                          </m:r>
+                        </m:den>
+                      </m:f>
+                    </m:oMath>
+                  </m:oMathPara>
+                </a14:m>
+                <a:endParaRPr lang="en-US" sz="2400" dirty="0"/>
+              </a:p>
+            </p:txBody>
+          </p:sp>
+        </mc:Choice>
+        <mc:Fallback>
+          <p:sp>
+            <p:nvSpPr>
+              <p:cNvPr id="4" name="Rectangle 3"/>
+              <p:cNvSpPr>
+                <a:spLocks noRot="1" noChangeAspect="1" noMove="1" noResize="1" noEditPoints="1" noAdjustHandles="1" noChangeArrowheads="1" noChangeShapeType="1" noTextEdit="1"/>
+              </p:cNvSpPr>
+              <p:nvPr/>
+            </p:nvSpPr>
+            <p:spPr>
+              <a:xfrm>
+                <a:off x="10604607" y="17983200"/>
+                <a:ext cx="3478003" cy="819776"/>
+              </a:xfrm>
+              <a:prstGeom prst="rect">
+                <a:avLst/>
+              </a:prstGeom>
+              <a:blipFill rotWithShape="1">
+                <a:blip r:embed="rId19"/>
+                <a:stretch>
+                  <a:fillRect/>
+                </a:stretch>
+              </a:blipFill>
+            </p:spPr>
+            <p:txBody>
+              <a:bodyPr/>
+              <a:lstStyle/>
+              <a:p>
+                <a:r>
+                  <a:rPr lang="en-US">
+                    <a:noFill/>
+                  </a:rPr>
+                  <a:t> </a:t>
+                </a:r>
+              </a:p>
+            </p:txBody>
+          </p:sp>
+        </mc:Fallback>
+      </mc:AlternateContent>
+      <p:sp>
+        <p:nvSpPr>
+          <p:cNvPr id="55" name="TextBox 54"/>
+          <p:cNvSpPr txBox="1"/>
+          <p:nvPr/>
+        </p:nvSpPr>
+        <p:spPr>
+          <a:xfrm>
+            <a:off x="10604607" y="14677768"/>
+            <a:ext cx="3352800" cy="1323439"/>
+          </a:xfrm>
+          <a:prstGeom prst="rect">
+            <a:avLst/>
+          </a:prstGeom>
+          <a:noFill/>
+        </p:spPr>
+        <p:txBody>
+          <a:bodyPr wrap="square" rtlCol="0">
+            <a:spAutoFit/>
+          </a:bodyPr>
+          <a:lstStyle/>
+          <a:p>
+            <a:pPr algn="ctr"/>
+            <a:r>
+              <a:rPr lang="en-US" sz="4000" b="1" dirty="0" smtClean="0">
+                <a:solidFill>
+                  <a:srgbClr val="003399"/>
+                </a:solidFill>
+              </a:rPr>
+              <a:t>Matrix</a:t>
+            </a:r>
+            <a:br>
+              <a:rPr lang="en-US" sz="4000" b="1" dirty="0" smtClean="0">
+                <a:solidFill>
+                  <a:srgbClr val="003399"/>
+                </a:solidFill>
+              </a:rPr>
+            </a:br>
+            <a:r>
+              <a:rPr lang="en-US" sz="4000" b="1" dirty="0" smtClean="0">
+                <a:solidFill>
+                  <a:srgbClr val="003399"/>
+                </a:solidFill>
+              </a:rPr>
+              <a:t>Construction</a:t>
+            </a:r>
+            <a:endParaRPr lang="en-US" sz="4000" b="1" dirty="0">
+              <a:solidFill>
+                <a:srgbClr val="003399"/>
+              </a:solidFill>
+            </a:endParaRPr>
+          </a:p>
+        </p:txBody>
+      </p:sp>
+      <p:sp>
+        <p:nvSpPr>
+          <p:cNvPr id="57" name="TextBox 56"/>
+          <p:cNvSpPr txBox="1"/>
+          <p:nvPr/>
+        </p:nvSpPr>
+        <p:spPr>
+          <a:xfrm>
+            <a:off x="5834396" y="13850279"/>
+            <a:ext cx="4615205" cy="707886"/>
+          </a:xfrm>
+          <a:prstGeom prst="rect">
+            <a:avLst/>
+          </a:prstGeom>
+          <a:noFill/>
+        </p:spPr>
+        <p:txBody>
+          <a:bodyPr wrap="square" rtlCol="0">
+            <a:spAutoFit/>
+          </a:bodyPr>
+          <a:lstStyle/>
+          <a:p>
+            <a:pPr algn="ctr"/>
+            <a:r>
+              <a:rPr lang="en-US" sz="4000" b="1" dirty="0" smtClean="0">
+                <a:solidFill>
+                  <a:srgbClr val="003399"/>
+                </a:solidFill>
+              </a:rPr>
+              <a:t>Coupled Jacobian</a:t>
+            </a:r>
+            <a:endParaRPr lang="en-US" sz="4000" b="1" dirty="0">
+              <a:solidFill>
+                <a:srgbClr val="003399"/>
+              </a:solidFill>
+            </a:endParaRPr>
+          </a:p>
+        </p:txBody>
+      </p:sp>
+      <p:sp>
+        <p:nvSpPr>
+          <p:cNvPr id="59" name="TextBox 58"/>
+          <p:cNvSpPr txBox="1"/>
+          <p:nvPr/>
+        </p:nvSpPr>
+        <p:spPr>
+          <a:xfrm>
+            <a:off x="5638801" y="22250400"/>
+            <a:ext cx="8318606" cy="707886"/>
+          </a:xfrm>
+          <a:prstGeom prst="rect">
+            <a:avLst/>
+          </a:prstGeom>
+          <a:noFill/>
+        </p:spPr>
+        <p:txBody>
+          <a:bodyPr wrap="square" rtlCol="0">
+            <a:spAutoFit/>
+          </a:bodyPr>
+          <a:lstStyle/>
+          <a:p>
+            <a:pPr algn="ctr"/>
+            <a:r>
+              <a:rPr lang="en-US" sz="4000" b="1" dirty="0" smtClean="0">
+                <a:solidFill>
+                  <a:srgbClr val="003399"/>
+                </a:solidFill>
+              </a:rPr>
+              <a:t>Relative Rod Temperature</a:t>
+            </a:r>
+            <a:endParaRPr lang="en-US" sz="4000" b="1" dirty="0">
+              <a:solidFill>
+                <a:srgbClr val="003399"/>
+              </a:solidFill>
+            </a:endParaRPr>
+          </a:p>
+        </p:txBody>
+      </p:sp>
+      <p:sp>
+        <p:nvSpPr>
+          <p:cNvPr id="61" name="TextBox 60"/>
+          <p:cNvSpPr txBox="1"/>
+          <p:nvPr/>
+        </p:nvSpPr>
+        <p:spPr>
+          <a:xfrm>
+            <a:off x="15488711" y="12794754"/>
+            <a:ext cx="6705600" cy="707886"/>
+          </a:xfrm>
+          <a:prstGeom prst="rect">
+            <a:avLst/>
+          </a:prstGeom>
+          <a:noFill/>
+        </p:spPr>
+        <p:txBody>
+          <a:bodyPr wrap="square" rtlCol="0">
+            <a:spAutoFit/>
+          </a:bodyPr>
+          <a:lstStyle/>
+          <a:p>
+            <a:pPr algn="ctr"/>
+            <a:r>
+              <a:rPr lang="en-US" sz="4000" b="1" dirty="0" smtClean="0">
+                <a:solidFill>
+                  <a:srgbClr val="003399"/>
+                </a:solidFill>
+              </a:rPr>
+              <a:t>Analytical Result</a:t>
+            </a:r>
+            <a:endParaRPr lang="en-US" sz="4000" b="1" dirty="0">
+              <a:solidFill>
+                <a:srgbClr val="003399"/>
+              </a:solidFill>
+            </a:endParaRPr>
+          </a:p>
+        </p:txBody>
+      </p:sp>
+      <mc:AlternateContent xmlns:mc="http://schemas.openxmlformats.org/markup-compatibility/2006">
+        <mc:Choice xmlns:a14="http://schemas.microsoft.com/office/drawing/2010/main" Requires="a14">
+          <p:sp>
+            <p:nvSpPr>
+              <p:cNvPr id="67" name="TextBox 66"/>
+              <p:cNvSpPr txBox="1"/>
+              <p:nvPr/>
+            </p:nvSpPr>
+            <p:spPr>
+              <a:xfrm>
+                <a:off x="14951794" y="13502640"/>
+                <a:ext cx="6268511" cy="1060483"/>
+              </a:xfrm>
+              <a:prstGeom prst="rect">
+                <a:avLst/>
+              </a:prstGeom>
+              <a:noFill/>
+            </p:spPr>
+            <p:txBody>
+              <a:bodyPr wrap="none" rtlCol="0">
+                <a:spAutoFit/>
+              </a:bodyPr>
+              <a:lstStyle/>
+              <a:p>
+                <a14:m>
+                  <m:oMath xmlns:m="http://schemas.openxmlformats.org/officeDocument/2006/math">
+                    <m:r>
+                      <a:rPr lang="en-US" sz="2800" i="1">
+                        <a:latin typeface="Cambria Math"/>
+                      </a:rPr>
+                      <m:t>𝑇</m:t>
+                    </m:r>
+                    <m:d>
+                      <m:dPr>
+                        <m:ctrlPr>
+                          <a:rPr lang="en-US" sz="2800" i="1">
+                            <a:latin typeface="Cambria Math"/>
+                          </a:rPr>
+                        </m:ctrlPr>
+                      </m:dPr>
+                      <m:e>
+                        <m:r>
+                          <a:rPr lang="en-US" sz="2800" i="1">
+                            <a:latin typeface="Cambria Math"/>
+                          </a:rPr>
+                          <m:t>𝑟</m:t>
+                        </m:r>
+                        <m:r>
+                          <a:rPr lang="en-US" sz="2800">
+                            <a:latin typeface="Cambria Math"/>
+                          </a:rPr>
+                          <m:t>,</m:t>
+                        </m:r>
+                        <m:r>
+                          <a:rPr lang="en-US" sz="2800" i="1">
+                            <a:latin typeface="Cambria Math"/>
+                          </a:rPr>
+                          <m:t>𝑧</m:t>
+                        </m:r>
+                      </m:e>
+                    </m:d>
+                    <m:r>
+                      <a:rPr lang="en-US" sz="2800" i="1" smtClean="0">
+                        <a:latin typeface="Cambria Math"/>
+                      </a:rPr>
+                      <m:t>−</m:t>
+                    </m:r>
+                    <m:r>
+                      <a:rPr lang="en-US" sz="2800" i="1" smtClean="0">
+                        <a:latin typeface="Cambria Math"/>
+                      </a:rPr>
+                      <m:t>𝑇</m:t>
+                    </m:r>
+                    <m:d>
+                      <m:dPr>
+                        <m:ctrlPr>
+                          <a:rPr lang="en-US" sz="2800" i="1">
+                            <a:latin typeface="Cambria Math"/>
+                          </a:rPr>
+                        </m:ctrlPr>
+                      </m:dPr>
+                      <m:e>
+                        <m:sSub>
+                          <m:sSubPr>
+                            <m:ctrlPr>
+                              <a:rPr lang="en-US" sz="2800" i="1">
+                                <a:latin typeface="Cambria Math"/>
+                              </a:rPr>
+                            </m:ctrlPr>
+                          </m:sSubPr>
+                          <m:e>
+                            <m:r>
+                              <a:rPr lang="en-US" sz="2800" i="1">
+                                <a:latin typeface="Cambria Math"/>
+                              </a:rPr>
+                              <m:t>𝑟</m:t>
+                            </m:r>
+                          </m:e>
+                          <m:sub>
+                            <m:r>
+                              <a:rPr lang="en-US" sz="2800" i="1">
+                                <a:latin typeface="Cambria Math"/>
+                              </a:rPr>
+                              <m:t>𝑓𝑢𝑒𝑙</m:t>
+                            </m:r>
+                          </m:sub>
+                        </m:sSub>
+                        <m:r>
+                          <a:rPr lang="en-US" sz="2800" i="1">
+                            <a:latin typeface="Cambria Math"/>
+                          </a:rPr>
+                          <m:t>,</m:t>
+                        </m:r>
+                        <m:r>
+                          <a:rPr lang="en-US" sz="2800" i="1">
+                            <a:latin typeface="Cambria Math"/>
+                          </a:rPr>
+                          <m:t>𝑧</m:t>
+                        </m:r>
+                      </m:e>
+                    </m:d>
+                    <m:r>
+                      <a:rPr lang="en-US" sz="2800">
+                        <a:latin typeface="Cambria Math"/>
+                      </a:rPr>
+                      <m:t>=</m:t>
+                    </m:r>
+                    <m:f>
+                      <m:fPr>
+                        <m:ctrlPr>
+                          <a:rPr lang="en-US" sz="2800" i="1">
+                            <a:latin typeface="Cambria Math"/>
+                          </a:rPr>
+                        </m:ctrlPr>
+                      </m:fPr>
+                      <m:num>
+                        <m:sSup>
+                          <m:sSupPr>
+                            <m:ctrlPr>
+                              <a:rPr lang="en-US" sz="2800" i="1">
+                                <a:latin typeface="Cambria Math"/>
+                              </a:rPr>
+                            </m:ctrlPr>
+                          </m:sSupPr>
+                          <m:e>
+                            <m:r>
+                              <a:rPr lang="en-US" sz="2800" i="1">
+                                <a:latin typeface="Cambria Math"/>
+                              </a:rPr>
+                              <m:t>𝑞</m:t>
+                            </m:r>
+                          </m:e>
+                          <m:sup>
+                            <m:r>
+                              <a:rPr lang="en-US" sz="2800" i="1">
+                                <a:latin typeface="Cambria Math"/>
+                              </a:rPr>
+                              <m:t>′′′</m:t>
+                            </m:r>
+                          </m:sup>
+                        </m:sSup>
+                        <m:r>
+                          <a:rPr lang="en-US" sz="2800">
+                            <a:latin typeface="Cambria Math"/>
+                          </a:rPr>
+                          <m:t> </m:t>
+                        </m:r>
+                        <m:sSubSup>
+                          <m:sSubSupPr>
+                            <m:ctrlPr>
+                              <a:rPr lang="en-US" sz="2800" i="1">
+                                <a:latin typeface="Cambria Math"/>
+                              </a:rPr>
+                            </m:ctrlPr>
+                          </m:sSubSupPr>
+                          <m:e>
+                            <m:r>
+                              <a:rPr lang="en-US" sz="2800" i="1">
+                                <a:latin typeface="Cambria Math"/>
+                              </a:rPr>
+                              <m:t>𝑟</m:t>
+                            </m:r>
+                          </m:e>
+                          <m:sub>
+                            <m:r>
+                              <a:rPr lang="en-US" sz="2800" i="1">
+                                <a:latin typeface="Cambria Math"/>
+                              </a:rPr>
+                              <m:t>𝑓𝑢𝑒𝑙</m:t>
+                            </m:r>
+                          </m:sub>
+                          <m:sup>
+                            <m:r>
+                              <a:rPr lang="en-US" sz="2800">
+                                <a:latin typeface="Cambria Math"/>
+                              </a:rPr>
+                              <m:t>2</m:t>
+                            </m:r>
+                          </m:sup>
+                        </m:sSubSup>
+                      </m:num>
+                      <m:den>
+                        <m:r>
+                          <a:rPr lang="en-US" sz="2800">
+                            <a:latin typeface="Cambria Math"/>
+                          </a:rPr>
+                          <m:t>4 </m:t>
+                        </m:r>
+                        <m:sSub>
+                          <m:sSubPr>
+                            <m:ctrlPr>
+                              <a:rPr lang="en-US" sz="2800" i="1">
+                                <a:latin typeface="Cambria Math"/>
+                              </a:rPr>
+                            </m:ctrlPr>
+                          </m:sSubPr>
+                          <m:e>
+                            <m:r>
+                              <a:rPr lang="en-US" sz="2800" i="1">
+                                <a:latin typeface="Cambria Math"/>
+                              </a:rPr>
+                              <m:t>𝑘</m:t>
+                            </m:r>
+                          </m:e>
+                          <m:sub>
+                            <m:r>
+                              <a:rPr lang="en-US" sz="2800" i="1">
+                                <a:latin typeface="Cambria Math"/>
+                              </a:rPr>
+                              <m:t>𝑓𝑢𝑒𝑙</m:t>
+                            </m:r>
+                          </m:sub>
+                        </m:sSub>
+                      </m:den>
+                    </m:f>
+                    <m:d>
+                      <m:dPr>
+                        <m:ctrlPr>
+                          <a:rPr lang="en-US" sz="2800" i="1">
+                            <a:latin typeface="Cambria Math"/>
+                          </a:rPr>
+                        </m:ctrlPr>
+                      </m:dPr>
+                      <m:e>
+                        <m:r>
+                          <a:rPr lang="en-US" sz="2800">
+                            <a:latin typeface="Cambria Math"/>
+                          </a:rPr>
+                          <m:t>1</m:t>
+                        </m:r>
+                        <m:r>
+                          <a:rPr lang="en-US" sz="2800" i="1">
+                            <a:latin typeface="Cambria Math"/>
+                          </a:rPr>
+                          <m:t>−</m:t>
+                        </m:r>
+                        <m:f>
+                          <m:fPr>
+                            <m:ctrlPr>
+                              <a:rPr lang="en-US" sz="2800" i="1">
+                                <a:latin typeface="Cambria Math"/>
+                              </a:rPr>
+                            </m:ctrlPr>
+                          </m:fPr>
+                          <m:num>
+                            <m:sSup>
+                              <m:sSupPr>
+                                <m:ctrlPr>
+                                  <a:rPr lang="en-US" sz="2800" i="1">
+                                    <a:latin typeface="Cambria Math"/>
+                                  </a:rPr>
+                                </m:ctrlPr>
+                              </m:sSupPr>
+                              <m:e>
+                                <m:r>
+                                  <a:rPr lang="en-US" sz="2800" i="1">
+                                    <a:latin typeface="Cambria Math"/>
+                                  </a:rPr>
+                                  <m:t>𝑟</m:t>
+                                </m:r>
+                              </m:e>
+                              <m:sup>
+                                <m:r>
+                                  <a:rPr lang="en-US" sz="2800">
+                                    <a:latin typeface="Cambria Math"/>
+                                  </a:rPr>
+                                  <m:t>2</m:t>
+                                </m:r>
+                              </m:sup>
+                            </m:sSup>
+                          </m:num>
+                          <m:den>
+                            <m:sSubSup>
+                              <m:sSubSupPr>
+                                <m:ctrlPr>
+                                  <a:rPr lang="en-US" sz="2800" i="1">
+                                    <a:latin typeface="Cambria Math"/>
+                                  </a:rPr>
+                                </m:ctrlPr>
+                              </m:sSubSupPr>
+                              <m:e>
+                                <m:r>
+                                  <a:rPr lang="en-US" sz="2800" i="1">
+                                    <a:latin typeface="Cambria Math"/>
+                                  </a:rPr>
+                                  <m:t>𝑟</m:t>
+                                </m:r>
+                              </m:e>
+                              <m:sub>
+                                <m:r>
+                                  <a:rPr lang="en-US" sz="2800" i="1">
+                                    <a:latin typeface="Cambria Math"/>
+                                  </a:rPr>
+                                  <m:t>𝑓𝑢𝑒𝑙</m:t>
+                                </m:r>
+                              </m:sub>
+                              <m:sup>
+                                <m:r>
+                                  <a:rPr lang="en-US" sz="2800">
+                                    <a:latin typeface="Cambria Math"/>
+                                  </a:rPr>
+                                  <m:t>2</m:t>
+                                </m:r>
+                              </m:sup>
+                            </m:sSubSup>
+                          </m:den>
+                        </m:f>
+                      </m:e>
+                    </m:d>
+                  </m:oMath>
+                </a14:m>
+                <a:r>
+                  <a:rPr lang="en-US" sz="2800" b="1" dirty="0"/>
+                  <a:t> </a:t>
+                </a:r>
+                <a:endParaRPr lang="en-US" sz="2600" dirty="0"/>
+              </a:p>
+            </p:txBody>
+          </p:sp>
+        </mc:Choice>
+        <mc:Fallback>
+          <p:sp>
+            <p:nvSpPr>
+              <p:cNvPr id="67" name="TextBox 66"/>
+              <p:cNvSpPr txBox="1">
+                <a:spLocks noRot="1" noChangeAspect="1" noMove="1" noResize="1" noEditPoints="1" noAdjustHandles="1" noChangeArrowheads="1" noChangeShapeType="1" noTextEdit="1"/>
+              </p:cNvSpPr>
+              <p:nvPr/>
+            </p:nvSpPr>
+            <p:spPr>
+              <a:xfrm>
+                <a:off x="14951794" y="13502640"/>
+                <a:ext cx="6268511" cy="1060483"/>
+              </a:xfrm>
+              <a:prstGeom prst="rect">
+                <a:avLst/>
+              </a:prstGeom>
+              <a:blipFill rotWithShape="1">
+                <a:blip r:embed="rId20"/>
+                <a:stretch>
+                  <a:fillRect r="-584"/>
+                </a:stretch>
+              </a:blipFill>
+            </p:spPr>
+            <p:txBody>
+              <a:bodyPr/>
+              <a:lstStyle/>
+              <a:p>
+                <a:r>
+                  <a:rPr lang="en-US">
+                    <a:noFill/>
+                  </a:rPr>
+                  <a:t> </a:t>
+                </a:r>
+              </a:p>
+            </p:txBody>
+          </p:sp>
+        </mc:Fallback>
+      </mc:AlternateContent>
+      <p:sp>
+        <p:nvSpPr>
+          <p:cNvPr id="68" name="TextBox 67"/>
+          <p:cNvSpPr txBox="1"/>
+          <p:nvPr/>
+        </p:nvSpPr>
+        <p:spPr>
+          <a:xfrm>
+            <a:off x="228600" y="22250400"/>
+            <a:ext cx="5219698" cy="707886"/>
+          </a:xfrm>
+          <a:prstGeom prst="rect">
+            <a:avLst/>
+          </a:prstGeom>
+          <a:noFill/>
+        </p:spPr>
+        <p:txBody>
+          <a:bodyPr wrap="square" rtlCol="0">
+            <a:spAutoFit/>
+          </a:bodyPr>
+          <a:lstStyle/>
+          <a:p>
+            <a:pPr algn="ctr"/>
+            <a:r>
+              <a:rPr lang="en-US" sz="4000" b="1" dirty="0" smtClean="0">
+                <a:solidFill>
+                  <a:srgbClr val="003399"/>
+                </a:solidFill>
+              </a:rPr>
+              <a:t>Rod Temperature</a:t>
+            </a:r>
+            <a:endParaRPr lang="en-US" sz="4000" b="1" dirty="0">
+              <a:solidFill>
+                <a:srgbClr val="003399"/>
+              </a:solidFill>
+            </a:endParaRPr>
+          </a:p>
+        </p:txBody>
+      </p:sp>
+      <p:sp>
+        <p:nvSpPr>
+          <p:cNvPr id="69" name="TextBox 68"/>
+          <p:cNvSpPr txBox="1"/>
+          <p:nvPr/>
+        </p:nvSpPr>
+        <p:spPr>
+          <a:xfrm>
+            <a:off x="15606821" y="21978610"/>
+            <a:ext cx="5219698" cy="707886"/>
+          </a:xfrm>
+          <a:prstGeom prst="rect">
+            <a:avLst/>
+          </a:prstGeom>
+          <a:noFill/>
+        </p:spPr>
+        <p:txBody>
+          <a:bodyPr wrap="square" rtlCol="0">
+            <a:spAutoFit/>
+          </a:bodyPr>
+          <a:lstStyle/>
+          <a:p>
+            <a:pPr algn="ctr"/>
+            <a:r>
+              <a:rPr lang="en-US" sz="4000" b="1" dirty="0" smtClean="0">
+                <a:solidFill>
+                  <a:srgbClr val="003399"/>
+                </a:solidFill>
+              </a:rPr>
+              <a:t>Semi-Implicit</a:t>
+            </a:r>
+            <a:endParaRPr lang="en-US" sz="4000" b="1" dirty="0">
+              <a:solidFill>
+                <a:srgbClr val="003399"/>
+              </a:solidFill>
+            </a:endParaRPr>
+          </a:p>
+        </p:txBody>
+      </p:sp>
+      <p:sp>
+        <p:nvSpPr>
+          <p:cNvPr id="70" name="TextBox 69"/>
+          <p:cNvSpPr txBox="1"/>
+          <p:nvPr/>
+        </p:nvSpPr>
+        <p:spPr>
+          <a:xfrm>
+            <a:off x="22413436" y="21978610"/>
+            <a:ext cx="5219698" cy="707886"/>
+          </a:xfrm>
+          <a:prstGeom prst="rect">
+            <a:avLst/>
+          </a:prstGeom>
+          <a:noFill/>
+        </p:spPr>
+        <p:txBody>
+          <a:bodyPr wrap="square" rtlCol="0">
+            <a:spAutoFit/>
+          </a:bodyPr>
+          <a:lstStyle/>
+          <a:p>
+            <a:pPr algn="ctr"/>
+            <a:r>
+              <a:rPr lang="en-US" sz="4000" b="1" dirty="0" smtClean="0">
+                <a:solidFill>
+                  <a:srgbClr val="003399"/>
+                </a:solidFill>
+              </a:rPr>
+              <a:t>Implicit</a:t>
+            </a:r>
+            <a:endParaRPr lang="en-US" sz="4000" b="1" dirty="0">
+              <a:solidFill>
+                <a:srgbClr val="003399"/>
+              </a:solidFill>
+            </a:endParaRPr>
+          </a:p>
+        </p:txBody>
+      </p:sp>
+      <p:sp>
+        <p:nvSpPr>
+          <p:cNvPr id="75" name="TextBox 74"/>
+          <p:cNvSpPr txBox="1"/>
+          <p:nvPr/>
+        </p:nvSpPr>
+        <p:spPr>
+          <a:xfrm>
+            <a:off x="1568511" y="28668166"/>
+            <a:ext cx="10712495" cy="707886"/>
+          </a:xfrm>
+          <a:prstGeom prst="rect">
+            <a:avLst/>
+          </a:prstGeom>
+          <a:noFill/>
+        </p:spPr>
+        <p:txBody>
+          <a:bodyPr wrap="square" rtlCol="0">
+            <a:spAutoFit/>
+          </a:bodyPr>
+          <a:lstStyle/>
+          <a:p>
+            <a:pPr algn="ctr"/>
+            <a:r>
+              <a:rPr lang="en-US" sz="4000" b="1" dirty="0" smtClean="0">
+                <a:solidFill>
+                  <a:srgbClr val="003399"/>
+                </a:solidFill>
+              </a:rPr>
+              <a:t>Convergence of Finite Difference Solution</a:t>
+            </a:r>
+            <a:endParaRPr lang="en-US" sz="4000" b="1" dirty="0">
+              <a:solidFill>
+                <a:srgbClr val="003399"/>
+              </a:solidFill>
+            </a:endParaRPr>
+          </a:p>
+        </p:txBody>
+      </p:sp>
+      <p:sp>
+        <p:nvSpPr>
+          <p:cNvPr id="76" name="TextBox 75"/>
+          <p:cNvSpPr txBox="1"/>
+          <p:nvPr/>
+        </p:nvSpPr>
+        <p:spPr>
+          <a:xfrm>
+            <a:off x="1545651" y="31662737"/>
+            <a:ext cx="10712495" cy="707886"/>
+          </a:xfrm>
+          <a:prstGeom prst="rect">
+            <a:avLst/>
+          </a:prstGeom>
+          <a:noFill/>
+        </p:spPr>
+        <p:txBody>
+          <a:bodyPr wrap="square" rtlCol="0">
+            <a:spAutoFit/>
+          </a:bodyPr>
+          <a:lstStyle/>
+          <a:p>
+            <a:pPr algn="ctr"/>
+            <a:r>
+              <a:rPr lang="en-US" sz="4000" b="1" dirty="0" smtClean="0">
+                <a:solidFill>
+                  <a:srgbClr val="003399"/>
+                </a:solidFill>
+              </a:rPr>
+              <a:t>Problem Run Times</a:t>
+            </a:r>
+            <a:endParaRPr lang="en-US" sz="4000" b="1" dirty="0">
+              <a:solidFill>
+                <a:srgbClr val="003399"/>
+              </a:solidFill>
+            </a:endParaRPr>
+          </a:p>
+        </p:txBody>
+      </p:sp>
     </p:spTree>
     <p:extLst>
       <p:ext uri="{BB962C8B-B14F-4D97-AF65-F5344CB8AC3E}">

</xml_diff>

<commit_message>
Draft / final version 1 for poster
</commit_message>
<xml_diff>
--- a/Poster_Dances.pptx
+++ b/Poster_Dances.pptx
@@ -759,11 +759,11 @@
           <c:showPercent val="0"/>
           <c:showBubbleSize val="0"/>
         </c:dLbls>
-        <c:axId val="124283904"/>
-        <c:axId val="156333184"/>
+        <c:axId val="152009728"/>
+        <c:axId val="155116672"/>
       </c:scatterChart>
       <c:valAx>
-        <c:axId val="124283904"/>
+        <c:axId val="152009728"/>
         <c:scaling>
           <c:orientation val="minMax"/>
         </c:scaling>
@@ -811,12 +811,12 @@
             <a:endParaRPr lang="en-US"/>
           </a:p>
         </c:txPr>
-        <c:crossAx val="156333184"/>
+        <c:crossAx val="155116672"/>
         <c:crossesAt val="0"/>
         <c:crossBetween val="midCat"/>
       </c:valAx>
       <c:valAx>
-        <c:axId val="156333184"/>
+        <c:axId val="155116672"/>
         <c:scaling>
           <c:orientation val="minMax"/>
         </c:scaling>
@@ -873,7 +873,7 @@
             <a:endParaRPr lang="en-US"/>
           </a:p>
         </c:txPr>
-        <c:crossAx val="124283904"/>
+        <c:crossAx val="152009728"/>
         <c:crossesAt val="0"/>
         <c:crossBetween val="midCat"/>
       </c:valAx>
@@ -4026,7 +4026,7 @@
         </p:nvSpPr>
         <p:spPr>
           <a:xfrm>
-            <a:off x="4509836" y="4648200"/>
+            <a:off x="4509836" y="4495800"/>
             <a:ext cx="20178964" cy="1815882"/>
           </a:xfrm>
           <a:prstGeom prst="rect">
@@ -4333,14 +4333,14 @@
               <p:nvPr>
                 <p:extLst>
                   <p:ext uri="{D42A27DB-BD31-4B8C-83A1-F6EECF244321}">
-                    <p14:modId xmlns:p14="http://schemas.microsoft.com/office/powerpoint/2010/main" val="307490919"/>
+                    <p14:modId xmlns:p14="http://schemas.microsoft.com/office/powerpoint/2010/main" val="1934482181"/>
                   </p:ext>
                 </p:extLst>
               </p:nvPr>
             </p:nvGraphicFramePr>
             <p:xfrm>
-              <a:off x="23012399" y="7848600"/>
-              <a:ext cx="5752333" cy="10868296"/>
+              <a:off x="23012399" y="8081479"/>
+              <a:ext cx="5752333" cy="9721271"/>
             </p:xfrm>
             <a:graphic>
               <a:graphicData uri="http://schemas.openxmlformats.org/drawingml/2006/table">
@@ -4354,7 +4354,7 @@
                     <a:gridCol w="1327461"/>
                     <a:gridCol w="1011400"/>
                   </a:tblGrid>
-                  <a:tr h="522514">
+                  <a:tr h="336905">
                     <a:tc>
                       <a:txBody>
                         <a:bodyPr/>
@@ -4431,7 +4431,7 @@
                       <a:tcPr anchor="ctr"/>
                     </a:tc>
                   </a:tr>
-                  <a:tr h="522514">
+                  <a:tr h="293210">
                     <a:tc>
                       <a:txBody>
                         <a:bodyPr/>
@@ -4554,13 +4554,13 @@
                             </a:spcAft>
                           </a:pPr>
                           <a:r>
-                            <a:rPr lang="en-US" sz="2400">
+                            <a:rPr lang="en-US" sz="2000">
                               <a:effectLst/>
                               <a:latin typeface="+mn-lt"/>
                             </a:rPr>
                             <a:t>kg/sec</a:t>
                           </a:r>
-                          <a:endParaRPr lang="en-US" sz="2400">
+                          <a:endParaRPr lang="en-US" sz="2000">
                             <a:effectLst/>
                             <a:latin typeface="+mn-lt"/>
                             <a:ea typeface="Times New Roman"/>
@@ -4570,7 +4570,7 @@
                       <a:tcPr marL="68580" marR="68580" marT="0" marB="0" anchor="ctr"/>
                     </a:tc>
                   </a:tr>
-                  <a:tr h="522514">
+                  <a:tr h="539048">
                     <a:tc>
                       <a:txBody>
                         <a:bodyPr/>
@@ -4701,13 +4701,13 @@
                             </a:spcAft>
                           </a:pPr>
                           <a:r>
-                            <a:rPr lang="en-US" sz="2400">
+                            <a:rPr lang="en-US" sz="2000">
                               <a:effectLst/>
                               <a:latin typeface="+mn-lt"/>
                             </a:rPr>
                             <a:t>MPa</a:t>
                           </a:r>
-                          <a:endParaRPr lang="en-US" sz="2400">
+                          <a:endParaRPr lang="en-US" sz="2000">
                             <a:effectLst/>
                             <a:latin typeface="+mn-lt"/>
                             <a:ea typeface="Times New Roman"/>
@@ -4717,7 +4717,7 @@
                       <a:tcPr marL="68580" marR="68580" marT="0" marB="0" anchor="ctr"/>
                     </a:tc>
                   </a:tr>
-                  <a:tr h="522514">
+                  <a:tr h="539048">
                     <a:tc>
                       <a:txBody>
                         <a:bodyPr/>
@@ -4873,27 +4873,27 @@
                                 <m:sPre>
                                   <m:sPrePr>
                                     <m:ctrlPr>
-                                      <a:rPr lang="en-US" sz="2400" i="1">
+                                      <a:rPr lang="en-US" sz="2000" i="1">
                                         <a:effectLst/>
-                                        <a:latin typeface="Cambria Math"/>
+                                        <a:latin typeface="+mn-lt"/>
                                       </a:rPr>
                                     </m:ctrlPr>
                                   </m:sPrePr>
                                   <m:sub/>
                                   <m:sup>
                                     <m:r>
-                                      <a:rPr lang="en-US" sz="2400">
+                                      <a:rPr lang="en-US" sz="2000">
                                         <a:effectLst/>
-                                        <a:latin typeface="Cambria Math"/>
+                                        <a:latin typeface="+mn-lt"/>
                                       </a:rPr>
                                       <m:t>∘</m:t>
                                     </m:r>
                                   </m:sup>
                                   <m:e>
                                     <m:r>
-                                      <a:rPr lang="en-US" sz="2400">
+                                      <a:rPr lang="en-US" sz="2000">
                                         <a:effectLst/>
-                                        <a:latin typeface="Cambria Math"/>
+                                        <a:latin typeface="+mn-lt"/>
                                       </a:rPr>
                                       <m:t>𝐶</m:t>
                                     </m:r>
@@ -4902,7 +4902,7 @@
                               </m:oMath>
                             </m:oMathPara>
                           </a14:m>
-                          <a:endParaRPr lang="en-US" sz="2400">
+                          <a:endParaRPr lang="en-US" sz="2000">
                             <a:effectLst/>
                             <a:latin typeface="+mn-lt"/>
                             <a:ea typeface="Times New Roman"/>
@@ -4912,7 +4912,7 @@
                       <a:tcPr marL="68580" marR="68580" marT="0" marB="0" anchor="ctr"/>
                     </a:tc>
                   </a:tr>
-                  <a:tr h="522514">
+                  <a:tr h="696903">
                     <a:tc>
                       <a:txBody>
                         <a:bodyPr/>
@@ -4927,10 +4927,10 @@
                             </a:spcAft>
                           </a:pPr>
                           <a:r>
-                            <a:rPr lang="en-US" sz="2400" dirty="0">
+                            <a:rPr lang="en-US" sz="2400" dirty="0" smtClean="0">
                               <a:effectLst/>
                             </a:rPr>
-                            <a:t>Heat Generation Rate</a:t>
+                            <a:t>Rate of Heat Generation</a:t>
                           </a:r>
                           <a:endParaRPr lang="en-US" sz="2400" dirty="0">
                             <a:effectLst/>
@@ -5043,13 +5043,13 @@
                             </a:spcAft>
                           </a:pPr>
                           <a:r>
-                            <a:rPr lang="en-US" sz="2400">
+                            <a:rPr lang="en-US" sz="2000">
                               <a:effectLst/>
                               <a:latin typeface="+mn-lt"/>
                             </a:rPr>
                             <a:t>W/m</a:t>
                           </a:r>
-                          <a:endParaRPr lang="en-US" sz="2400">
+                          <a:endParaRPr lang="en-US" sz="2000">
                             <a:effectLst/>
                             <a:latin typeface="+mn-lt"/>
                             <a:ea typeface="Times New Roman"/>
@@ -5059,7 +5059,7 @@
                       <a:tcPr marL="68580" marR="68580" marT="0" marB="0" anchor="ctr"/>
                     </a:tc>
                   </a:tr>
-                  <a:tr h="522514">
+                  <a:tr h="539048">
                     <a:tc>
                       <a:txBody>
                         <a:bodyPr/>
@@ -5169,13 +5169,13 @@
                             </a:spcAft>
                           </a:pPr>
                           <a:r>
-                            <a:rPr lang="en-US" sz="2400">
+                            <a:rPr lang="en-US" sz="2000">
                               <a:effectLst/>
                               <a:latin typeface="+mn-lt"/>
                             </a:rPr>
                             <a:t>m</a:t>
                           </a:r>
-                          <a:endParaRPr lang="en-US" sz="2400">
+                          <a:endParaRPr lang="en-US" sz="2000">
                             <a:effectLst/>
                             <a:latin typeface="+mn-lt"/>
                             <a:ea typeface="Times New Roman"/>
@@ -5185,7 +5185,7 @@
                       <a:tcPr marL="68580" marR="68580" marT="0" marB="0" anchor="ctr"/>
                     </a:tc>
                   </a:tr>
-                  <a:tr h="522514">
+                  <a:tr h="293210">
                     <a:tc>
                       <a:txBody>
                         <a:bodyPr/>
@@ -5316,13 +5316,13 @@
                             </a:spcAft>
                           </a:pPr>
                           <a:r>
-                            <a:rPr lang="en-US" sz="2400">
+                            <a:rPr lang="en-US" sz="2000">
                               <a:effectLst/>
                               <a:latin typeface="+mn-lt"/>
                             </a:rPr>
                             <a:t>cm</a:t>
                           </a:r>
-                          <a:endParaRPr lang="en-US" sz="2400">
+                          <a:endParaRPr lang="en-US" sz="2000">
                             <a:effectLst/>
                             <a:latin typeface="+mn-lt"/>
                             <a:ea typeface="Times New Roman"/>
@@ -5332,7 +5332,7 @@
                       <a:tcPr marL="68580" marR="68580" marT="0" marB="0" anchor="ctr"/>
                     </a:tc>
                   </a:tr>
-                  <a:tr h="522514">
+                  <a:tr h="539048">
                     <a:tc>
                       <a:txBody>
                         <a:bodyPr/>
@@ -5463,13 +5463,13 @@
                             </a:spcAft>
                           </a:pPr>
                           <a:r>
-                            <a:rPr lang="en-US" sz="2400">
+                            <a:rPr lang="en-US" sz="2000">
                               <a:effectLst/>
                               <a:latin typeface="+mn-lt"/>
                             </a:rPr>
                             <a:t>cm</a:t>
                           </a:r>
-                          <a:endParaRPr lang="en-US" sz="2400">
+                          <a:endParaRPr lang="en-US" sz="2000">
                             <a:effectLst/>
                             <a:latin typeface="+mn-lt"/>
                             <a:ea typeface="Times New Roman"/>
@@ -5479,7 +5479,7 @@
                       <a:tcPr marL="68580" marR="68580" marT="0" marB="0" anchor="ctr"/>
                     </a:tc>
                   </a:tr>
-                  <a:tr h="522514">
+                  <a:tr h="539048">
                     <a:tc>
                       <a:txBody>
                         <a:bodyPr/>
@@ -5610,13 +5610,13 @@
                             </a:spcAft>
                           </a:pPr>
                           <a:r>
-                            <a:rPr lang="en-US" sz="2400">
+                            <a:rPr lang="en-US" sz="2000">
                               <a:effectLst/>
                               <a:latin typeface="+mn-lt"/>
                             </a:rPr>
                             <a:t>cm</a:t>
                           </a:r>
-                          <a:endParaRPr lang="en-US" sz="2400">
+                          <a:endParaRPr lang="en-US" sz="2000">
                             <a:effectLst/>
                             <a:latin typeface="+mn-lt"/>
                             <a:ea typeface="Times New Roman"/>
@@ -5626,7 +5626,7 @@
                       <a:tcPr marL="68580" marR="68580" marT="0" marB="0" anchor="ctr"/>
                     </a:tc>
                   </a:tr>
-                  <a:tr h="522514">
+                  <a:tr h="293210">
                     <a:tc>
                       <a:txBody>
                         <a:bodyPr/>
@@ -5736,13 +5736,13 @@
                             </a:spcAft>
                           </a:pPr>
                           <a:r>
-                            <a:rPr lang="en-US" sz="2400">
+                            <a:rPr lang="en-US" sz="2000">
                               <a:effectLst/>
                               <a:latin typeface="+mn-lt"/>
                             </a:rPr>
                             <a:t>cm</a:t>
                           </a:r>
-                          <a:endParaRPr lang="en-US" sz="2400">
+                          <a:endParaRPr lang="en-US" sz="2000">
                             <a:effectLst/>
                             <a:latin typeface="+mn-lt"/>
                             <a:ea typeface="Times New Roman"/>
@@ -5752,7 +5752,7 @@
                       <a:tcPr marL="68580" marR="68580" marT="0" marB="0" anchor="ctr"/>
                     </a:tc>
                   </a:tr>
-                  <a:tr h="522514">
+                  <a:tr h="539048">
                     <a:tc>
                       <a:txBody>
                         <a:bodyPr/>
@@ -5897,13 +5897,13 @@
                             </a:spcAft>
                           </a:pPr>
                           <a:r>
-                            <a:rPr lang="en-US" sz="2400">
+                            <a:rPr lang="en-US" sz="2000">
                               <a:effectLst/>
                               <a:latin typeface="+mn-lt"/>
                             </a:rPr>
                             <a:t>kJ/kg-K</a:t>
                           </a:r>
-                          <a:endParaRPr lang="en-US" sz="2400">
+                          <a:endParaRPr lang="en-US" sz="2000">
                             <a:effectLst/>
                             <a:latin typeface="+mn-lt"/>
                             <a:ea typeface="Times New Roman"/>
@@ -5913,7 +5913,7 @@
                       <a:tcPr marL="68580" marR="68580" marT="0" marB="0" anchor="ctr"/>
                     </a:tc>
                   </a:tr>
-                  <a:tr h="522514">
+                  <a:tr h="456494">
                     <a:tc>
                       <a:txBody>
                         <a:bodyPr/>
@@ -6044,13 +6044,13 @@
                             </a:spcAft>
                           </a:pPr>
                           <a:r>
-                            <a:rPr lang="en-US" sz="2400">
+                            <a:rPr lang="en-US" sz="2000">
                               <a:effectLst/>
                               <a:latin typeface="+mn-lt"/>
                             </a:rPr>
                             <a:t>kg/m^3</a:t>
                           </a:r>
-                          <a:endParaRPr lang="en-US" sz="2400">
+                          <a:endParaRPr lang="en-US" sz="2000">
                             <a:effectLst/>
                             <a:latin typeface="+mn-lt"/>
                             <a:ea typeface="Times New Roman"/>
@@ -6060,7 +6060,7 @@
                       <a:tcPr marL="68580" marR="68580" marT="0" marB="0" anchor="ctr"/>
                     </a:tc>
                   </a:tr>
-                  <a:tr h="522514">
+                  <a:tr h="539048">
                     <a:tc>
                       <a:txBody>
                         <a:bodyPr/>
@@ -6191,13 +6191,13 @@
                             </a:spcAft>
                           </a:pPr>
                           <a:r>
-                            <a:rPr lang="en-US" sz="2400">
+                            <a:rPr lang="en-US" sz="2000">
                               <a:effectLst/>
                               <a:latin typeface="+mn-lt"/>
                             </a:rPr>
                             <a:t>W/m-k</a:t>
                           </a:r>
-                          <a:endParaRPr lang="en-US" sz="2400">
+                          <a:endParaRPr lang="en-US" sz="2000">
                             <a:effectLst/>
                             <a:latin typeface="+mn-lt"/>
                             <a:ea typeface="Times New Roman"/>
@@ -6207,7 +6207,7 @@
                       <a:tcPr marL="68580" marR="68580" marT="0" marB="0" anchor="ctr"/>
                     </a:tc>
                   </a:tr>
-                  <a:tr h="522514">
+                  <a:tr h="539048">
                     <a:tc>
                       <a:txBody>
                         <a:bodyPr/>
@@ -6352,13 +6352,13 @@
                             </a:spcAft>
                           </a:pPr>
                           <a:r>
-                            <a:rPr lang="en-US" sz="2400">
+                            <a:rPr lang="en-US" sz="2000" dirty="0">
                               <a:effectLst/>
                               <a:latin typeface="+mn-lt"/>
                             </a:rPr>
                             <a:t>kJ/kg-K</a:t>
                           </a:r>
-                          <a:endParaRPr lang="en-US" sz="2400">
+                          <a:endParaRPr lang="en-US" sz="2000" dirty="0">
                             <a:effectLst/>
                             <a:latin typeface="+mn-lt"/>
                             <a:ea typeface="Times New Roman"/>
@@ -6368,7 +6368,7 @@
                       <a:tcPr marL="68580" marR="68580" marT="0" marB="0" anchor="ctr"/>
                     </a:tc>
                   </a:tr>
-                  <a:tr h="522514">
+                  <a:tr h="808572">
                     <a:tc>
                       <a:txBody>
                         <a:bodyPr/>
@@ -6508,13 +6508,13 @@
                             </a:spcAft>
                           </a:pPr>
                           <a:r>
-                            <a:rPr lang="en-US" sz="2400" dirty="0">
+                            <a:rPr lang="en-US" sz="2000" dirty="0">
                               <a:effectLst/>
                               <a:latin typeface="+mn-lt"/>
                             </a:rPr>
                             <a:t>kg/m^3</a:t>
                           </a:r>
-                          <a:endParaRPr lang="en-US" sz="2400" dirty="0">
+                          <a:endParaRPr lang="en-US" sz="2000" dirty="0">
                             <a:effectLst/>
                             <a:latin typeface="+mn-lt"/>
                             <a:ea typeface="Times New Roman"/>
@@ -6539,14 +6539,14 @@
               <p:nvPr>
                 <p:extLst>
                   <p:ext uri="{D42A27DB-BD31-4B8C-83A1-F6EECF244321}">
-                    <p14:modId xmlns:p14="http://schemas.microsoft.com/office/powerpoint/2010/main" val="307490919"/>
+                    <p14:modId xmlns:p14="http://schemas.microsoft.com/office/powerpoint/2010/main" val="1934482181"/>
                   </p:ext>
                 </p:extLst>
               </p:nvPr>
             </p:nvGraphicFramePr>
             <p:xfrm>
-              <a:off x="23012399" y="7848600"/>
-              <a:ext cx="5752333" cy="10868296"/>
+              <a:off x="23012399" y="8081479"/>
+              <a:ext cx="5752333" cy="9721271"/>
             </p:xfrm>
             <a:graphic>
               <a:graphicData uri="http://schemas.openxmlformats.org/drawingml/2006/table">
@@ -6560,7 +6560,7 @@
                     <a:gridCol w="1327461"/>
                     <a:gridCol w="1011400"/>
                   </a:tblGrid>
-                  <a:tr h="522514">
+                  <a:tr h="457200">
                     <a:tc>
                       <a:txBody>
                         <a:bodyPr/>
@@ -6637,7 +6637,7 @@
                       <a:tcPr anchor="ctr"/>
                     </a:tc>
                   </a:tr>
-                  <a:tr h="522514">
+                  <a:tr h="365760">
                     <a:tc>
                       <a:txBody>
                         <a:bodyPr/>
@@ -6678,7 +6678,7 @@
                         <a:blipFill rotWithShape="1">
                           <a:blip r:embed="rId3"/>
                           <a:stretch>
-                            <a:fillRect l="-156881" t="-104706" r="-176147" b="-1931765"/>
+                            <a:fillRect l="-156881" t="-138333" r="-176147" b="-2483333"/>
                           </a:stretch>
                         </a:blipFill>
                       </a:tcPr>
@@ -6726,13 +6726,13 @@
                             </a:spcAft>
                           </a:pPr>
                           <a:r>
-                            <a:rPr lang="en-US" sz="2400">
+                            <a:rPr lang="en-US" sz="2000">
                               <a:effectLst/>
                               <a:latin typeface="+mn-lt"/>
                             </a:rPr>
                             <a:t>kg/sec</a:t>
                           </a:r>
-                          <a:endParaRPr lang="en-US" sz="2400">
+                          <a:endParaRPr lang="en-US" sz="2000">
                             <a:effectLst/>
                             <a:latin typeface="+mn-lt"/>
                             <a:ea typeface="Times New Roman"/>
@@ -6783,7 +6783,7 @@
                         <a:blipFill rotWithShape="1">
                           <a:blip r:embed="rId3"/>
                           <a:stretch>
-                            <a:fillRect l="-156881" t="-145000" r="-176147" b="-1268333"/>
+                            <a:fillRect l="-156881" t="-119167" r="-176147" b="-1141667"/>
                           </a:stretch>
                         </a:blipFill>
                       </a:tcPr>
@@ -6831,13 +6831,13 @@
                             </a:spcAft>
                           </a:pPr>
                           <a:r>
-                            <a:rPr lang="en-US" sz="2400">
+                            <a:rPr lang="en-US" sz="2000">
                               <a:effectLst/>
                               <a:latin typeface="+mn-lt"/>
                             </a:rPr>
                             <a:t>MPa</a:t>
                           </a:r>
-                          <a:endParaRPr lang="en-US" sz="2400">
+                          <a:endParaRPr lang="en-US" sz="2000">
                             <a:effectLst/>
                             <a:latin typeface="+mn-lt"/>
                             <a:ea typeface="Times New Roman"/>
@@ -6888,7 +6888,7 @@
                         <a:blipFill rotWithShape="1">
                           <a:blip r:embed="rId3"/>
                           <a:stretch>
-                            <a:fillRect l="-156881" t="-245000" r="-176147" b="-1168333"/>
+                            <a:fillRect l="-156881" t="-219167" r="-176147" b="-1041667"/>
                           </a:stretch>
                         </a:blipFill>
                       </a:tcPr>
@@ -6934,13 +6934,13 @@
                         <a:blipFill rotWithShape="1">
                           <a:blip r:embed="rId3"/>
                           <a:stretch>
-                            <a:fillRect l="-468675" t="-245000" b="-1168333"/>
+                            <a:fillRect l="-468675" t="-219167" b="-1041667"/>
                           </a:stretch>
                         </a:blipFill>
                       </a:tcPr>
                     </a:tc>
                   </a:tr>
-                  <a:tr h="1097280">
+                  <a:tr h="731520">
                     <a:tc>
                       <a:txBody>
                         <a:bodyPr/>
@@ -6955,10 +6955,10 @@
                             </a:spcAft>
                           </a:pPr>
                           <a:r>
-                            <a:rPr lang="en-US" sz="2400" dirty="0">
+                            <a:rPr lang="en-US" sz="2400" dirty="0" smtClean="0">
                               <a:effectLst/>
                             </a:rPr>
-                            <a:t>Heat Generation Rate</a:t>
+                            <a:t>Rate of Heat Generation</a:t>
                           </a:r>
                           <a:endParaRPr lang="en-US" sz="2400" dirty="0">
                             <a:effectLst/>
@@ -6981,7 +6981,7 @@
                         <a:blipFill rotWithShape="1">
                           <a:blip r:embed="rId3"/>
                           <a:stretch>
-                            <a:fillRect l="-156881" t="-230000" r="-176147" b="-678889"/>
+                            <a:fillRect l="-156881" t="-319167" r="-176147" b="-941667"/>
                           </a:stretch>
                         </a:blipFill>
                       </a:tcPr>
@@ -7029,13 +7029,13 @@
                             </a:spcAft>
                           </a:pPr>
                           <a:r>
-                            <a:rPr lang="en-US" sz="2400">
+                            <a:rPr lang="en-US" sz="2000">
                               <a:effectLst/>
                               <a:latin typeface="+mn-lt"/>
                             </a:rPr>
                             <a:t>W/m</a:t>
                           </a:r>
-                          <a:endParaRPr lang="en-US" sz="2400">
+                          <a:endParaRPr lang="en-US" sz="2000">
                             <a:effectLst/>
                             <a:latin typeface="+mn-lt"/>
                             <a:ea typeface="Times New Roman"/>
@@ -7086,7 +7086,7 @@
                         <a:blipFill rotWithShape="1">
                           <a:blip r:embed="rId3"/>
                           <a:stretch>
-                            <a:fillRect l="-156881" t="-495000" r="-176147" b="-918333"/>
+                            <a:fillRect l="-156881" t="-419167" r="-176147" b="-841667"/>
                           </a:stretch>
                         </a:blipFill>
                       </a:tcPr>
@@ -7134,13 +7134,13 @@
                             </a:spcAft>
                           </a:pPr>
                           <a:r>
-                            <a:rPr lang="en-US" sz="2400">
+                            <a:rPr lang="en-US" sz="2000">
                               <a:effectLst/>
                               <a:latin typeface="+mn-lt"/>
                             </a:rPr>
                             <a:t>m</a:t>
                           </a:r>
-                          <a:endParaRPr lang="en-US" sz="2400">
+                          <a:endParaRPr lang="en-US" sz="2000">
                             <a:effectLst/>
                             <a:latin typeface="+mn-lt"/>
                             <a:ea typeface="Times New Roman"/>
@@ -7150,7 +7150,7 @@
                       <a:tcPr marL="68580" marR="68580" marT="0" marB="0" anchor="ctr"/>
                     </a:tc>
                   </a:tr>
-                  <a:tr h="522514">
+                  <a:tr h="395097">
                     <a:tc>
                       <a:txBody>
                         <a:bodyPr/>
@@ -7191,7 +7191,7 @@
                         <a:blipFill rotWithShape="1">
                           <a:blip r:embed="rId3"/>
                           <a:stretch>
-                            <a:fillRect l="-156881" t="-830233" r="-176147" b="-1181395"/>
+                            <a:fillRect l="-156881" t="-958462" r="-176147" b="-1453846"/>
                           </a:stretch>
                         </a:blipFill>
                       </a:tcPr>
@@ -7239,13 +7239,13 @@
                             </a:spcAft>
                           </a:pPr>
                           <a:r>
-                            <a:rPr lang="en-US" sz="2400">
+                            <a:rPr lang="en-US" sz="2000">
                               <a:effectLst/>
                               <a:latin typeface="+mn-lt"/>
                             </a:rPr>
                             <a:t>cm</a:t>
                           </a:r>
-                          <a:endParaRPr lang="en-US" sz="2400">
+                          <a:endParaRPr lang="en-US" sz="2000">
                             <a:effectLst/>
                             <a:latin typeface="+mn-lt"/>
                             <a:ea typeface="Times New Roman"/>
@@ -7296,7 +7296,7 @@
                         <a:blipFill rotWithShape="1">
                           <a:blip r:embed="rId3"/>
                           <a:stretch>
-                            <a:fillRect l="-156881" t="-666667" r="-176147" b="-746667"/>
+                            <a:fillRect l="-156881" t="-578151" r="-176147" b="-694118"/>
                           </a:stretch>
                         </a:blipFill>
                       </a:tcPr>
@@ -7344,13 +7344,13 @@
                             </a:spcAft>
                           </a:pPr>
                           <a:r>
-                            <a:rPr lang="en-US" sz="2400">
+                            <a:rPr lang="en-US" sz="2000">
                               <a:effectLst/>
                               <a:latin typeface="+mn-lt"/>
                             </a:rPr>
                             <a:t>cm</a:t>
                           </a:r>
-                          <a:endParaRPr lang="en-US" sz="2400">
+                          <a:endParaRPr lang="en-US" sz="2000">
                             <a:effectLst/>
                             <a:latin typeface="+mn-lt"/>
                             <a:ea typeface="Times New Roman"/>
@@ -7401,7 +7401,7 @@
                         <a:blipFill rotWithShape="1">
                           <a:blip r:embed="rId3"/>
                           <a:stretch>
-                            <a:fillRect l="-156881" t="-766667" r="-176147" b="-646667"/>
+                            <a:fillRect l="-156881" t="-672500" r="-176147" b="-588333"/>
                           </a:stretch>
                         </a:blipFill>
                       </a:tcPr>
@@ -7449,13 +7449,13 @@
                             </a:spcAft>
                           </a:pPr>
                           <a:r>
-                            <a:rPr lang="en-US" sz="2400">
+                            <a:rPr lang="en-US" sz="2000">
                               <a:effectLst/>
                               <a:latin typeface="+mn-lt"/>
                             </a:rPr>
                             <a:t>cm</a:t>
                           </a:r>
-                          <a:endParaRPr lang="en-US" sz="2400">
+                          <a:endParaRPr lang="en-US" sz="2000">
                             <a:effectLst/>
                             <a:latin typeface="+mn-lt"/>
                             <a:ea typeface="Times New Roman"/>
@@ -7465,7 +7465,7 @@
                       <a:tcPr marL="68580" marR="68580" marT="0" marB="0" anchor="ctr"/>
                     </a:tc>
                   </a:tr>
-                  <a:tr h="522514">
+                  <a:tr h="365760">
                     <a:tc>
                       <a:txBody>
                         <a:bodyPr/>
@@ -7506,7 +7506,7 @@
                         <a:blipFill rotWithShape="1">
                           <a:blip r:embed="rId3"/>
                           <a:stretch>
-                            <a:fillRect l="-156881" t="-1223529" r="-176147" b="-812941"/>
+                            <a:fillRect l="-156881" t="-1545000" r="-176147" b="-1076667"/>
                           </a:stretch>
                         </a:blipFill>
                       </a:tcPr>
@@ -7554,13 +7554,13 @@
                             </a:spcAft>
                           </a:pPr>
                           <a:r>
-                            <a:rPr lang="en-US" sz="2400">
+                            <a:rPr lang="en-US" sz="2000">
                               <a:effectLst/>
                               <a:latin typeface="+mn-lt"/>
                             </a:rPr>
                             <a:t>cm</a:t>
                           </a:r>
-                          <a:endParaRPr lang="en-US" sz="2400">
+                          <a:endParaRPr lang="en-US" sz="2000">
                             <a:effectLst/>
                             <a:latin typeface="+mn-lt"/>
                             <a:ea typeface="Times New Roman"/>
@@ -7611,7 +7611,7 @@
                         <a:blipFill rotWithShape="1">
                           <a:blip r:embed="rId3"/>
                           <a:stretch>
-                            <a:fillRect l="-156881" t="-937500" r="-176147" b="-475833"/>
+                            <a:fillRect l="-156881" t="-822500" r="-176147" b="-438333"/>
                           </a:stretch>
                         </a:blipFill>
                       </a:tcPr>
@@ -7659,13 +7659,13 @@
                             </a:spcAft>
                           </a:pPr>
                           <a:r>
-                            <a:rPr lang="en-US" sz="2400">
+                            <a:rPr lang="en-US" sz="2000">
                               <a:effectLst/>
                               <a:latin typeface="+mn-lt"/>
                             </a:rPr>
                             <a:t>kJ/kg-K</a:t>
                           </a:r>
-                          <a:endParaRPr lang="en-US" sz="2400">
+                          <a:endParaRPr lang="en-US" sz="2000">
                             <a:effectLst/>
                             <a:latin typeface="+mn-lt"/>
                             <a:ea typeface="Times New Roman"/>
@@ -7675,7 +7675,7 @@
                       <a:tcPr marL="68580" marR="68580" marT="0" marB="0" anchor="ctr"/>
                     </a:tc>
                   </a:tr>
-                  <a:tr h="731520">
+                  <a:tr h="456494">
                     <a:tc>
                       <a:txBody>
                         <a:bodyPr/>
@@ -7716,7 +7716,7 @@
                         <a:blipFill rotWithShape="1">
                           <a:blip r:embed="rId3"/>
                           <a:stretch>
-                            <a:fillRect l="-156881" t="-1037500" r="-176147" b="-375833"/>
+                            <a:fillRect l="-156881" t="-1476000" r="-176147" b="-601333"/>
                           </a:stretch>
                         </a:blipFill>
                       </a:tcPr>
@@ -7764,13 +7764,13 @@
                             </a:spcAft>
                           </a:pPr>
                           <a:r>
-                            <a:rPr lang="en-US" sz="2400">
+                            <a:rPr lang="en-US" sz="2000">
                               <a:effectLst/>
                               <a:latin typeface="+mn-lt"/>
                             </a:rPr>
                             <a:t>kg/m^3</a:t>
                           </a:r>
-                          <a:endParaRPr lang="en-US" sz="2400">
+                          <a:endParaRPr lang="en-US" sz="2000">
                             <a:effectLst/>
                             <a:latin typeface="+mn-lt"/>
                             <a:ea typeface="Times New Roman"/>
@@ -7821,7 +7821,7 @@
                         <a:blipFill rotWithShape="1">
                           <a:blip r:embed="rId3"/>
                           <a:stretch>
-                            <a:fillRect l="-156881" t="-1137500" r="-176147" b="-275833"/>
+                            <a:fillRect l="-156881" t="-985000" r="-176147" b="-275833"/>
                           </a:stretch>
                         </a:blipFill>
                       </a:tcPr>
@@ -7869,13 +7869,13 @@
                             </a:spcAft>
                           </a:pPr>
                           <a:r>
-                            <a:rPr lang="en-US" sz="2400">
+                            <a:rPr lang="en-US" sz="2000">
                               <a:effectLst/>
                               <a:latin typeface="+mn-lt"/>
                             </a:rPr>
                             <a:t>W/m-k</a:t>
                           </a:r>
-                          <a:endParaRPr lang="en-US" sz="2400">
+                          <a:endParaRPr lang="en-US" sz="2000">
                             <a:effectLst/>
                             <a:latin typeface="+mn-lt"/>
                             <a:ea typeface="Times New Roman"/>
@@ -7926,7 +7926,7 @@
                         <a:blipFill rotWithShape="1">
                           <a:blip r:embed="rId3"/>
                           <a:stretch>
-                            <a:fillRect l="-156881" t="-1237500" r="-176147" b="-175833"/>
+                            <a:fillRect l="-156881" t="-1085000" r="-176147" b="-175833"/>
                           </a:stretch>
                         </a:blipFill>
                       </a:tcPr>
@@ -7974,13 +7974,13 @@
                             </a:spcAft>
                           </a:pPr>
                           <a:r>
-                            <a:rPr lang="en-US" sz="2400">
+                            <a:rPr lang="en-US" sz="2000" dirty="0">
                               <a:effectLst/>
                               <a:latin typeface="+mn-lt"/>
                             </a:rPr>
                             <a:t>kJ/kg-K</a:t>
                           </a:r>
-                          <a:endParaRPr lang="en-US" sz="2400">
+                          <a:endParaRPr lang="en-US" sz="2000" dirty="0">
                             <a:effectLst/>
                             <a:latin typeface="+mn-lt"/>
                             <a:ea typeface="Times New Roman"/>
@@ -8040,7 +8040,7 @@
                         <a:blipFill rotWithShape="1">
                           <a:blip r:embed="rId3"/>
                           <a:stretch>
-                            <a:fillRect l="-156881" t="-891667" r="-176147" b="-17222"/>
+                            <a:fillRect l="-156881" t="-790000" r="-176147" b="-17222"/>
                           </a:stretch>
                         </a:blipFill>
                       </a:tcPr>
@@ -8088,13 +8088,13 @@
                             </a:spcAft>
                           </a:pPr>
                           <a:r>
-                            <a:rPr lang="en-US" sz="2400" dirty="0">
+                            <a:rPr lang="en-US" sz="2000" dirty="0">
                               <a:effectLst/>
                               <a:latin typeface="+mn-lt"/>
                             </a:rPr>
                             <a:t>kg/m^3</a:t>
                           </a:r>
-                          <a:endParaRPr lang="en-US" sz="2400" dirty="0">
+                          <a:endParaRPr lang="en-US" sz="2000" dirty="0">
                             <a:effectLst/>
                             <a:latin typeface="+mn-lt"/>
                             <a:ea typeface="Times New Roman"/>
@@ -8118,8 +8118,8 @@
         </p:nvSpPr>
         <p:spPr>
           <a:xfrm>
-            <a:off x="15087600" y="7757795"/>
-            <a:ext cx="6934200" cy="4573560"/>
+            <a:off x="15087600" y="7990674"/>
+            <a:ext cx="7620000" cy="4253472"/>
           </a:xfrm>
           <a:prstGeom prst="rect">
             <a:avLst/>
@@ -8131,7 +8131,7 @@
           </a:bodyPr>
           <a:lstStyle/>
           <a:p>
-            <a:pPr marL="457200" marR="0" lvl="0" indent="-457200">
+            <a:pPr marL="457200" marR="0" lvl="0" indent="-457200" algn="just">
               <a:lnSpc>
                 <a:spcPct val="130000"/>
               </a:lnSpc>
@@ -8145,7 +8145,7 @@
               <a:buChar char="•"/>
             </a:pPr>
             <a:r>
-              <a:rPr lang="en-US" sz="2800" dirty="0" smtClean="0">
+              <a:rPr lang="en-US" sz="2600" dirty="0" smtClean="0">
                 <a:ea typeface="Calibri"/>
                 <a:cs typeface="Times New Roman"/>
               </a:rPr>
@@ -8153,7 +8153,7 @@
             </a:r>
           </a:p>
           <a:p>
-            <a:pPr marL="457200" marR="0" lvl="0" indent="-457200">
+            <a:pPr marL="457200" marR="0" lvl="0" indent="-457200" algn="just">
               <a:lnSpc>
                 <a:spcPct val="130000"/>
               </a:lnSpc>
@@ -8167,15 +8167,47 @@
               <a:buChar char="•"/>
             </a:pPr>
             <a:r>
-              <a:rPr lang="en-US" sz="2800" dirty="0" smtClean="0">
+              <a:rPr lang="en-US" sz="2600" dirty="0" smtClean="0">
                 <a:ea typeface="Calibri"/>
                 <a:cs typeface="Times New Roman"/>
               </a:rPr>
-              <a:t>Mass flow rate is held constant</a:t>
+              <a:t>Constant </a:t>
             </a:r>
-          </a:p>
-          <a:p>
-            <a:pPr marL="457200" marR="0" lvl="0" indent="-457200">
+            <a:r>
+              <a:rPr lang="en-US" sz="2600" dirty="0" smtClean="0">
+                <a:ea typeface="Calibri"/>
+                <a:cs typeface="Times New Roman"/>
+              </a:rPr>
+              <a:t>ma</a:t>
+            </a:r>
+            <a:r>
+              <a:rPr lang="en-US" sz="2600" dirty="0" smtClean="0">
+                <a:ea typeface="Calibri"/>
+                <a:cs typeface="Times New Roman"/>
+              </a:rPr>
+              <a:t>ss </a:t>
+            </a:r>
+            <a:r>
+              <a:rPr lang="en-US" sz="2600" dirty="0" smtClean="0">
+                <a:ea typeface="Calibri"/>
+                <a:cs typeface="Times New Roman"/>
+              </a:rPr>
+              <a:t>flow </a:t>
+            </a:r>
+            <a:r>
+              <a:rPr lang="en-US" sz="2600" dirty="0" smtClean="0">
+                <a:ea typeface="Calibri"/>
+                <a:cs typeface="Times New Roman"/>
+              </a:rPr>
+              <a:t>rate</a:t>
+            </a:r>
+            <a:endParaRPr lang="en-US" sz="2600" dirty="0" smtClean="0">
+              <a:ea typeface="Calibri"/>
+              <a:cs typeface="Times New Roman"/>
+            </a:endParaRPr>
+          </a:p>
+          <a:p>
+            <a:pPr marL="457200" marR="0" lvl="0" indent="-457200" algn="just">
               <a:lnSpc>
                 <a:spcPct val="130000"/>
               </a:lnSpc>
@@ -8189,15 +8221,33 @@
               <a:buChar char="•"/>
             </a:pPr>
             <a:r>
-              <a:rPr lang="en-US" sz="2800" dirty="0" smtClean="0">
+              <a:rPr lang="en-US" sz="2600" dirty="0" smtClean="0">
                 <a:ea typeface="Calibri"/>
                 <a:cs typeface="Times New Roman"/>
               </a:rPr>
-              <a:t>Heat generation rate is held constant</a:t>
+              <a:t>Constant h</a:t>
             </a:r>
-          </a:p>
-          <a:p>
-            <a:pPr marL="457200" marR="0" lvl="0" indent="-457200">
+            <a:r>
+              <a:rPr lang="en-US" sz="2600" dirty="0" smtClean="0">
+                <a:ea typeface="Calibri"/>
+                <a:cs typeface="Times New Roman"/>
+              </a:rPr>
+              <a:t>eat </a:t>
+            </a:r>
+            <a:r>
+              <a:rPr lang="en-US" sz="2600" dirty="0" smtClean="0">
+                <a:ea typeface="Calibri"/>
+                <a:cs typeface="Times New Roman"/>
+              </a:rPr>
+              <a:t>generation rate </a:t>
+            </a:r>
+            <a:endParaRPr lang="en-US" sz="2600" dirty="0" smtClean="0">
+              <a:ea typeface="Calibri"/>
+              <a:cs typeface="Times New Roman"/>
+            </a:endParaRPr>
+          </a:p>
+          <a:p>
+            <a:pPr marL="457200" marR="0" lvl="0" indent="-457200" algn="just">
               <a:lnSpc>
                 <a:spcPct val="130000"/>
               </a:lnSpc>
@@ -8211,15 +8261,70 @@
               <a:buChar char="•"/>
             </a:pPr>
             <a:r>
-              <a:rPr lang="en-US" sz="2800" dirty="0" smtClean="0">
+              <a:rPr lang="en-US" sz="2600" dirty="0" smtClean="0">
                 <a:ea typeface="Calibri"/>
                 <a:cs typeface="Times New Roman"/>
               </a:rPr>
-              <a:t>Constant material properties</a:t>
+              <a:t>Constant </a:t>
             </a:r>
-          </a:p>
-          <a:p>
-            <a:pPr marL="457200" marR="0" lvl="0" indent="-457200">
+            <a:r>
+              <a:rPr lang="en-US" sz="2600" dirty="0" smtClean="0">
+                <a:ea typeface="Calibri"/>
+                <a:cs typeface="Times New Roman"/>
+              </a:rPr>
+              <a:t>material </a:t>
+            </a:r>
+            <a:r>
+              <a:rPr lang="en-US" sz="2600" dirty="0" smtClean="0">
+                <a:ea typeface="Calibri"/>
+                <a:cs typeface="Times New Roman"/>
+              </a:rPr>
+              <a:t>properties</a:t>
+            </a:r>
+          </a:p>
+          <a:p>
+            <a:pPr marL="457200" indent="-457200" algn="just">
+              <a:lnSpc>
+                <a:spcPct val="130000"/>
+              </a:lnSpc>
+              <a:buFont typeface="Arial"/>
+              <a:buChar char="•"/>
+            </a:pPr>
+            <a:r>
+              <a:rPr lang="en-US" sz="2600" dirty="0">
+                <a:ea typeface="Calibri"/>
+                <a:cs typeface="Times New Roman"/>
+              </a:rPr>
+              <a:t>Temperature changes </a:t>
+            </a:r>
+            <a:r>
+              <a:rPr lang="en-US" sz="2600" dirty="0" smtClean="0">
+                <a:ea typeface="Calibri"/>
+                <a:cs typeface="Times New Roman"/>
+              </a:rPr>
+              <a:t>axially </a:t>
+            </a:r>
+            <a:r>
+              <a:rPr lang="en-US" sz="2600" dirty="0">
+                <a:ea typeface="Calibri"/>
+                <a:cs typeface="Times New Roman"/>
+              </a:rPr>
+              <a:t>due to </a:t>
+            </a:r>
+            <a:r>
+              <a:rPr lang="en-US" sz="2600" dirty="0" smtClean="0">
+                <a:ea typeface="Calibri"/>
+                <a:cs typeface="Times New Roman"/>
+              </a:rPr>
+              <a:t>liquid advection</a:t>
+            </a:r>
+            <a:endParaRPr lang="en-US" sz="2600" dirty="0" smtClean="0">
+              <a:ea typeface="Calibri"/>
+              <a:cs typeface="Times New Roman"/>
+            </a:endParaRPr>
+          </a:p>
+          <a:p>
+            <a:pPr marL="457200" marR="0" lvl="0" indent="-457200" algn="just">
               <a:lnSpc>
                 <a:spcPct val="130000"/>
               </a:lnSpc>
@@ -8233,16 +8338,19 @@
               <a:buChar char="•"/>
             </a:pPr>
             <a:r>
-              <a:rPr lang="en-US" sz="2800" dirty="0" smtClean="0">
+              <a:rPr lang="en-US" sz="2600" dirty="0" smtClean="0">
                 <a:ea typeface="Calibri"/>
                 <a:cs typeface="Times New Roman"/>
               </a:rPr>
-              <a:t>Analytical solution for relative rod temperature in solid volume</a:t>
+              <a:t>Analytical solution for relative rod temperature in solid </a:t>
             </a:r>
-            <a:endParaRPr lang="en-US" sz="2800" dirty="0" smtClean="0">
-              <a:ea typeface="Calibri"/>
-              <a:cs typeface="Times New Roman"/>
-            </a:endParaRPr>
+            <a:r>
+              <a:rPr lang="en-US" sz="2600" dirty="0" smtClean="0">
+                <a:ea typeface="Calibri"/>
+                <a:cs typeface="Times New Roman"/>
+              </a:rPr>
+              <a:t>volume for each radial region</a:t>
+            </a:r>
           </a:p>
         </p:txBody>
       </p:sp>
@@ -8377,8 +8485,8 @@
         </p:nvSpPr>
         <p:spPr>
           <a:xfrm>
-            <a:off x="15488710" y="29308246"/>
-            <a:ext cx="13173287" cy="6555641"/>
+            <a:off x="15087600" y="29308246"/>
+            <a:ext cx="13574397" cy="6555641"/>
           </a:xfrm>
           <a:prstGeom prst="rect">
             <a:avLst/>
@@ -8445,8 +8553,8 @@
         </p:nvSpPr>
         <p:spPr>
           <a:xfrm>
-            <a:off x="304800" y="8001000"/>
-            <a:ext cx="8953500" cy="707886"/>
+            <a:off x="304799" y="8001000"/>
+            <a:ext cx="9154193" cy="707886"/>
           </a:xfrm>
           <a:prstGeom prst="rect">
             <a:avLst/>
@@ -8484,8 +8592,8 @@
         </p:nvSpPr>
         <p:spPr>
           <a:xfrm>
-            <a:off x="833094" y="13792200"/>
-            <a:ext cx="4615205" cy="707886"/>
+            <a:off x="304802" y="13792200"/>
+            <a:ext cx="5333998" cy="707886"/>
           </a:xfrm>
           <a:prstGeom prst="rect">
             <a:avLst/>
@@ -8505,7 +8613,7 @@
                   <a:srgbClr val="003399"/>
                 </a:solidFill>
               </a:rPr>
-              <a:t>Uncoupled Jacobian</a:t>
+              <a:t>Semi-Implicit Jacobian</a:t>
             </a:r>
             <a:endParaRPr lang="en-US" sz="4000" b="1" dirty="0">
               <a:solidFill>
@@ -8523,8 +8631,8 @@
         </p:nvSpPr>
         <p:spPr>
           <a:xfrm>
-            <a:off x="769917" y="8879169"/>
-            <a:ext cx="1077539" cy="892552"/>
+            <a:off x="304801" y="8879169"/>
+            <a:ext cx="1905000" cy="892552"/>
           </a:xfrm>
           <a:prstGeom prst="rect">
             <a:avLst/>
@@ -8532,11 +8640,12 @@
           <a:noFill/>
         </p:spPr>
         <p:txBody>
-          <a:bodyPr wrap="none" rtlCol="0">
+          <a:bodyPr wrap="square" rtlCol="0">
             <a:spAutoFit/>
           </a:bodyPr>
           <a:lstStyle/>
           <a:p>
+            <a:pPr algn="r"/>
             <a:r>
               <a:rPr lang="en-US" sz="2600" dirty="0" smtClean="0"/>
               <a:t>Liquid </a:t>
@@ -8574,7 +8683,7 @@
           </a:bodyPr>
           <a:lstStyle/>
           <a:p>
-            <a:pPr algn="ctr"/>
+            <a:pPr algn="r"/>
             <a:r>
               <a:rPr lang="en-US" sz="2600" dirty="0" smtClean="0"/>
               <a:t>Liquid </a:t>
@@ -8598,8 +8707,8 @@
         </p:nvSpPr>
         <p:spPr>
           <a:xfrm>
-            <a:off x="696318" y="11222236"/>
-            <a:ext cx="1108252" cy="892552"/>
+            <a:off x="304800" y="11222236"/>
+            <a:ext cx="1905000" cy="892552"/>
           </a:xfrm>
           <a:prstGeom prst="rect">
             <a:avLst/>
@@ -8607,12 +8716,12 @@
           <a:noFill/>
         </p:spPr>
         <p:txBody>
-          <a:bodyPr wrap="none" rtlCol="0">
+          <a:bodyPr wrap="square" rtlCol="0">
             <a:spAutoFit/>
           </a:bodyPr>
           <a:lstStyle/>
           <a:p>
-            <a:pPr algn="ctr"/>
+            <a:pPr algn="r"/>
             <a:r>
               <a:rPr lang="en-US" sz="2600" dirty="0" smtClean="0"/>
               <a:t>Liquid</a:t>
@@ -8686,8 +8795,8 @@
         </p:nvSpPr>
         <p:spPr>
           <a:xfrm>
-            <a:off x="696318" y="12563306"/>
-            <a:ext cx="1744388" cy="892552"/>
+            <a:off x="304800" y="12563306"/>
+            <a:ext cx="1905000" cy="892552"/>
           </a:xfrm>
           <a:prstGeom prst="rect">
             <a:avLst/>
@@ -8695,12 +8804,12 @@
           <a:noFill/>
         </p:spPr>
         <p:txBody>
-          <a:bodyPr wrap="none" rtlCol="0">
+          <a:bodyPr wrap="square" rtlCol="0">
             <a:spAutoFit/>
           </a:bodyPr>
           <a:lstStyle/>
           <a:p>
-            <a:pPr algn="ctr"/>
+            <a:pPr algn="r"/>
             <a:r>
               <a:rPr lang="en-US" sz="2600" dirty="0" smtClean="0"/>
               <a:t>Solid</a:t>
@@ -8716,8 +8825,8 @@
           </a:p>
         </p:txBody>
       </p:sp>
-      <mc:AlternateContent xmlns:mc="http://schemas.openxmlformats.org/markup-compatibility/2006">
-        <mc:Choice xmlns:a14="http://schemas.microsoft.com/office/drawing/2010/main" Requires="a14">
+      <mc:AlternateContent xmlns:mc="http://schemas.openxmlformats.org/markup-compatibility/2006" xmlns:a14="http://schemas.microsoft.com/office/drawing/2010/main">
+        <mc:Choice Requires="a14">
           <p:sp>
             <p:nvSpPr>
               <p:cNvPr id="9" name="Rectangle 8"/>
@@ -9056,7 +9165,7 @@
             </p:txBody>
           </p:sp>
         </mc:Choice>
-        <mc:Fallback>
+        <mc:Fallback xmlns="">
           <p:sp>
             <p:nvSpPr>
               <p:cNvPr id="9" name="Rectangle 8"/>
@@ -9105,7 +9214,7 @@
             </p:nvSpPr>
             <p:spPr>
               <a:xfrm>
-                <a:off x="3544028" y="10089715"/>
+                <a:off x="3930123" y="10051858"/>
                 <a:ext cx="3808543" cy="775084"/>
               </a:xfrm>
               <a:prstGeom prst="rect">
@@ -9325,7 +9434,7 @@
             </p:nvSpPr>
             <p:spPr>
               <a:xfrm>
-                <a:off x="3544028" y="10089715"/>
+                <a:off x="3930123" y="10051858"/>
                 <a:ext cx="3808543" cy="775084"/>
               </a:xfrm>
               <a:prstGeom prst="rect">
@@ -9363,7 +9472,7 @@
             </p:nvSpPr>
             <p:spPr>
               <a:xfrm>
-                <a:off x="4255986" y="8764848"/>
+                <a:off x="4642082" y="8764848"/>
                 <a:ext cx="2384627" cy="911596"/>
               </a:xfrm>
               <a:prstGeom prst="rect">
@@ -9482,7 +9591,7 @@
             </p:nvSpPr>
             <p:spPr>
               <a:xfrm>
-                <a:off x="4255986" y="8764848"/>
+                <a:off x="4642082" y="8764848"/>
                 <a:ext cx="2384627" cy="911596"/>
               </a:xfrm>
               <a:prstGeom prst="rect">
@@ -9520,7 +9629,7 @@
             </p:nvSpPr>
             <p:spPr>
               <a:xfrm>
-                <a:off x="2875800" y="12418235"/>
+                <a:off x="3261897" y="12361266"/>
                 <a:ext cx="5144998" cy="1060483"/>
               </a:xfrm>
               <a:prstGeom prst="rect">
@@ -9780,7 +9889,7 @@
             </p:nvSpPr>
             <p:spPr>
               <a:xfrm>
-                <a:off x="2875800" y="12418235"/>
+                <a:off x="3261897" y="12361266"/>
                 <a:ext cx="5144998" cy="1060483"/>
               </a:xfrm>
               <a:prstGeom prst="rect">
@@ -9897,13 +10006,13 @@
           <p:nvPr>
             <p:extLst>
               <p:ext uri="{D42A27DB-BD31-4B8C-83A1-F6EECF244321}">
-                <p14:modId xmlns:p14="http://schemas.microsoft.com/office/powerpoint/2010/main" val="4107845813"/>
+                <p14:modId xmlns:p14="http://schemas.microsoft.com/office/powerpoint/2010/main" val="2854443716"/>
               </p:ext>
             </p:extLst>
           </p:nvPr>
         </p:nvGraphicFramePr>
         <p:xfrm>
-          <a:off x="5722493" y="23071154"/>
+          <a:off x="3247864" y="23153307"/>
           <a:ext cx="8227294" cy="4836695"/>
         </p:xfrm>
         <a:graphic>
@@ -9921,14 +10030,14 @@
           <p:nvPr>
             <p:extLst>
               <p:ext uri="{D42A27DB-BD31-4B8C-83A1-F6EECF244321}">
-                <p14:modId xmlns:p14="http://schemas.microsoft.com/office/powerpoint/2010/main" val="1192882155"/>
+                <p14:modId xmlns:p14="http://schemas.microsoft.com/office/powerpoint/2010/main" val="1424159659"/>
               </p:ext>
             </p:extLst>
           </p:nvPr>
         </p:nvGraphicFramePr>
         <p:xfrm>
-          <a:off x="2965315" y="29376052"/>
-          <a:ext cx="7336488" cy="2194560"/>
+          <a:off x="3143791" y="29337000"/>
+          <a:ext cx="8210009" cy="2194560"/>
         </p:xfrm>
         <a:graphic>
           <a:graphicData uri="http://schemas.openxmlformats.org/drawingml/2006/table">
@@ -9937,11 +10046,11 @@
                 <a:tableStyleId>{B301B821-A1FF-4177-AEE7-76D212191A09}</a:tableStyleId>
               </a:tblPr>
               <a:tblGrid>
-                <a:gridCol w="1707080"/>
-                <a:gridCol w="1458574"/>
-                <a:gridCol w="1279042"/>
-                <a:gridCol w="1414960"/>
-                <a:gridCol w="1476832"/>
+                <a:gridCol w="1839412"/>
+                <a:gridCol w="1571642"/>
+                <a:gridCol w="1378193"/>
+                <a:gridCol w="1524647"/>
+                <a:gridCol w="1896115"/>
               </a:tblGrid>
               <a:tr h="152400">
                 <a:tc>
@@ -9986,10 +10095,16 @@
                         </a:spcAft>
                       </a:pPr>
                       <a:r>
+                        <a:rPr lang="en-US" sz="2400" dirty="0" smtClean="0">
+                          <a:effectLst/>
+                        </a:rPr>
+                        <a:t>Semi-Implicit </a:t>
+                      </a:r>
+                      <a:r>
                         <a:rPr lang="en-US" sz="2400" dirty="0">
                           <a:effectLst/>
                         </a:rPr>
-                        <a:t>Semi-implicit Transient</a:t>
+                        <a:t>Transient</a:t>
                       </a:r>
                       <a:endParaRPr lang="en-US" sz="2400" dirty="0">
                         <a:effectLst/>
@@ -10439,12 +10554,12 @@
                         </a:spcAft>
                       </a:pPr>
                       <a:r>
-                        <a:rPr lang="en-US" sz="2400">
+                        <a:rPr lang="en-US" sz="2400" dirty="0">
                           <a:effectLst/>
                         </a:rPr>
                         <a:t>0.15%</a:t>
                       </a:r>
-                      <a:endParaRPr lang="en-US" sz="2400">
+                      <a:endParaRPr lang="en-US" sz="2400" dirty="0">
                         <a:effectLst/>
                         <a:latin typeface="Times New Roman"/>
                         <a:ea typeface="Times New Roman"/>
@@ -10619,7 +10734,7 @@
             <p:spPr>
               <a:xfrm>
                 <a:off x="10582043" y="16336028"/>
-                <a:ext cx="3495676" cy="1004121"/>
+                <a:ext cx="3495676" cy="998287"/>
               </a:xfrm>
               <a:prstGeom prst="rect">
                 <a:avLst/>
@@ -10631,6 +10746,7 @@
               </a:bodyPr>
               <a:lstStyle/>
               <a:p>
+                <a:pPr/>
                 <a14:m>
                   <m:oMathPara xmlns:m="http://schemas.openxmlformats.org/officeDocument/2006/math">
                     <m:oMathParaPr>
@@ -10640,112 +10756,152 @@
                       <m:sSub>
                         <m:sSubPr>
                           <m:ctrlPr>
-                            <a:rPr lang="en-US" sz="2800" i="1" smtClean="0"/>
+                            <a:rPr lang="en-US" sz="2800" i="1" smtClean="0">
+                              <a:latin typeface="Cambria Math"/>
+                            </a:rPr>
                           </m:ctrlPr>
                         </m:sSubPr>
                         <m:e>
                           <m:r>
-                            <a:rPr lang="en-US" sz="2800" i="1"/>
+                            <a:rPr lang="en-US" sz="2800" i="1">
+                              <a:latin typeface="Cambria Math"/>
+                            </a:rPr>
                             <m:t>𝐽</m:t>
                           </m:r>
                         </m:e>
                         <m:sub>
                           <m:r>
-                            <a:rPr lang="en-US" sz="2800" i="1"/>
+                            <a:rPr lang="en-US" sz="2800" i="1">
+                              <a:latin typeface="Cambria Math"/>
+                            </a:rPr>
                             <m:t>𝑖</m:t>
                           </m:r>
                           <m:r>
-                            <a:rPr lang="en-US" sz="2800"/>
+                            <a:rPr lang="en-US" sz="2800">
+                              <a:latin typeface="Cambria Math"/>
+                            </a:rPr>
                             <m:t>,</m:t>
                           </m:r>
                           <m:r>
-                            <a:rPr lang="en-US" sz="2800" i="1"/>
+                            <a:rPr lang="en-US" sz="2800" i="1">
+                              <a:latin typeface="Cambria Math"/>
+                            </a:rPr>
                             <m:t>𝑗</m:t>
                           </m:r>
                         </m:sub>
                       </m:sSub>
                       <m:r>
-                        <a:rPr lang="en-US" sz="2800"/>
+                        <a:rPr lang="en-US" sz="2800">
+                          <a:latin typeface="Cambria Math"/>
+                        </a:rPr>
                         <m:t>=</m:t>
                       </m:r>
                       <m:f>
                         <m:fPr>
                           <m:ctrlPr>
-                            <a:rPr lang="en-US" sz="2800" i="1"/>
+                            <a:rPr lang="en-US" sz="2800" i="1">
+                              <a:latin typeface="Cambria Math"/>
+                            </a:rPr>
                           </m:ctrlPr>
                         </m:fPr>
                         <m:num>
                           <m:r>
-                            <a:rPr lang="en-US" sz="2800" i="1"/>
+                            <a:rPr lang="en-US" sz="2800" i="1">
+                              <a:latin typeface="Cambria Math"/>
+                            </a:rPr>
                             <m:t>𝛿</m:t>
                           </m:r>
                           <m:sSub>
                             <m:sSubPr>
                               <m:ctrlPr>
-                                <a:rPr lang="en-US" sz="2800" i="1"/>
+                                <a:rPr lang="en-US" sz="2800" i="1">
+                                  <a:latin typeface="Cambria Math"/>
+                                </a:rPr>
                               </m:ctrlPr>
                             </m:sSubPr>
                             <m:e>
                               <m:r>
-                                <a:rPr lang="en-US" sz="2800" i="1"/>
+                                <a:rPr lang="en-US" sz="2800" i="1">
+                                  <a:latin typeface="Cambria Math"/>
+                                </a:rPr>
                                 <m:t>𝐹</m:t>
                               </m:r>
                             </m:e>
                             <m:sub>
                               <m:r>
-                                <a:rPr lang="en-US" sz="2800" i="1"/>
+                                <a:rPr lang="en-US" sz="2800" i="1">
+                                  <a:latin typeface="Cambria Math"/>
+                                </a:rPr>
                                 <m:t>𝑗</m:t>
                               </m:r>
                             </m:sub>
                           </m:sSub>
                           <m:r>
-                            <a:rPr lang="en-US" sz="2800"/>
+                            <a:rPr lang="en-US" sz="2800">
+                              <a:latin typeface="Cambria Math"/>
+                            </a:rPr>
                             <m:t>(</m:t>
                           </m:r>
                           <m:sSub>
                             <m:sSubPr>
                               <m:ctrlPr>
-                                <a:rPr lang="en-US" sz="2800" i="1"/>
+                                <a:rPr lang="en-US" sz="2800" i="1">
+                                  <a:latin typeface="Cambria Math"/>
+                                </a:rPr>
                               </m:ctrlPr>
                             </m:sSubPr>
                             <m:e>
                               <m:r>
-                                <a:rPr lang="en-US" sz="2800" i="1"/>
+                                <a:rPr lang="en-US" sz="2800" i="1">
+                                  <a:latin typeface="Cambria Math"/>
+                                </a:rPr>
                                 <m:t>𝑋</m:t>
                               </m:r>
                             </m:e>
                             <m:sub>
                               <m:r>
-                                <a:rPr lang="en-US" sz="2800" i="1"/>
+                                <a:rPr lang="en-US" sz="2800" i="1">
+                                  <a:latin typeface="Cambria Math"/>
+                                </a:rPr>
                                 <m:t>𝑖</m:t>
                               </m:r>
                             </m:sub>
                           </m:sSub>
                           <m:r>
-                            <a:rPr lang="en-US" sz="2800"/>
+                            <a:rPr lang="en-US" sz="2800">
+                              <a:latin typeface="Cambria Math"/>
+                            </a:rPr>
                             <m:t>)</m:t>
                           </m:r>
                         </m:num>
                         <m:den>
                           <m:r>
-                            <a:rPr lang="en-US" sz="2800" i="1"/>
+                            <a:rPr lang="en-US" sz="2800" i="1">
+                              <a:latin typeface="Cambria Math"/>
+                            </a:rPr>
                             <m:t>𝛿</m:t>
                           </m:r>
                           <m:sSub>
                             <m:sSubPr>
                               <m:ctrlPr>
-                                <a:rPr lang="en-US" sz="2800" i="1"/>
+                                <a:rPr lang="en-US" sz="2800" i="1">
+                                  <a:latin typeface="Cambria Math"/>
+                                </a:rPr>
                               </m:ctrlPr>
                             </m:sSubPr>
                             <m:e>
                               <m:r>
-                                <a:rPr lang="en-US" sz="2800" i="1"/>
+                                <a:rPr lang="en-US" sz="2800" i="1">
+                                  <a:latin typeface="Cambria Math"/>
+                                </a:rPr>
                                 <m:t>𝑋</m:t>
                               </m:r>
                             </m:e>
                             <m:sub>
                               <m:r>
-                                <a:rPr lang="en-US" sz="2800" i="1"/>
+                                <a:rPr lang="en-US" sz="2800" i="1">
+                                  <a:latin typeface="Cambria Math"/>
+                                </a:rPr>
                                 <m:t>𝑖</m:t>
                               </m:r>
                             </m:sub>
@@ -10772,7 +10928,7 @@
             <p:spPr>
               <a:xfrm>
                 <a:off x="10582043" y="16336028"/>
-                <a:ext cx="3495676" cy="1004121"/>
+                <a:ext cx="3495676" cy="998287"/>
               </a:xfrm>
               <a:prstGeom prst="rect">
                 <a:avLst/>
@@ -10869,724 +11025,6 @@
           </a:extLst>
         </p:spPr>
       </p:pic>
-      <p:graphicFrame>
-        <p:nvGraphicFramePr>
-          <p:cNvPr id="3" name="Table 2"/>
-          <p:cNvGraphicFramePr>
-            <a:graphicFrameLocks noGrp="1"/>
-          </p:cNvGraphicFramePr>
-          <p:nvPr>
-            <p:extLst>
-              <p:ext uri="{D42A27DB-BD31-4B8C-83A1-F6EECF244321}">
-                <p14:modId xmlns:p14="http://schemas.microsoft.com/office/powerpoint/2010/main" val="2843933924"/>
-              </p:ext>
-            </p:extLst>
-          </p:nvPr>
-        </p:nvGraphicFramePr>
-        <p:xfrm>
-          <a:off x="2316480" y="32689800"/>
-          <a:ext cx="9559291" cy="2438400"/>
-        </p:xfrm>
-        <a:graphic>
-          <a:graphicData uri="http://schemas.openxmlformats.org/drawingml/2006/table">
-            <a:tbl>
-              <a:tblPr firstRow="1" firstCol="1" bandRow="1">
-                <a:tableStyleId>{69012ECD-51FC-41F1-AA8D-1B2483CD663E}</a:tableStyleId>
-              </a:tblPr>
-              <a:tblGrid>
-                <a:gridCol w="2238087"/>
-                <a:gridCol w="2497635"/>
-                <a:gridCol w="2393816"/>
-                <a:gridCol w="2429753"/>
-              </a:tblGrid>
-              <a:tr h="685800">
-                <a:tc>
-                  <a:txBody>
-                    <a:bodyPr/>
-                    <a:lstStyle/>
-                    <a:p>
-                      <a:pPr marL="0" marR="0" algn="ctr" hangingPunct="0">
-                        <a:spcBef>
-                          <a:spcPts val="0"/>
-                        </a:spcBef>
-                        <a:spcAft>
-                          <a:spcPts val="0"/>
-                        </a:spcAft>
-                      </a:pPr>
-                      <a:r>
-                        <a:rPr lang="en-US" sz="2000" dirty="0">
-                          <a:effectLst/>
-                        </a:rPr>
-                        <a:t>Code Version</a:t>
-                      </a:r>
-                      <a:endParaRPr lang="en-US" sz="2000" dirty="0">
-                        <a:effectLst/>
-                        <a:latin typeface="Times New Roman"/>
-                        <a:ea typeface="Times New Roman"/>
-                      </a:endParaRPr>
-                    </a:p>
-                  </a:txBody>
-                  <a:tcPr marL="68580" marR="68580" marT="0" marB="0" anchor="ctr"/>
-                </a:tc>
-                <a:tc>
-                  <a:txBody>
-                    <a:bodyPr/>
-                    <a:lstStyle/>
-                    <a:p>
-                      <a:pPr marL="0" marR="0" algn="ctr" hangingPunct="0">
-                        <a:spcBef>
-                          <a:spcPts val="0"/>
-                        </a:spcBef>
-                        <a:spcAft>
-                          <a:spcPts val="0"/>
-                        </a:spcAft>
-                      </a:pPr>
-                      <a:r>
-                        <a:rPr lang="en-US" sz="2000">
-                          <a:effectLst/>
-                        </a:rPr>
-                        <a:t>Solution Method</a:t>
-                      </a:r>
-                      <a:endParaRPr lang="en-US" sz="2000">
-                        <a:effectLst/>
-                        <a:latin typeface="Times New Roman"/>
-                        <a:ea typeface="Times New Roman"/>
-                      </a:endParaRPr>
-                    </a:p>
-                  </a:txBody>
-                  <a:tcPr marL="68580" marR="68580" marT="0" marB="0" anchor="ctr"/>
-                </a:tc>
-                <a:tc>
-                  <a:txBody>
-                    <a:bodyPr/>
-                    <a:lstStyle/>
-                    <a:p>
-                      <a:pPr marL="0" marR="0" algn="ctr" hangingPunct="0">
-                        <a:spcBef>
-                          <a:spcPts val="0"/>
-                        </a:spcBef>
-                        <a:spcAft>
-                          <a:spcPts val="0"/>
-                        </a:spcAft>
-                      </a:pPr>
-                      <a:r>
-                        <a:rPr lang="en-US" sz="2000">
-                          <a:effectLst/>
-                        </a:rPr>
-                        <a:t>Time Step Size [sec]</a:t>
-                      </a:r>
-                      <a:endParaRPr lang="en-US" sz="2000">
-                        <a:effectLst/>
-                        <a:latin typeface="Times New Roman"/>
-                        <a:ea typeface="Times New Roman"/>
-                      </a:endParaRPr>
-                    </a:p>
-                  </a:txBody>
-                  <a:tcPr marL="68580" marR="68580" marT="0" marB="0" anchor="ctr"/>
-                </a:tc>
-                <a:tc>
-                  <a:txBody>
-                    <a:bodyPr/>
-                    <a:lstStyle/>
-                    <a:p>
-                      <a:pPr marL="0" marR="0" algn="ctr" hangingPunct="0">
-                        <a:spcBef>
-                          <a:spcPts val="0"/>
-                        </a:spcBef>
-                        <a:spcAft>
-                          <a:spcPts val="0"/>
-                        </a:spcAft>
-                      </a:pPr>
-                      <a:r>
-                        <a:rPr lang="en-US" sz="2000" dirty="0">
-                          <a:effectLst/>
-                        </a:rPr>
-                        <a:t>Wall Clock Time [sec]</a:t>
-                      </a:r>
-                      <a:endParaRPr lang="en-US" sz="2000" dirty="0">
-                        <a:effectLst/>
-                        <a:latin typeface="Times New Roman"/>
-                        <a:ea typeface="Times New Roman"/>
-                      </a:endParaRPr>
-                    </a:p>
-                  </a:txBody>
-                  <a:tcPr marL="68580" marR="68580" marT="0" marB="0" anchor="ctr"/>
-                </a:tc>
-              </a:tr>
-              <a:tr h="381000">
-                <a:tc>
-                  <a:txBody>
-                    <a:bodyPr/>
-                    <a:lstStyle/>
-                    <a:p>
-                      <a:pPr marL="0" marR="0" algn="ctr" hangingPunct="0">
-                        <a:spcBef>
-                          <a:spcPts val="0"/>
-                        </a:spcBef>
-                        <a:spcAft>
-                          <a:spcPts val="0"/>
-                        </a:spcAft>
-                      </a:pPr>
-                      <a:r>
-                        <a:rPr lang="en-US" sz="2000" b="0" dirty="0">
-                          <a:effectLst/>
-                        </a:rPr>
-                        <a:t>Original</a:t>
-                      </a:r>
-                      <a:endParaRPr lang="en-US" sz="2000" b="0" dirty="0">
-                        <a:effectLst/>
-                        <a:latin typeface="Times New Roman"/>
-                        <a:ea typeface="Times New Roman"/>
-                      </a:endParaRPr>
-                    </a:p>
-                  </a:txBody>
-                  <a:tcPr marL="68580" marR="68580" marT="0" marB="0" anchor="ctr"/>
-                </a:tc>
-                <a:tc>
-                  <a:txBody>
-                    <a:bodyPr/>
-                    <a:lstStyle/>
-                    <a:p>
-                      <a:pPr marL="0" marR="0" algn="ctr" hangingPunct="0">
-                        <a:spcBef>
-                          <a:spcPts val="0"/>
-                        </a:spcBef>
-                        <a:spcAft>
-                          <a:spcPts val="0"/>
-                        </a:spcAft>
-                      </a:pPr>
-                      <a:r>
-                        <a:rPr lang="en-US" sz="2000">
-                          <a:effectLst/>
-                        </a:rPr>
-                        <a:t>Original Semi-Implicit</a:t>
-                      </a:r>
-                      <a:endParaRPr lang="en-US" sz="2000">
-                        <a:effectLst/>
-                        <a:latin typeface="Times New Roman"/>
-                        <a:ea typeface="Times New Roman"/>
-                      </a:endParaRPr>
-                    </a:p>
-                  </a:txBody>
-                  <a:tcPr marL="68580" marR="68580" marT="0" marB="0" anchor="ctr"/>
-                </a:tc>
-                <a:tc>
-                  <a:txBody>
-                    <a:bodyPr/>
-                    <a:lstStyle/>
-                    <a:p>
-                      <a:pPr marL="0" marR="0" algn="ctr" hangingPunct="0">
-                        <a:spcBef>
-                          <a:spcPts val="0"/>
-                        </a:spcBef>
-                        <a:spcAft>
-                          <a:spcPts val="0"/>
-                        </a:spcAft>
-                      </a:pPr>
-                      <a:r>
-                        <a:rPr lang="en-US" sz="2000">
-                          <a:effectLst/>
-                        </a:rPr>
-                        <a:t>0.05</a:t>
-                      </a:r>
-                      <a:endParaRPr lang="en-US" sz="2000">
-                        <a:effectLst/>
-                        <a:latin typeface="Times New Roman"/>
-                        <a:ea typeface="Times New Roman"/>
-                      </a:endParaRPr>
-                    </a:p>
-                  </a:txBody>
-                  <a:tcPr marL="68580" marR="68580" marT="0" marB="0" anchor="ctr"/>
-                </a:tc>
-                <a:tc>
-                  <a:txBody>
-                    <a:bodyPr/>
-                    <a:lstStyle/>
-                    <a:p>
-                      <a:pPr marL="0" marR="0" algn="ctr" hangingPunct="0">
-                        <a:spcBef>
-                          <a:spcPts val="0"/>
-                        </a:spcBef>
-                        <a:spcAft>
-                          <a:spcPts val="0"/>
-                        </a:spcAft>
-                      </a:pPr>
-                      <a:r>
-                        <a:rPr lang="en-US" sz="2000">
-                          <a:effectLst/>
-                        </a:rPr>
-                        <a:t>2.226</a:t>
-                      </a:r>
-                      <a:endParaRPr lang="en-US" sz="2000">
-                        <a:effectLst/>
-                        <a:latin typeface="Times New Roman"/>
-                        <a:ea typeface="Times New Roman"/>
-                      </a:endParaRPr>
-                    </a:p>
-                  </a:txBody>
-                  <a:tcPr marL="68580" marR="68580" marT="0" marB="0" anchor="ctr"/>
-                </a:tc>
-              </a:tr>
-              <a:tr h="342900">
-                <a:tc>
-                  <a:txBody>
-                    <a:bodyPr/>
-                    <a:lstStyle/>
-                    <a:p>
-                      <a:pPr marL="0" marR="0" algn="ctr" hangingPunct="0">
-                        <a:spcBef>
-                          <a:spcPts val="0"/>
-                        </a:spcBef>
-                        <a:spcAft>
-                          <a:spcPts val="0"/>
-                        </a:spcAft>
-                      </a:pPr>
-                      <a:r>
-                        <a:rPr lang="en-US" sz="2000" b="0" dirty="0">
-                          <a:effectLst/>
-                        </a:rPr>
-                        <a:t>Residual</a:t>
-                      </a:r>
-                      <a:endParaRPr lang="en-US" sz="2000" b="0" dirty="0">
-                        <a:effectLst/>
-                        <a:latin typeface="Times New Roman"/>
-                        <a:ea typeface="Times New Roman"/>
-                      </a:endParaRPr>
-                    </a:p>
-                  </a:txBody>
-                  <a:tcPr marL="68580" marR="68580" marT="0" marB="0" anchor="ctr"/>
-                </a:tc>
-                <a:tc>
-                  <a:txBody>
-                    <a:bodyPr/>
-                    <a:lstStyle/>
-                    <a:p>
-                      <a:pPr marL="0" marR="0" algn="ctr" hangingPunct="0">
-                        <a:spcBef>
-                          <a:spcPts val="0"/>
-                        </a:spcBef>
-                        <a:spcAft>
-                          <a:spcPts val="0"/>
-                        </a:spcAft>
-                      </a:pPr>
-                      <a:r>
-                        <a:rPr lang="en-US" sz="2000">
-                          <a:effectLst/>
-                        </a:rPr>
-                        <a:t>Semi-Implicit</a:t>
-                      </a:r>
-                      <a:endParaRPr lang="en-US" sz="2000">
-                        <a:effectLst/>
-                        <a:latin typeface="Times New Roman"/>
-                        <a:ea typeface="Times New Roman"/>
-                      </a:endParaRPr>
-                    </a:p>
-                  </a:txBody>
-                  <a:tcPr marL="68580" marR="68580" marT="0" marB="0" anchor="ctr"/>
-                </a:tc>
-                <a:tc>
-                  <a:txBody>
-                    <a:bodyPr/>
-                    <a:lstStyle/>
-                    <a:p>
-                      <a:pPr marL="0" marR="0" algn="ctr" hangingPunct="0">
-                        <a:spcBef>
-                          <a:spcPts val="0"/>
-                        </a:spcBef>
-                        <a:spcAft>
-                          <a:spcPts val="0"/>
-                        </a:spcAft>
-                      </a:pPr>
-                      <a:r>
-                        <a:rPr lang="en-US" sz="2000">
-                          <a:effectLst/>
-                        </a:rPr>
-                        <a:t>0.05</a:t>
-                      </a:r>
-                      <a:endParaRPr lang="en-US" sz="2000">
-                        <a:effectLst/>
-                        <a:latin typeface="Times New Roman"/>
-                        <a:ea typeface="Times New Roman"/>
-                      </a:endParaRPr>
-                    </a:p>
-                  </a:txBody>
-                  <a:tcPr marL="68580" marR="68580" marT="0" marB="0" anchor="ctr"/>
-                </a:tc>
-                <a:tc>
-                  <a:txBody>
-                    <a:bodyPr/>
-                    <a:lstStyle/>
-                    <a:p>
-                      <a:pPr marL="0" marR="0" algn="ctr" hangingPunct="0">
-                        <a:spcBef>
-                          <a:spcPts val="0"/>
-                        </a:spcBef>
-                        <a:spcAft>
-                          <a:spcPts val="0"/>
-                        </a:spcAft>
-                      </a:pPr>
-                      <a:r>
-                        <a:rPr lang="en-US" sz="2000">
-                          <a:effectLst/>
-                        </a:rPr>
-                        <a:t>8.591</a:t>
-                      </a:r>
-                      <a:endParaRPr lang="en-US" sz="2000">
-                        <a:effectLst/>
-                        <a:latin typeface="Times New Roman"/>
-                        <a:ea typeface="Times New Roman"/>
-                      </a:endParaRPr>
-                    </a:p>
-                  </a:txBody>
-                  <a:tcPr marL="68580" marR="68580" marT="0" marB="0" anchor="ctr"/>
-                </a:tc>
-              </a:tr>
-              <a:tr h="342900">
-                <a:tc>
-                  <a:txBody>
-                    <a:bodyPr/>
-                    <a:lstStyle/>
-                    <a:p>
-                      <a:pPr marL="0" marR="0" algn="ctr" hangingPunct="0">
-                        <a:spcBef>
-                          <a:spcPts val="0"/>
-                        </a:spcBef>
-                        <a:spcAft>
-                          <a:spcPts val="0"/>
-                        </a:spcAft>
-                      </a:pPr>
-                      <a:r>
-                        <a:rPr lang="en-US" sz="2000" b="0" dirty="0">
-                          <a:effectLst/>
-                        </a:rPr>
-                        <a:t>Residual</a:t>
-                      </a:r>
-                      <a:endParaRPr lang="en-US" sz="2000" b="0" dirty="0">
-                        <a:effectLst/>
-                        <a:latin typeface="Times New Roman"/>
-                        <a:ea typeface="Times New Roman"/>
-                      </a:endParaRPr>
-                    </a:p>
-                  </a:txBody>
-                  <a:tcPr marL="68580" marR="68580" marT="0" marB="0" anchor="ctr"/>
-                </a:tc>
-                <a:tc>
-                  <a:txBody>
-                    <a:bodyPr/>
-                    <a:lstStyle/>
-                    <a:p>
-                      <a:pPr marL="0" marR="0" algn="ctr" hangingPunct="0">
-                        <a:spcBef>
-                          <a:spcPts val="0"/>
-                        </a:spcBef>
-                        <a:spcAft>
-                          <a:spcPts val="0"/>
-                        </a:spcAft>
-                      </a:pPr>
-                      <a:r>
-                        <a:rPr lang="en-US" sz="2000" dirty="0">
-                          <a:effectLst/>
-                        </a:rPr>
-                        <a:t>Implicit</a:t>
-                      </a:r>
-                      <a:endParaRPr lang="en-US" sz="2000" dirty="0">
-                        <a:effectLst/>
-                        <a:latin typeface="Times New Roman"/>
-                        <a:ea typeface="Times New Roman"/>
-                      </a:endParaRPr>
-                    </a:p>
-                  </a:txBody>
-                  <a:tcPr marL="68580" marR="68580" marT="0" marB="0" anchor="ctr"/>
-                </a:tc>
-                <a:tc>
-                  <a:txBody>
-                    <a:bodyPr/>
-                    <a:lstStyle/>
-                    <a:p>
-                      <a:pPr marL="0" marR="0" algn="ctr" hangingPunct="0">
-                        <a:spcBef>
-                          <a:spcPts val="0"/>
-                        </a:spcBef>
-                        <a:spcAft>
-                          <a:spcPts val="0"/>
-                        </a:spcAft>
-                      </a:pPr>
-                      <a:r>
-                        <a:rPr lang="en-US" sz="2000">
-                          <a:effectLst/>
-                        </a:rPr>
-                        <a:t>0.05</a:t>
-                      </a:r>
-                      <a:endParaRPr lang="en-US" sz="2000">
-                        <a:effectLst/>
-                        <a:latin typeface="Times New Roman"/>
-                        <a:ea typeface="Times New Roman"/>
-                      </a:endParaRPr>
-                    </a:p>
-                  </a:txBody>
-                  <a:tcPr marL="68580" marR="68580" marT="0" marB="0" anchor="ctr"/>
-                </a:tc>
-                <a:tc>
-                  <a:txBody>
-                    <a:bodyPr/>
-                    <a:lstStyle/>
-                    <a:p>
-                      <a:pPr marL="0" marR="0" algn="ctr" hangingPunct="0">
-                        <a:spcBef>
-                          <a:spcPts val="0"/>
-                        </a:spcBef>
-                        <a:spcAft>
-                          <a:spcPts val="0"/>
-                        </a:spcAft>
-                      </a:pPr>
-                      <a:r>
-                        <a:rPr lang="en-US" sz="2000">
-                          <a:effectLst/>
-                        </a:rPr>
-                        <a:t>36.709</a:t>
-                      </a:r>
-                      <a:endParaRPr lang="en-US" sz="2000">
-                        <a:effectLst/>
-                        <a:latin typeface="Times New Roman"/>
-                        <a:ea typeface="Times New Roman"/>
-                      </a:endParaRPr>
-                    </a:p>
-                  </a:txBody>
-                  <a:tcPr marL="68580" marR="68580" marT="0" marB="0" anchor="ctr"/>
-                </a:tc>
-              </a:tr>
-              <a:tr h="342900">
-                <a:tc>
-                  <a:txBody>
-                    <a:bodyPr/>
-                    <a:lstStyle/>
-                    <a:p>
-                      <a:pPr marL="0" marR="0" algn="ctr" hangingPunct="0">
-                        <a:spcBef>
-                          <a:spcPts val="0"/>
-                        </a:spcBef>
-                        <a:spcAft>
-                          <a:spcPts val="0"/>
-                        </a:spcAft>
-                      </a:pPr>
-                      <a:r>
-                        <a:rPr lang="en-US" sz="2000" b="0" dirty="0">
-                          <a:effectLst/>
-                        </a:rPr>
-                        <a:t>Residual</a:t>
-                      </a:r>
-                      <a:endParaRPr lang="en-US" sz="2000" b="0" dirty="0">
-                        <a:effectLst/>
-                        <a:latin typeface="Times New Roman"/>
-                        <a:ea typeface="Times New Roman"/>
-                      </a:endParaRPr>
-                    </a:p>
-                  </a:txBody>
-                  <a:tcPr marL="68580" marR="68580" marT="0" marB="0" anchor="ctr"/>
-                </a:tc>
-                <a:tc>
-                  <a:txBody>
-                    <a:bodyPr/>
-                    <a:lstStyle/>
-                    <a:p>
-                      <a:pPr marL="0" marR="0" algn="ctr" hangingPunct="0">
-                        <a:spcBef>
-                          <a:spcPts val="0"/>
-                        </a:spcBef>
-                        <a:spcAft>
-                          <a:spcPts val="0"/>
-                        </a:spcAft>
-                      </a:pPr>
-                      <a:r>
-                        <a:rPr lang="en-US" sz="2000">
-                          <a:effectLst/>
-                        </a:rPr>
-                        <a:t>Implicit</a:t>
-                      </a:r>
-                      <a:endParaRPr lang="en-US" sz="2000">
-                        <a:effectLst/>
-                        <a:latin typeface="Times New Roman"/>
-                        <a:ea typeface="Times New Roman"/>
-                      </a:endParaRPr>
-                    </a:p>
-                  </a:txBody>
-                  <a:tcPr marL="68580" marR="68580" marT="0" marB="0" anchor="ctr"/>
-                </a:tc>
-                <a:tc>
-                  <a:txBody>
-                    <a:bodyPr/>
-                    <a:lstStyle/>
-                    <a:p>
-                      <a:pPr marL="0" marR="0" algn="ctr" hangingPunct="0">
-                        <a:spcBef>
-                          <a:spcPts val="0"/>
-                        </a:spcBef>
-                        <a:spcAft>
-                          <a:spcPts val="0"/>
-                        </a:spcAft>
-                      </a:pPr>
-                      <a:r>
-                        <a:rPr lang="en-US" sz="2000" dirty="0">
-                          <a:effectLst/>
-                        </a:rPr>
-                        <a:t>1.00</a:t>
-                      </a:r>
-                      <a:endParaRPr lang="en-US" sz="2000" dirty="0">
-                        <a:effectLst/>
-                        <a:latin typeface="Times New Roman"/>
-                        <a:ea typeface="Times New Roman"/>
-                      </a:endParaRPr>
-                    </a:p>
-                  </a:txBody>
-                  <a:tcPr marL="68580" marR="68580" marT="0" marB="0" anchor="ctr"/>
-                </a:tc>
-                <a:tc>
-                  <a:txBody>
-                    <a:bodyPr/>
-                    <a:lstStyle/>
-                    <a:p>
-                      <a:pPr marL="0" marR="0" algn="ctr" hangingPunct="0">
-                        <a:spcBef>
-                          <a:spcPts val="0"/>
-                        </a:spcBef>
-                        <a:spcAft>
-                          <a:spcPts val="0"/>
-                        </a:spcAft>
-                      </a:pPr>
-                      <a:r>
-                        <a:rPr lang="en-US" sz="2000">
-                          <a:effectLst/>
-                        </a:rPr>
-                        <a:t>2.377</a:t>
-                      </a:r>
-                      <a:endParaRPr lang="en-US" sz="2000">
-                        <a:effectLst/>
-                        <a:latin typeface="Times New Roman"/>
-                        <a:ea typeface="Times New Roman"/>
-                      </a:endParaRPr>
-                    </a:p>
-                  </a:txBody>
-                  <a:tcPr marL="68580" marR="68580" marT="0" marB="0" anchor="ctr"/>
-                </a:tc>
-              </a:tr>
-              <a:tr h="342900">
-                <a:tc>
-                  <a:txBody>
-                    <a:bodyPr/>
-                    <a:lstStyle/>
-                    <a:p>
-                      <a:pPr marL="0" marR="0" algn="ctr" hangingPunct="0">
-                        <a:spcBef>
-                          <a:spcPts val="0"/>
-                        </a:spcBef>
-                        <a:spcAft>
-                          <a:spcPts val="0"/>
-                        </a:spcAft>
-                      </a:pPr>
-                      <a:r>
-                        <a:rPr lang="en-US" sz="2000" b="0" dirty="0">
-                          <a:effectLst/>
-                        </a:rPr>
-                        <a:t>Residual</a:t>
-                      </a:r>
-                      <a:endParaRPr lang="en-US" sz="2000" b="0" dirty="0">
-                        <a:effectLst/>
-                        <a:latin typeface="Times New Roman"/>
-                        <a:ea typeface="Times New Roman"/>
-                      </a:endParaRPr>
-                    </a:p>
-                  </a:txBody>
-                  <a:tcPr marL="68580" marR="68580" marT="0" marB="0" anchor="ctr"/>
-                </a:tc>
-                <a:tc>
-                  <a:txBody>
-                    <a:bodyPr/>
-                    <a:lstStyle/>
-                    <a:p>
-                      <a:pPr marL="0" marR="0" algn="ctr" hangingPunct="0">
-                        <a:spcBef>
-                          <a:spcPts val="0"/>
-                        </a:spcBef>
-                        <a:spcAft>
-                          <a:spcPts val="0"/>
-                        </a:spcAft>
-                      </a:pPr>
-                      <a:r>
-                        <a:rPr lang="en-US" sz="2000">
-                          <a:effectLst/>
-                        </a:rPr>
-                        <a:t>Implicit</a:t>
-                      </a:r>
-                      <a:endParaRPr lang="en-US" sz="2000">
-                        <a:effectLst/>
-                        <a:latin typeface="Times New Roman"/>
-                        <a:ea typeface="Times New Roman"/>
-                      </a:endParaRPr>
-                    </a:p>
-                  </a:txBody>
-                  <a:tcPr marL="68580" marR="68580" marT="0" marB="0" anchor="ctr"/>
-                </a:tc>
-                <a:tc>
-                  <a:txBody>
-                    <a:bodyPr/>
-                    <a:lstStyle/>
-                    <a:p>
-                      <a:pPr marL="0" marR="0" algn="ctr" hangingPunct="0">
-                        <a:spcBef>
-                          <a:spcPts val="0"/>
-                        </a:spcBef>
-                        <a:spcAft>
-                          <a:spcPts val="0"/>
-                        </a:spcAft>
-                      </a:pPr>
-                      <a:r>
-                        <a:rPr lang="en-US" sz="2000">
-                          <a:effectLst/>
-                        </a:rPr>
-                        <a:t>10.00</a:t>
-                      </a:r>
-                      <a:endParaRPr lang="en-US" sz="2000">
-                        <a:effectLst/>
-                        <a:latin typeface="Times New Roman"/>
-                        <a:ea typeface="Times New Roman"/>
-                      </a:endParaRPr>
-                    </a:p>
-                  </a:txBody>
-                  <a:tcPr marL="68580" marR="68580" marT="0" marB="0" anchor="ctr"/>
-                </a:tc>
-                <a:tc>
-                  <a:txBody>
-                    <a:bodyPr/>
-                    <a:lstStyle/>
-                    <a:p>
-                      <a:pPr marL="0" marR="0" algn="ctr" hangingPunct="0">
-                        <a:spcBef>
-                          <a:spcPts val="0"/>
-                        </a:spcBef>
-                        <a:spcAft>
-                          <a:spcPts val="0"/>
-                        </a:spcAft>
-                      </a:pPr>
-                      <a:r>
-                        <a:rPr lang="en-US" sz="2000" dirty="0">
-                          <a:effectLst/>
-                        </a:rPr>
-                        <a:t>0.622</a:t>
-                      </a:r>
-                      <a:endParaRPr lang="en-US" sz="2000" dirty="0">
-                        <a:effectLst/>
-                        <a:latin typeface="Times New Roman"/>
-                        <a:ea typeface="Times New Roman"/>
-                      </a:endParaRPr>
-                    </a:p>
-                  </a:txBody>
-                  <a:tcPr marL="68580" marR="68580" marT="0" marB="0" anchor="ctr"/>
-                </a:tc>
-              </a:tr>
-            </a:tbl>
-          </a:graphicData>
-        </a:graphic>
-      </p:graphicFrame>
       <p:pic>
         <p:nvPicPr>
           <p:cNvPr id="53" name="Picture 52"/>
@@ -11606,8 +11044,8 @@
         </p:blipFill>
         <p:spPr bwMode="auto">
           <a:xfrm>
-            <a:off x="685799" y="23110686"/>
-            <a:ext cx="4762499" cy="4925272"/>
+            <a:off x="16495821" y="13034479"/>
+            <a:ext cx="4762499" cy="4872522"/>
           </a:xfrm>
           <a:prstGeom prst="rect">
             <a:avLst/>
@@ -11630,8 +11068,8 @@
         </p:nvSpPr>
         <p:spPr>
           <a:xfrm>
-            <a:off x="8991601" y="8056962"/>
-            <a:ext cx="5391150" cy="707886"/>
+            <a:off x="8915400" y="8056962"/>
+            <a:ext cx="5467351" cy="707886"/>
           </a:xfrm>
           <a:prstGeom prst="rect">
             <a:avLst/>
@@ -11671,8 +11109,8 @@
             </p:nvSpPr>
             <p:spPr>
               <a:xfrm>
-                <a:off x="10604607" y="17983200"/>
-                <a:ext cx="3478003" cy="819776"/>
+                <a:off x="10439400" y="17983200"/>
+                <a:ext cx="4029693" cy="940963"/>
               </a:xfrm>
               <a:prstGeom prst="rect">
                 <a:avLst/>
@@ -11684,6 +11122,7 @@
               </a:bodyPr>
               <a:lstStyle/>
               <a:p>
+                <a:pPr/>
                 <a14:m>
                   <m:oMathPara xmlns:m="http://schemas.openxmlformats.org/officeDocument/2006/math">
                     <m:oMathParaPr>
@@ -11693,14 +11132,14 @@
                       <m:sSub>
                         <m:sSubPr>
                           <m:ctrlPr>
-                            <a:rPr lang="en-US" sz="2400" i="1">
+                            <a:rPr lang="en-US" sz="2800" i="1">
                               <a:latin typeface="Cambria Math"/>
                             </a:rPr>
                           </m:ctrlPr>
                         </m:sSubPr>
                         <m:e>
                           <m:r>
-                            <a:rPr lang="en-US" sz="2400" i="1">
+                            <a:rPr lang="en-US" sz="2800" i="1">
                               <a:latin typeface="Cambria Math"/>
                             </a:rPr>
                             <m:t>𝐽</m:t>
@@ -11708,19 +11147,19 @@
                         </m:e>
                         <m:sub>
                           <m:r>
-                            <a:rPr lang="en-US" sz="2400" i="1">
+                            <a:rPr lang="en-US" sz="2800" i="1">
                               <a:latin typeface="Cambria Math"/>
                             </a:rPr>
                             <m:t>𝑖</m:t>
                           </m:r>
                           <m:r>
-                            <a:rPr lang="en-US" sz="2400">
+                            <a:rPr lang="en-US" sz="2800">
                               <a:latin typeface="Cambria Math"/>
                             </a:rPr>
                             <m:t>,</m:t>
                           </m:r>
                           <m:r>
-                            <a:rPr lang="en-US" sz="2400" i="1">
+                            <a:rPr lang="en-US" sz="2800" i="1">
                               <a:latin typeface="Cambria Math"/>
                             </a:rPr>
                             <m:t>𝑗</m:t>
@@ -11728,7 +11167,7 @@
                         </m:sub>
                       </m:sSub>
                       <m:r>
-                        <a:rPr lang="en-US" sz="2400">
+                        <a:rPr lang="en-US" sz="2800">
                           <a:latin typeface="Cambria Math"/>
                         </a:rPr>
                         <m:t>≈</m:t>
@@ -11736,7 +11175,7 @@
                       <m:f>
                         <m:fPr>
                           <m:ctrlPr>
-                            <a:rPr lang="en-US" sz="2400" i="1">
+                            <a:rPr lang="en-US" sz="2800" i="1">
                               <a:latin typeface="Cambria Math"/>
                             </a:rPr>
                           </m:ctrlPr>
@@ -11745,14 +11184,14 @@
                           <m:sSub>
                             <m:sSubPr>
                               <m:ctrlPr>
-                                <a:rPr lang="en-US" sz="2400" i="1">
+                                <a:rPr lang="en-US" sz="2800" i="1">
                                   <a:latin typeface="Cambria Math"/>
                                 </a:rPr>
                               </m:ctrlPr>
                             </m:sSubPr>
                             <m:e>
                               <m:r>
-                                <a:rPr lang="en-US" sz="2400" i="1">
+                                <a:rPr lang="en-US" sz="2800" i="1">
                                   <a:latin typeface="Cambria Math"/>
                                 </a:rPr>
                                 <m:t>𝐹</m:t>
@@ -11760,7 +11199,7 @@
                             </m:e>
                             <m:sub>
                               <m:r>
-                                <a:rPr lang="en-US" sz="2400" i="1">
+                                <a:rPr lang="en-US" sz="2800" i="1">
                                   <a:latin typeface="Cambria Math"/>
                                 </a:rPr>
                                 <m:t>𝑗</m:t>
@@ -11770,7 +11209,7 @@
                           <m:d>
                             <m:dPr>
                               <m:ctrlPr>
-                                <a:rPr lang="en-US" sz="2400" i="1">
+                                <a:rPr lang="en-US" sz="2800" i="1">
                                   <a:latin typeface="Cambria Math"/>
                                 </a:rPr>
                               </m:ctrlPr>
@@ -11779,14 +11218,14 @@
                               <m:sSub>
                                 <m:sSubPr>
                                   <m:ctrlPr>
-                                    <a:rPr lang="en-US" sz="2400" i="1">
+                                    <a:rPr lang="en-US" sz="2800" i="1">
                                       <a:latin typeface="Cambria Math"/>
                                     </a:rPr>
                                   </m:ctrlPr>
                                 </m:sSubPr>
                                 <m:e>
                                   <m:r>
-                                    <a:rPr lang="en-US" sz="2400" i="1">
+                                    <a:rPr lang="en-US" sz="2800" i="1">
                                       <a:latin typeface="Cambria Math"/>
                                     </a:rPr>
                                     <m:t>𝑋</m:t>
@@ -11794,7 +11233,7 @@
                                 </m:e>
                                 <m:sub>
                                   <m:r>
-                                    <a:rPr lang="en-US" sz="2400" i="1">
+                                    <a:rPr lang="en-US" sz="2800" i="1">
                                       <a:latin typeface="Cambria Math"/>
                                     </a:rPr>
                                     <m:t>𝑖</m:t>
@@ -11802,13 +11241,13 @@
                                 </m:sub>
                               </m:sSub>
                               <m:r>
-                                <a:rPr lang="en-US" sz="2400">
+                                <a:rPr lang="en-US" sz="2800">
                                   <a:latin typeface="Cambria Math"/>
                                 </a:rPr>
                                 <m:t>+</m:t>
                               </m:r>
                               <m:r>
-                                <a:rPr lang="en-US" sz="2400" i="1">
+                                <a:rPr lang="en-US" sz="2800" i="1">
                                   <a:latin typeface="Cambria Math"/>
                                 </a:rPr>
                                 <m:t>𝜖</m:t>
@@ -11816,7 +11255,7 @@
                             </m:e>
                           </m:d>
                           <m:r>
-                            <a:rPr lang="en-US" sz="2400" i="1">
+                            <a:rPr lang="en-US" sz="2800" i="1">
                               <a:latin typeface="Cambria Math"/>
                             </a:rPr>
                             <m:t>−</m:t>
@@ -11824,14 +11263,14 @@
                           <m:sSub>
                             <m:sSubPr>
                               <m:ctrlPr>
-                                <a:rPr lang="en-US" sz="2400" i="1">
+                                <a:rPr lang="en-US" sz="2800" i="1">
                                   <a:latin typeface="Cambria Math"/>
                                 </a:rPr>
                               </m:ctrlPr>
                             </m:sSubPr>
                             <m:e>
                               <m:r>
-                                <a:rPr lang="en-US" sz="2400" i="1">
+                                <a:rPr lang="en-US" sz="2800" i="1">
                                   <a:latin typeface="Cambria Math"/>
                                 </a:rPr>
                                 <m:t>𝐹</m:t>
@@ -11839,7 +11278,7 @@
                             </m:e>
                             <m:sub>
                               <m:r>
-                                <a:rPr lang="en-US" sz="2400" i="1">
+                                <a:rPr lang="en-US" sz="2800" i="1">
                                   <a:latin typeface="Cambria Math"/>
                                 </a:rPr>
                                 <m:t>𝑗</m:t>
@@ -11849,7 +11288,7 @@
                           <m:d>
                             <m:dPr>
                               <m:ctrlPr>
-                                <a:rPr lang="en-US" sz="2400" i="1">
+                                <a:rPr lang="en-US" sz="2800" i="1">
                                   <a:latin typeface="Cambria Math"/>
                                 </a:rPr>
                               </m:ctrlPr>
@@ -11858,14 +11297,14 @@
                               <m:sSub>
                                 <m:sSubPr>
                                   <m:ctrlPr>
-                                    <a:rPr lang="en-US" sz="2400" i="1">
+                                    <a:rPr lang="en-US" sz="2800" i="1">
                                       <a:latin typeface="Cambria Math"/>
                                     </a:rPr>
                                   </m:ctrlPr>
                                 </m:sSubPr>
                                 <m:e>
                                   <m:r>
-                                    <a:rPr lang="en-US" sz="2400" i="1">
+                                    <a:rPr lang="en-US" sz="2800" i="1">
                                       <a:latin typeface="Cambria Math"/>
                                     </a:rPr>
                                     <m:t>𝑋</m:t>
@@ -11873,7 +11312,7 @@
                                 </m:e>
                                 <m:sub>
                                   <m:r>
-                                    <a:rPr lang="en-US" sz="2400" i="1">
+                                    <a:rPr lang="en-US" sz="2800" i="1">
                                       <a:latin typeface="Cambria Math"/>
                                     </a:rPr>
                                     <m:t>𝑖</m:t>
@@ -11885,7 +11324,7 @@
                         </m:num>
                         <m:den>
                           <m:r>
-                            <a:rPr lang="en-US" sz="2400" i="1">
+                            <a:rPr lang="en-US" sz="2800" i="1">
                               <a:latin typeface="Cambria Math"/>
                             </a:rPr>
                             <m:t>𝜖</m:t>
@@ -11895,7 +11334,7 @@
                     </m:oMath>
                   </m:oMathPara>
                 </a14:m>
-                <a:endParaRPr lang="en-US" sz="2400" dirty="0"/>
+                <a:endParaRPr lang="en-US" sz="2800" dirty="0"/>
               </a:p>
             </p:txBody>
           </p:sp>
@@ -11911,8 +11350,8 @@
             </p:nvSpPr>
             <p:spPr>
               <a:xfrm>
-                <a:off x="10604607" y="17983200"/>
-                <a:ext cx="3478003" cy="819776"/>
+                <a:off x="10439400" y="17983200"/>
+                <a:ext cx="4029693" cy="940963"/>
               </a:xfrm>
               <a:prstGeom prst="rect">
                 <a:avLst/>
@@ -12001,8 +11440,8 @@
         </p:nvSpPr>
         <p:spPr>
           <a:xfrm>
-            <a:off x="5834396" y="13850279"/>
-            <a:ext cx="4615205" cy="707886"/>
+            <a:off x="5638800" y="13792200"/>
+            <a:ext cx="5181600" cy="707886"/>
           </a:xfrm>
           <a:prstGeom prst="rect">
             <a:avLst/>
@@ -12022,7 +11461,7 @@
                   <a:srgbClr val="003399"/>
                 </a:solidFill>
               </a:rPr>
-              <a:t>Coupled Jacobian</a:t>
+              <a:t>Implicit Jacobian</a:t>
             </a:r>
             <a:endParaRPr lang="en-US" sz="4000" b="1" dirty="0">
               <a:solidFill>
@@ -12040,7 +11479,7 @@
         </p:nvSpPr>
         <p:spPr>
           <a:xfrm>
-            <a:off x="5638801" y="22250400"/>
+            <a:off x="3164172" y="22332553"/>
             <a:ext cx="8318606" cy="707886"/>
           </a:xfrm>
           <a:prstGeom prst="rect">
@@ -12079,8 +11518,8 @@
         </p:nvSpPr>
         <p:spPr>
           <a:xfrm>
-            <a:off x="15488711" y="12794754"/>
-            <a:ext cx="6705600" cy="707886"/>
+            <a:off x="17830800" y="18288000"/>
+            <a:ext cx="8731464" cy="707886"/>
           </a:xfrm>
           <a:prstGeom prst="rect">
             <a:avLst/>
@@ -12100,7 +11539,15 @@
                   <a:srgbClr val="003399"/>
                 </a:solidFill>
               </a:rPr>
-              <a:t>Analytical Result</a:t>
+              <a:t>Analytical </a:t>
+            </a:r>
+            <a:r>
+              <a:rPr lang="en-US" sz="4000" b="1" dirty="0" smtClean="0">
+                <a:solidFill>
+                  <a:srgbClr val="003399"/>
+                </a:solidFill>
+              </a:rPr>
+              <a:t>Result for any Axial Level</a:t>
             </a:r>
             <a:endParaRPr lang="en-US" sz="4000" b="1" dirty="0">
               <a:solidFill>
@@ -12120,7 +11567,7 @@
             </p:nvSpPr>
             <p:spPr>
               <a:xfrm>
-                <a:off x="14951794" y="13502640"/>
+                <a:off x="18821400" y="18995886"/>
                 <a:ext cx="6268511" cy="1060483"/>
               </a:xfrm>
               <a:prstGeom prst="rect">
@@ -12461,7 +11908,7 @@
             </p:nvSpPr>
             <p:spPr>
               <a:xfrm>
-                <a:off x="14951794" y="13502640"/>
+                <a:off x="18821400" y="18995886"/>
                 <a:ext cx="6268511" cy="1060483"/>
               </a:xfrm>
               <a:prstGeom prst="rect">
@@ -12497,8 +11944,8 @@
         </p:nvSpPr>
         <p:spPr>
           <a:xfrm>
-            <a:off x="228600" y="22250400"/>
-            <a:ext cx="5219698" cy="707886"/>
+            <a:off x="14782800" y="12350999"/>
+            <a:ext cx="8148685" cy="707886"/>
           </a:xfrm>
           <a:prstGeom prst="rect">
             <a:avLst/>
@@ -12518,7 +11965,31 @@
                   <a:srgbClr val="003399"/>
                 </a:solidFill>
               </a:rPr>
-              <a:t>Rod Temperature</a:t>
+              <a:t>2D </a:t>
+            </a:r>
+            <a:r>
+              <a:rPr lang="en-US" sz="4000" b="1" dirty="0" smtClean="0">
+                <a:solidFill>
+                  <a:srgbClr val="003399"/>
+                </a:solidFill>
+              </a:rPr>
+              <a:t>Map of </a:t>
+            </a:r>
+            <a:r>
+              <a:rPr lang="en-US" sz="4000" b="1" dirty="0" smtClean="0">
+                <a:solidFill>
+                  <a:srgbClr val="003399"/>
+                </a:solidFill>
+              </a:rPr>
+              <a:t>Rod </a:t>
+            </a:r>
+            <a:r>
+              <a:rPr lang="en-US" sz="4000" b="1" dirty="0" smtClean="0">
+                <a:solidFill>
+                  <a:srgbClr val="003399"/>
+                </a:solidFill>
+              </a:rPr>
+              <a:t>Temperature</a:t>
             </a:r>
             <a:endParaRPr lang="en-US" sz="4000" b="1" dirty="0">
               <a:solidFill>
@@ -12614,8 +12085,8 @@
         </p:nvSpPr>
         <p:spPr>
           <a:xfrm>
-            <a:off x="1568511" y="28668166"/>
-            <a:ext cx="10712495" cy="707886"/>
+            <a:off x="304799" y="28575000"/>
+            <a:ext cx="14077951" cy="707886"/>
           </a:xfrm>
           <a:prstGeom prst="rect">
             <a:avLst/>
@@ -12635,7 +12106,23 @@
                   <a:srgbClr val="003399"/>
                 </a:solidFill>
               </a:rPr>
-              <a:t>Convergence of Finite Difference Solution</a:t>
+              <a:t>Convergence </a:t>
+            </a:r>
+            <a:r>
+              <a:rPr lang="en-US" sz="4000" b="1" dirty="0" smtClean="0">
+                <a:solidFill>
+                  <a:srgbClr val="003399"/>
+                </a:solidFill>
+              </a:rPr>
+              <a:t>of Error for </a:t>
+            </a:r>
+            <a:r>
+              <a:rPr lang="en-US" sz="4000" b="1" dirty="0" smtClean="0">
+                <a:solidFill>
+                  <a:srgbClr val="003399"/>
+                </a:solidFill>
+              </a:rPr>
+              <a:t>Finite Difference Solution</a:t>
             </a:r>
             <a:endParaRPr lang="en-US" sz="4000" b="1" dirty="0">
               <a:solidFill>
@@ -12653,8 +12140,8 @@
         </p:nvSpPr>
         <p:spPr>
           <a:xfrm>
-            <a:off x="1545651" y="31662737"/>
-            <a:ext cx="10712495" cy="707886"/>
+            <a:off x="228600" y="31662737"/>
+            <a:ext cx="14173199" cy="707886"/>
           </a:xfrm>
           <a:prstGeom prst="rect">
             <a:avLst/>
@@ -12681,6 +12168,821 @@
                 <a:srgbClr val="003399"/>
               </a:solidFill>
             </a:endParaRPr>
+          </a:p>
+        </p:txBody>
+      </p:sp>
+      <p:graphicFrame>
+        <p:nvGraphicFramePr>
+          <p:cNvPr id="52" name="Table 51"/>
+          <p:cNvGraphicFramePr>
+            <a:graphicFrameLocks noGrp="1"/>
+          </p:cNvGraphicFramePr>
+          <p:nvPr>
+            <p:extLst>
+              <p:ext uri="{D42A27DB-BD31-4B8C-83A1-F6EECF244321}">
+                <p14:modId xmlns:p14="http://schemas.microsoft.com/office/powerpoint/2010/main" val="4031856323"/>
+              </p:ext>
+            </p:extLst>
+          </p:nvPr>
+        </p:nvGraphicFramePr>
+        <p:xfrm>
+          <a:off x="1250444" y="32533947"/>
+          <a:ext cx="12297916" cy="2194560"/>
+        </p:xfrm>
+        <a:graphic>
+          <a:graphicData uri="http://schemas.openxmlformats.org/drawingml/2006/table">
+            <a:tbl>
+              <a:tblPr firstRow="1" firstCol="1" bandRow="1">
+                <a:tableStyleId>{B301B821-A1FF-4177-AEE7-76D212191A09}</a:tableStyleId>
+              </a:tblPr>
+              <a:tblGrid>
+                <a:gridCol w="3582724"/>
+                <a:gridCol w="3061173"/>
+                <a:gridCol w="2684381"/>
+                <a:gridCol w="2969638"/>
+              </a:tblGrid>
+              <a:tr h="152400">
+                <a:tc>
+                  <a:txBody>
+                    <a:bodyPr/>
+                    <a:lstStyle/>
+                    <a:p>
+                      <a:pPr marL="0" marR="0" algn="ctr" hangingPunct="0">
+                        <a:spcBef>
+                          <a:spcPts val="0"/>
+                        </a:spcBef>
+                        <a:spcAft>
+                          <a:spcPts val="0"/>
+                        </a:spcAft>
+                      </a:pPr>
+                      <a:r>
+                        <a:rPr lang="en-US" sz="2400" dirty="0">
+                          <a:effectLst/>
+                        </a:rPr>
+                        <a:t>Code Version</a:t>
+                      </a:r>
+                      <a:endParaRPr lang="en-US" sz="2400" dirty="0">
+                        <a:effectLst/>
+                        <a:latin typeface="Times New Roman"/>
+                        <a:ea typeface="Times New Roman"/>
+                      </a:endParaRPr>
+                    </a:p>
+                  </a:txBody>
+                  <a:tcPr marL="68580" marR="68580" marT="0" marB="0" anchor="ctr"/>
+                </a:tc>
+                <a:tc>
+                  <a:txBody>
+                    <a:bodyPr/>
+                    <a:lstStyle/>
+                    <a:p>
+                      <a:pPr marL="0" marR="0" algn="ctr" hangingPunct="0">
+                        <a:spcBef>
+                          <a:spcPts val="0"/>
+                        </a:spcBef>
+                        <a:spcAft>
+                          <a:spcPts val="0"/>
+                        </a:spcAft>
+                      </a:pPr>
+                      <a:r>
+                        <a:rPr lang="en-US" sz="2400" dirty="0">
+                          <a:effectLst/>
+                        </a:rPr>
+                        <a:t>Solution Method</a:t>
+                      </a:r>
+                      <a:endParaRPr lang="en-US" sz="2400" dirty="0">
+                        <a:effectLst/>
+                        <a:latin typeface="Times New Roman"/>
+                        <a:ea typeface="Times New Roman"/>
+                      </a:endParaRPr>
+                    </a:p>
+                  </a:txBody>
+                  <a:tcPr marL="68580" marR="68580" marT="0" marB="0" anchor="ctr"/>
+                </a:tc>
+                <a:tc>
+                  <a:txBody>
+                    <a:bodyPr/>
+                    <a:lstStyle/>
+                    <a:p>
+                      <a:pPr marL="0" marR="0" algn="ctr" hangingPunct="0">
+                        <a:spcBef>
+                          <a:spcPts val="0"/>
+                        </a:spcBef>
+                        <a:spcAft>
+                          <a:spcPts val="0"/>
+                        </a:spcAft>
+                      </a:pPr>
+                      <a:r>
+                        <a:rPr lang="en-US" sz="2400" dirty="0">
+                          <a:effectLst/>
+                        </a:rPr>
+                        <a:t>Time Step Size [sec]</a:t>
+                      </a:r>
+                      <a:endParaRPr lang="en-US" sz="2400" dirty="0">
+                        <a:effectLst/>
+                        <a:latin typeface="Times New Roman"/>
+                        <a:ea typeface="Times New Roman"/>
+                      </a:endParaRPr>
+                    </a:p>
+                  </a:txBody>
+                  <a:tcPr marL="68580" marR="68580" marT="0" marB="0" anchor="ctr"/>
+                </a:tc>
+                <a:tc>
+                  <a:txBody>
+                    <a:bodyPr/>
+                    <a:lstStyle/>
+                    <a:p>
+                      <a:pPr marL="0" marR="0" algn="ctr" hangingPunct="0">
+                        <a:spcBef>
+                          <a:spcPts val="0"/>
+                        </a:spcBef>
+                        <a:spcAft>
+                          <a:spcPts val="0"/>
+                        </a:spcAft>
+                      </a:pPr>
+                      <a:r>
+                        <a:rPr lang="en-US" sz="2400" dirty="0">
+                          <a:effectLst/>
+                        </a:rPr>
+                        <a:t>Wall Clock Time [sec]</a:t>
+                      </a:r>
+                      <a:endParaRPr lang="en-US" sz="2400" dirty="0">
+                        <a:effectLst/>
+                        <a:latin typeface="Times New Roman"/>
+                        <a:ea typeface="Times New Roman"/>
+                      </a:endParaRPr>
+                    </a:p>
+                  </a:txBody>
+                  <a:tcPr marL="68580" marR="68580" marT="0" marB="0" anchor="ctr"/>
+                </a:tc>
+              </a:tr>
+              <a:tr h="152400">
+                <a:tc>
+                  <a:txBody>
+                    <a:bodyPr/>
+                    <a:lstStyle/>
+                    <a:p>
+                      <a:pPr marL="0" marR="0" algn="ctr" hangingPunct="0">
+                        <a:spcBef>
+                          <a:spcPts val="0"/>
+                        </a:spcBef>
+                        <a:spcAft>
+                          <a:spcPts val="0"/>
+                        </a:spcAft>
+                      </a:pPr>
+                      <a:r>
+                        <a:rPr lang="en-US" sz="2400" dirty="0">
+                          <a:effectLst/>
+                        </a:rPr>
+                        <a:t>Original</a:t>
+                      </a:r>
+                      <a:endParaRPr lang="en-US" sz="2400" b="0" dirty="0">
+                        <a:effectLst/>
+                        <a:latin typeface="Times New Roman"/>
+                        <a:ea typeface="Times New Roman"/>
+                      </a:endParaRPr>
+                    </a:p>
+                  </a:txBody>
+                  <a:tcPr marL="68580" marR="68580" marT="0" marB="0" anchor="ctr"/>
+                </a:tc>
+                <a:tc>
+                  <a:txBody>
+                    <a:bodyPr/>
+                    <a:lstStyle/>
+                    <a:p>
+                      <a:pPr marL="0" marR="0" algn="ctr" hangingPunct="0">
+                        <a:spcBef>
+                          <a:spcPts val="0"/>
+                        </a:spcBef>
+                        <a:spcAft>
+                          <a:spcPts val="0"/>
+                        </a:spcAft>
+                      </a:pPr>
+                      <a:r>
+                        <a:rPr lang="en-US" sz="2400">
+                          <a:effectLst/>
+                        </a:rPr>
+                        <a:t>Original Semi-Implicit</a:t>
+                      </a:r>
+                      <a:endParaRPr lang="en-US" sz="2400">
+                        <a:effectLst/>
+                        <a:latin typeface="Times New Roman"/>
+                        <a:ea typeface="Times New Roman"/>
+                      </a:endParaRPr>
+                    </a:p>
+                  </a:txBody>
+                  <a:tcPr marL="68580" marR="68580" marT="0" marB="0" anchor="ctr"/>
+                </a:tc>
+                <a:tc>
+                  <a:txBody>
+                    <a:bodyPr/>
+                    <a:lstStyle/>
+                    <a:p>
+                      <a:pPr marL="0" marR="0" algn="ctr" hangingPunct="0">
+                        <a:spcBef>
+                          <a:spcPts val="0"/>
+                        </a:spcBef>
+                        <a:spcAft>
+                          <a:spcPts val="0"/>
+                        </a:spcAft>
+                      </a:pPr>
+                      <a:r>
+                        <a:rPr lang="en-US" sz="2400">
+                          <a:effectLst/>
+                        </a:rPr>
+                        <a:t>0.05</a:t>
+                      </a:r>
+                      <a:endParaRPr lang="en-US" sz="2400">
+                        <a:effectLst/>
+                        <a:latin typeface="Times New Roman"/>
+                        <a:ea typeface="Times New Roman"/>
+                      </a:endParaRPr>
+                    </a:p>
+                  </a:txBody>
+                  <a:tcPr marL="68580" marR="68580" marT="0" marB="0" anchor="ctr"/>
+                </a:tc>
+                <a:tc>
+                  <a:txBody>
+                    <a:bodyPr/>
+                    <a:lstStyle/>
+                    <a:p>
+                      <a:pPr marL="0" marR="0" algn="ctr" hangingPunct="0">
+                        <a:spcBef>
+                          <a:spcPts val="0"/>
+                        </a:spcBef>
+                        <a:spcAft>
+                          <a:spcPts val="0"/>
+                        </a:spcAft>
+                      </a:pPr>
+                      <a:r>
+                        <a:rPr lang="en-US" sz="2400">
+                          <a:effectLst/>
+                        </a:rPr>
+                        <a:t>2.226</a:t>
+                      </a:r>
+                      <a:endParaRPr lang="en-US" sz="2400">
+                        <a:effectLst/>
+                        <a:latin typeface="Times New Roman"/>
+                        <a:ea typeface="Times New Roman"/>
+                      </a:endParaRPr>
+                    </a:p>
+                  </a:txBody>
+                  <a:tcPr marL="68580" marR="68580" marT="0" marB="0" anchor="ctr"/>
+                </a:tc>
+              </a:tr>
+              <a:tr h="152400">
+                <a:tc>
+                  <a:txBody>
+                    <a:bodyPr/>
+                    <a:lstStyle/>
+                    <a:p>
+                      <a:pPr marL="0" marR="0" algn="ctr" hangingPunct="0">
+                        <a:spcBef>
+                          <a:spcPts val="0"/>
+                        </a:spcBef>
+                        <a:spcAft>
+                          <a:spcPts val="0"/>
+                        </a:spcAft>
+                      </a:pPr>
+                      <a:r>
+                        <a:rPr lang="en-US" sz="2400" dirty="0">
+                          <a:effectLst/>
+                        </a:rPr>
+                        <a:t>Residual</a:t>
+                      </a:r>
+                      <a:endParaRPr lang="en-US" sz="2400" b="0" dirty="0">
+                        <a:effectLst/>
+                        <a:latin typeface="Times New Roman"/>
+                        <a:ea typeface="Times New Roman"/>
+                      </a:endParaRPr>
+                    </a:p>
+                  </a:txBody>
+                  <a:tcPr marL="68580" marR="68580" marT="0" marB="0" anchor="ctr"/>
+                </a:tc>
+                <a:tc>
+                  <a:txBody>
+                    <a:bodyPr/>
+                    <a:lstStyle/>
+                    <a:p>
+                      <a:pPr marL="0" marR="0" algn="ctr" hangingPunct="0">
+                        <a:spcBef>
+                          <a:spcPts val="0"/>
+                        </a:spcBef>
+                        <a:spcAft>
+                          <a:spcPts val="0"/>
+                        </a:spcAft>
+                      </a:pPr>
+                      <a:r>
+                        <a:rPr lang="en-US" sz="2400">
+                          <a:effectLst/>
+                        </a:rPr>
+                        <a:t>Semi-Implicit</a:t>
+                      </a:r>
+                      <a:endParaRPr lang="en-US" sz="2400">
+                        <a:effectLst/>
+                        <a:latin typeface="Times New Roman"/>
+                        <a:ea typeface="Times New Roman"/>
+                      </a:endParaRPr>
+                    </a:p>
+                  </a:txBody>
+                  <a:tcPr marL="68580" marR="68580" marT="0" marB="0" anchor="ctr"/>
+                </a:tc>
+                <a:tc>
+                  <a:txBody>
+                    <a:bodyPr/>
+                    <a:lstStyle/>
+                    <a:p>
+                      <a:pPr marL="0" marR="0" algn="ctr" hangingPunct="0">
+                        <a:spcBef>
+                          <a:spcPts val="0"/>
+                        </a:spcBef>
+                        <a:spcAft>
+                          <a:spcPts val="0"/>
+                        </a:spcAft>
+                      </a:pPr>
+                      <a:r>
+                        <a:rPr lang="en-US" sz="2400">
+                          <a:effectLst/>
+                        </a:rPr>
+                        <a:t>0.05</a:t>
+                      </a:r>
+                      <a:endParaRPr lang="en-US" sz="2400">
+                        <a:effectLst/>
+                        <a:latin typeface="Times New Roman"/>
+                        <a:ea typeface="Times New Roman"/>
+                      </a:endParaRPr>
+                    </a:p>
+                  </a:txBody>
+                  <a:tcPr marL="68580" marR="68580" marT="0" marB="0" anchor="ctr"/>
+                </a:tc>
+                <a:tc>
+                  <a:txBody>
+                    <a:bodyPr/>
+                    <a:lstStyle/>
+                    <a:p>
+                      <a:pPr marL="0" marR="0" algn="ctr" hangingPunct="0">
+                        <a:spcBef>
+                          <a:spcPts val="0"/>
+                        </a:spcBef>
+                        <a:spcAft>
+                          <a:spcPts val="0"/>
+                        </a:spcAft>
+                      </a:pPr>
+                      <a:r>
+                        <a:rPr lang="en-US" sz="2400" dirty="0">
+                          <a:effectLst/>
+                        </a:rPr>
+                        <a:t>8.591</a:t>
+                      </a:r>
+                      <a:endParaRPr lang="en-US" sz="2400" dirty="0">
+                        <a:effectLst/>
+                        <a:latin typeface="Times New Roman"/>
+                        <a:ea typeface="Times New Roman"/>
+                      </a:endParaRPr>
+                    </a:p>
+                  </a:txBody>
+                  <a:tcPr marL="68580" marR="68580" marT="0" marB="0" anchor="ctr"/>
+                </a:tc>
+              </a:tr>
+              <a:tr h="152400">
+                <a:tc>
+                  <a:txBody>
+                    <a:bodyPr/>
+                    <a:lstStyle/>
+                    <a:p>
+                      <a:pPr marL="0" marR="0" algn="ctr" hangingPunct="0">
+                        <a:spcBef>
+                          <a:spcPts val="0"/>
+                        </a:spcBef>
+                        <a:spcAft>
+                          <a:spcPts val="0"/>
+                        </a:spcAft>
+                      </a:pPr>
+                      <a:r>
+                        <a:rPr lang="en-US" sz="2400" dirty="0">
+                          <a:effectLst/>
+                        </a:rPr>
+                        <a:t>Residual</a:t>
+                      </a:r>
+                      <a:endParaRPr lang="en-US" sz="2400" b="0" dirty="0">
+                        <a:effectLst/>
+                        <a:latin typeface="Times New Roman"/>
+                        <a:ea typeface="Times New Roman"/>
+                      </a:endParaRPr>
+                    </a:p>
+                  </a:txBody>
+                  <a:tcPr marL="68580" marR="68580" marT="0" marB="0" anchor="ctr"/>
+                </a:tc>
+                <a:tc>
+                  <a:txBody>
+                    <a:bodyPr/>
+                    <a:lstStyle/>
+                    <a:p>
+                      <a:pPr marL="0" marR="0" algn="ctr" hangingPunct="0">
+                        <a:spcBef>
+                          <a:spcPts val="0"/>
+                        </a:spcBef>
+                        <a:spcAft>
+                          <a:spcPts val="0"/>
+                        </a:spcAft>
+                      </a:pPr>
+                      <a:r>
+                        <a:rPr lang="en-US" sz="2400" dirty="0">
+                          <a:effectLst/>
+                        </a:rPr>
+                        <a:t>Implicit</a:t>
+                      </a:r>
+                      <a:endParaRPr lang="en-US" sz="2400" dirty="0">
+                        <a:effectLst/>
+                        <a:latin typeface="Times New Roman"/>
+                        <a:ea typeface="Times New Roman"/>
+                      </a:endParaRPr>
+                    </a:p>
+                  </a:txBody>
+                  <a:tcPr marL="68580" marR="68580" marT="0" marB="0" anchor="ctr"/>
+                </a:tc>
+                <a:tc>
+                  <a:txBody>
+                    <a:bodyPr/>
+                    <a:lstStyle/>
+                    <a:p>
+                      <a:pPr marL="0" marR="0" algn="ctr" hangingPunct="0">
+                        <a:spcBef>
+                          <a:spcPts val="0"/>
+                        </a:spcBef>
+                        <a:spcAft>
+                          <a:spcPts val="0"/>
+                        </a:spcAft>
+                      </a:pPr>
+                      <a:r>
+                        <a:rPr lang="en-US" sz="2400">
+                          <a:effectLst/>
+                        </a:rPr>
+                        <a:t>0.05</a:t>
+                      </a:r>
+                      <a:endParaRPr lang="en-US" sz="2400">
+                        <a:effectLst/>
+                        <a:latin typeface="Times New Roman"/>
+                        <a:ea typeface="Times New Roman"/>
+                      </a:endParaRPr>
+                    </a:p>
+                  </a:txBody>
+                  <a:tcPr marL="68580" marR="68580" marT="0" marB="0" anchor="ctr"/>
+                </a:tc>
+                <a:tc>
+                  <a:txBody>
+                    <a:bodyPr/>
+                    <a:lstStyle/>
+                    <a:p>
+                      <a:pPr marL="0" marR="0" algn="ctr" hangingPunct="0">
+                        <a:spcBef>
+                          <a:spcPts val="0"/>
+                        </a:spcBef>
+                        <a:spcAft>
+                          <a:spcPts val="0"/>
+                        </a:spcAft>
+                      </a:pPr>
+                      <a:r>
+                        <a:rPr lang="en-US" sz="2400">
+                          <a:effectLst/>
+                        </a:rPr>
+                        <a:t>36.709</a:t>
+                      </a:r>
+                      <a:endParaRPr lang="en-US" sz="2400">
+                        <a:effectLst/>
+                        <a:latin typeface="Times New Roman"/>
+                        <a:ea typeface="Times New Roman"/>
+                      </a:endParaRPr>
+                    </a:p>
+                  </a:txBody>
+                  <a:tcPr marL="68580" marR="68580" marT="0" marB="0" anchor="ctr"/>
+                </a:tc>
+              </a:tr>
+              <a:tr h="152400">
+                <a:tc>
+                  <a:txBody>
+                    <a:bodyPr/>
+                    <a:lstStyle/>
+                    <a:p>
+                      <a:pPr marL="0" marR="0" algn="ctr" hangingPunct="0">
+                        <a:spcBef>
+                          <a:spcPts val="0"/>
+                        </a:spcBef>
+                        <a:spcAft>
+                          <a:spcPts val="0"/>
+                        </a:spcAft>
+                      </a:pPr>
+                      <a:r>
+                        <a:rPr lang="en-US" sz="2400" dirty="0">
+                          <a:effectLst/>
+                        </a:rPr>
+                        <a:t>Residual</a:t>
+                      </a:r>
+                      <a:endParaRPr lang="en-US" sz="2400" b="0" dirty="0">
+                        <a:effectLst/>
+                        <a:latin typeface="Times New Roman"/>
+                        <a:ea typeface="Times New Roman"/>
+                      </a:endParaRPr>
+                    </a:p>
+                  </a:txBody>
+                  <a:tcPr marL="68580" marR="68580" marT="0" marB="0" anchor="ctr"/>
+                </a:tc>
+                <a:tc>
+                  <a:txBody>
+                    <a:bodyPr/>
+                    <a:lstStyle/>
+                    <a:p>
+                      <a:pPr marL="0" marR="0" algn="ctr" hangingPunct="0">
+                        <a:spcBef>
+                          <a:spcPts val="0"/>
+                        </a:spcBef>
+                        <a:spcAft>
+                          <a:spcPts val="0"/>
+                        </a:spcAft>
+                      </a:pPr>
+                      <a:r>
+                        <a:rPr lang="en-US" sz="2400" dirty="0">
+                          <a:effectLst/>
+                        </a:rPr>
+                        <a:t>Implicit</a:t>
+                      </a:r>
+                      <a:endParaRPr lang="en-US" sz="2400" dirty="0">
+                        <a:effectLst/>
+                        <a:latin typeface="Times New Roman"/>
+                        <a:ea typeface="Times New Roman"/>
+                      </a:endParaRPr>
+                    </a:p>
+                  </a:txBody>
+                  <a:tcPr marL="68580" marR="68580" marT="0" marB="0" anchor="ctr"/>
+                </a:tc>
+                <a:tc>
+                  <a:txBody>
+                    <a:bodyPr/>
+                    <a:lstStyle/>
+                    <a:p>
+                      <a:pPr marL="0" marR="0" algn="ctr" hangingPunct="0">
+                        <a:spcBef>
+                          <a:spcPts val="0"/>
+                        </a:spcBef>
+                        <a:spcAft>
+                          <a:spcPts val="0"/>
+                        </a:spcAft>
+                      </a:pPr>
+                      <a:r>
+                        <a:rPr lang="en-US" sz="2400" dirty="0">
+                          <a:effectLst/>
+                        </a:rPr>
+                        <a:t>1.00</a:t>
+                      </a:r>
+                      <a:endParaRPr lang="en-US" sz="2400" dirty="0">
+                        <a:effectLst/>
+                        <a:latin typeface="Times New Roman"/>
+                        <a:ea typeface="Times New Roman"/>
+                      </a:endParaRPr>
+                    </a:p>
+                  </a:txBody>
+                  <a:tcPr marL="68580" marR="68580" marT="0" marB="0" anchor="ctr"/>
+                </a:tc>
+                <a:tc>
+                  <a:txBody>
+                    <a:bodyPr/>
+                    <a:lstStyle/>
+                    <a:p>
+                      <a:pPr marL="0" marR="0" algn="ctr" hangingPunct="0">
+                        <a:spcBef>
+                          <a:spcPts val="0"/>
+                        </a:spcBef>
+                        <a:spcAft>
+                          <a:spcPts val="0"/>
+                        </a:spcAft>
+                      </a:pPr>
+                      <a:r>
+                        <a:rPr lang="en-US" sz="2400">
+                          <a:effectLst/>
+                        </a:rPr>
+                        <a:t>2.377</a:t>
+                      </a:r>
+                      <a:endParaRPr lang="en-US" sz="2400">
+                        <a:effectLst/>
+                        <a:latin typeface="Times New Roman"/>
+                        <a:ea typeface="Times New Roman"/>
+                      </a:endParaRPr>
+                    </a:p>
+                  </a:txBody>
+                  <a:tcPr marL="68580" marR="68580" marT="0" marB="0" anchor="ctr"/>
+                </a:tc>
+              </a:tr>
+              <a:tr h="152400">
+                <a:tc>
+                  <a:txBody>
+                    <a:bodyPr/>
+                    <a:lstStyle/>
+                    <a:p>
+                      <a:pPr marL="0" marR="0" algn="ctr" hangingPunct="0">
+                        <a:spcBef>
+                          <a:spcPts val="0"/>
+                        </a:spcBef>
+                        <a:spcAft>
+                          <a:spcPts val="0"/>
+                        </a:spcAft>
+                      </a:pPr>
+                      <a:r>
+                        <a:rPr lang="en-US" sz="2400" dirty="0">
+                          <a:effectLst/>
+                        </a:rPr>
+                        <a:t>Residual</a:t>
+                      </a:r>
+                      <a:endParaRPr lang="en-US" sz="2400" b="0" dirty="0">
+                        <a:effectLst/>
+                        <a:latin typeface="Times New Roman"/>
+                        <a:ea typeface="Times New Roman"/>
+                      </a:endParaRPr>
+                    </a:p>
+                  </a:txBody>
+                  <a:tcPr marL="68580" marR="68580" marT="0" marB="0" anchor="ctr"/>
+                </a:tc>
+                <a:tc>
+                  <a:txBody>
+                    <a:bodyPr/>
+                    <a:lstStyle/>
+                    <a:p>
+                      <a:pPr marL="0" marR="0" algn="ctr" hangingPunct="0">
+                        <a:spcBef>
+                          <a:spcPts val="0"/>
+                        </a:spcBef>
+                        <a:spcAft>
+                          <a:spcPts val="0"/>
+                        </a:spcAft>
+                      </a:pPr>
+                      <a:r>
+                        <a:rPr lang="en-US" sz="2400" dirty="0">
+                          <a:effectLst/>
+                        </a:rPr>
+                        <a:t>Implicit</a:t>
+                      </a:r>
+                      <a:endParaRPr lang="en-US" sz="2400" dirty="0">
+                        <a:effectLst/>
+                        <a:latin typeface="Times New Roman"/>
+                        <a:ea typeface="Times New Roman"/>
+                      </a:endParaRPr>
+                    </a:p>
+                  </a:txBody>
+                  <a:tcPr marL="68580" marR="68580" marT="0" marB="0" anchor="ctr"/>
+                </a:tc>
+                <a:tc>
+                  <a:txBody>
+                    <a:bodyPr/>
+                    <a:lstStyle/>
+                    <a:p>
+                      <a:pPr marL="0" marR="0" algn="ctr" hangingPunct="0">
+                        <a:spcBef>
+                          <a:spcPts val="0"/>
+                        </a:spcBef>
+                        <a:spcAft>
+                          <a:spcPts val="0"/>
+                        </a:spcAft>
+                      </a:pPr>
+                      <a:r>
+                        <a:rPr lang="en-US" sz="2400" dirty="0">
+                          <a:effectLst/>
+                        </a:rPr>
+                        <a:t>10.00</a:t>
+                      </a:r>
+                      <a:endParaRPr lang="en-US" sz="2400" dirty="0">
+                        <a:effectLst/>
+                        <a:latin typeface="Times New Roman"/>
+                        <a:ea typeface="Times New Roman"/>
+                      </a:endParaRPr>
+                    </a:p>
+                  </a:txBody>
+                  <a:tcPr marL="68580" marR="68580" marT="0" marB="0" anchor="ctr"/>
+                </a:tc>
+                <a:tc>
+                  <a:txBody>
+                    <a:bodyPr/>
+                    <a:lstStyle/>
+                    <a:p>
+                      <a:pPr marL="0" marR="0" algn="ctr" hangingPunct="0">
+                        <a:spcBef>
+                          <a:spcPts val="0"/>
+                        </a:spcBef>
+                        <a:spcAft>
+                          <a:spcPts val="0"/>
+                        </a:spcAft>
+                      </a:pPr>
+                      <a:r>
+                        <a:rPr lang="en-US" sz="2400" dirty="0">
+                          <a:effectLst/>
+                        </a:rPr>
+                        <a:t>0.622</a:t>
+                      </a:r>
+                      <a:endParaRPr lang="en-US" sz="2400" dirty="0">
+                        <a:effectLst/>
+                        <a:latin typeface="Times New Roman"/>
+                        <a:ea typeface="Times New Roman"/>
+                      </a:endParaRPr>
+                    </a:p>
+                  </a:txBody>
+                  <a:tcPr marL="68580" marR="68580" marT="0" marB="0" anchor="ctr"/>
+                </a:tc>
+              </a:tr>
+            </a:tbl>
+          </a:graphicData>
+        </a:graphic>
+      </p:graphicFrame>
+      <p:sp>
+        <p:nvSpPr>
+          <p:cNvPr id="60" name="TextBox 59"/>
+          <p:cNvSpPr txBox="1"/>
+          <p:nvPr/>
+        </p:nvSpPr>
+        <p:spPr>
+          <a:xfrm rot="5400000">
+            <a:off x="20292178" y="15103824"/>
+            <a:ext cx="2378472" cy="492443"/>
+          </a:xfrm>
+          <a:prstGeom prst="rect">
+            <a:avLst/>
+          </a:prstGeom>
+          <a:noFill/>
+        </p:spPr>
+        <p:txBody>
+          <a:bodyPr wrap="none" rtlCol="0">
+            <a:spAutoFit/>
+          </a:bodyPr>
+          <a:lstStyle/>
+          <a:p>
+            <a:pPr algn="r"/>
+            <a:r>
+              <a:rPr lang="en-US" sz="2600" dirty="0" smtClean="0"/>
+              <a:t>Temperature [C]</a:t>
+            </a:r>
+            <a:endParaRPr lang="en-US" sz="2600" dirty="0"/>
+          </a:p>
+        </p:txBody>
+      </p:sp>
+      <p:sp>
+        <p:nvSpPr>
+          <p:cNvPr id="65" name="TextBox 64"/>
+          <p:cNvSpPr txBox="1"/>
+          <p:nvPr/>
+        </p:nvSpPr>
+        <p:spPr>
+          <a:xfrm rot="16200000">
+            <a:off x="15152476" y="15103824"/>
+            <a:ext cx="2686698" cy="492443"/>
+          </a:xfrm>
+          <a:prstGeom prst="rect">
+            <a:avLst/>
+          </a:prstGeom>
+          <a:solidFill>
+            <a:schemeClr val="bg1"/>
+          </a:solidFill>
+        </p:spPr>
+        <p:txBody>
+          <a:bodyPr wrap="none" rtlCol="0">
+            <a:spAutoFit/>
+          </a:bodyPr>
+          <a:lstStyle/>
+          <a:p>
+            <a:pPr algn="r"/>
+            <a:r>
+              <a:rPr lang="en-US" sz="2600" dirty="0" smtClean="0"/>
+              <a:t>Axial Position [cm]</a:t>
+            </a:r>
+            <a:endParaRPr lang="en-US" sz="2600" dirty="0"/>
+          </a:p>
+        </p:txBody>
+      </p:sp>
+      <p:sp>
+        <p:nvSpPr>
+          <p:cNvPr id="77" name="TextBox 76"/>
+          <p:cNvSpPr txBox="1"/>
+          <p:nvPr/>
+        </p:nvSpPr>
+        <p:spPr>
+          <a:xfrm>
+            <a:off x="17270264" y="17643157"/>
+            <a:ext cx="2866234" cy="492443"/>
+          </a:xfrm>
+          <a:prstGeom prst="rect">
+            <a:avLst/>
+          </a:prstGeom>
+          <a:solidFill>
+            <a:schemeClr val="bg1"/>
+          </a:solidFill>
+        </p:spPr>
+        <p:txBody>
+          <a:bodyPr wrap="none" rtlCol="0">
+            <a:spAutoFit/>
+          </a:bodyPr>
+          <a:lstStyle/>
+          <a:p>
+            <a:pPr algn="r"/>
+            <a:r>
+              <a:rPr lang="en-US" sz="2600" dirty="0" smtClean="0"/>
+              <a:t>Radial Position [cm]</a:t>
+            </a:r>
+            <a:endParaRPr lang="en-US" sz="2600" dirty="0"/>
           </a:p>
         </p:txBody>
       </p:sp>

</xml_diff>

<commit_message>
Final draft of the poster
</commit_message>
<xml_diff>
--- a/Poster_Dances.pptx
+++ b/Poster_Dances.pptx
@@ -759,11 +759,11 @@
           <c:showPercent val="0"/>
           <c:showBubbleSize val="0"/>
         </c:dLbls>
-        <c:axId val="152009728"/>
-        <c:axId val="155116672"/>
+        <c:axId val="165797888"/>
+        <c:axId val="165799808"/>
       </c:scatterChart>
       <c:valAx>
-        <c:axId val="152009728"/>
+        <c:axId val="165797888"/>
         <c:scaling>
           <c:orientation val="minMax"/>
         </c:scaling>
@@ -811,12 +811,12 @@
             <a:endParaRPr lang="en-US"/>
           </a:p>
         </c:txPr>
-        <c:crossAx val="155116672"/>
+        <c:crossAx val="165799808"/>
         <c:crossesAt val="0"/>
         <c:crossBetween val="midCat"/>
       </c:valAx>
       <c:valAx>
-        <c:axId val="155116672"/>
+        <c:axId val="165799808"/>
         <c:scaling>
           <c:orientation val="minMax"/>
         </c:scaling>
@@ -873,7 +873,7 @@
             <a:endParaRPr lang="en-US"/>
           </a:p>
         </c:txPr>
-        <c:crossAx val="152009728"/>
+        <c:crossAx val="165797888"/>
         <c:crossesAt val="0"/>
         <c:crossBetween val="midCat"/>
       </c:valAx>
@@ -1109,7 +1109,7 @@
           <a:p>
             <a:fld id="{64E28BAE-4352-426D-BB91-9C6CF2C2112E}" type="datetimeFigureOut">
               <a:rPr lang="en-US" smtClean="0"/>
-              <a:t>8/23/2015</a:t>
+              <a:t>8/25/2015</a:t>
             </a:fld>
             <a:endParaRPr lang="en-US"/>
           </a:p>
@@ -1279,7 +1279,7 @@
           <a:p>
             <a:fld id="{64E28BAE-4352-426D-BB91-9C6CF2C2112E}" type="datetimeFigureOut">
               <a:rPr lang="en-US" smtClean="0"/>
-              <a:t>8/23/2015</a:t>
+              <a:t>8/25/2015</a:t>
             </a:fld>
             <a:endParaRPr lang="en-US"/>
           </a:p>
@@ -1459,7 +1459,7 @@
           <a:p>
             <a:fld id="{64E28BAE-4352-426D-BB91-9C6CF2C2112E}" type="datetimeFigureOut">
               <a:rPr lang="en-US" smtClean="0"/>
-              <a:t>8/23/2015</a:t>
+              <a:t>8/25/2015</a:t>
             </a:fld>
             <a:endParaRPr lang="en-US"/>
           </a:p>
@@ -1629,7 +1629,7 @@
           <a:p>
             <a:fld id="{64E28BAE-4352-426D-BB91-9C6CF2C2112E}" type="datetimeFigureOut">
               <a:rPr lang="en-US" smtClean="0"/>
-              <a:t>8/23/2015</a:t>
+              <a:t>8/25/2015</a:t>
             </a:fld>
             <a:endParaRPr lang="en-US"/>
           </a:p>
@@ -1875,7 +1875,7 @@
           <a:p>
             <a:fld id="{64E28BAE-4352-426D-BB91-9C6CF2C2112E}" type="datetimeFigureOut">
               <a:rPr lang="en-US" smtClean="0"/>
-              <a:t>8/23/2015</a:t>
+              <a:t>8/25/2015</a:t>
             </a:fld>
             <a:endParaRPr lang="en-US"/>
           </a:p>
@@ -2163,7 +2163,7 @@
           <a:p>
             <a:fld id="{64E28BAE-4352-426D-BB91-9C6CF2C2112E}" type="datetimeFigureOut">
               <a:rPr lang="en-US" smtClean="0"/>
-              <a:t>8/23/2015</a:t>
+              <a:t>8/25/2015</a:t>
             </a:fld>
             <a:endParaRPr lang="en-US"/>
           </a:p>
@@ -2585,7 +2585,7 @@
           <a:p>
             <a:fld id="{64E28BAE-4352-426D-BB91-9C6CF2C2112E}" type="datetimeFigureOut">
               <a:rPr lang="en-US" smtClean="0"/>
-              <a:t>8/23/2015</a:t>
+              <a:t>8/25/2015</a:t>
             </a:fld>
             <a:endParaRPr lang="en-US"/>
           </a:p>
@@ -2703,7 +2703,7 @@
           <a:p>
             <a:fld id="{64E28BAE-4352-426D-BB91-9C6CF2C2112E}" type="datetimeFigureOut">
               <a:rPr lang="en-US" smtClean="0"/>
-              <a:t>8/23/2015</a:t>
+              <a:t>8/25/2015</a:t>
             </a:fld>
             <a:endParaRPr lang="en-US"/>
           </a:p>
@@ -2798,7 +2798,7 @@
           <a:p>
             <a:fld id="{64E28BAE-4352-426D-BB91-9C6CF2C2112E}" type="datetimeFigureOut">
               <a:rPr lang="en-US" smtClean="0"/>
-              <a:t>8/23/2015</a:t>
+              <a:t>8/25/2015</a:t>
             </a:fld>
             <a:endParaRPr lang="en-US"/>
           </a:p>
@@ -3075,7 +3075,7 @@
           <a:p>
             <a:fld id="{64E28BAE-4352-426D-BB91-9C6CF2C2112E}" type="datetimeFigureOut">
               <a:rPr lang="en-US" smtClean="0"/>
-              <a:t>8/23/2015</a:t>
+              <a:t>8/25/2015</a:t>
             </a:fld>
             <a:endParaRPr lang="en-US"/>
           </a:p>
@@ -3328,7 +3328,7 @@
           <a:p>
             <a:fld id="{64E28BAE-4352-426D-BB91-9C6CF2C2112E}" type="datetimeFigureOut">
               <a:rPr lang="en-US" smtClean="0"/>
-              <a:t>8/23/2015</a:t>
+              <a:t>8/25/2015</a:t>
             </a:fld>
             <a:endParaRPr lang="en-US"/>
           </a:p>
@@ -3544,7 +3544,7 @@
           <a:p>
             <a:fld id="{64E28BAE-4352-426D-BB91-9C6CF2C2112E}" type="datetimeFigureOut">
               <a:rPr lang="en-US" smtClean="0"/>
-              <a:t>8/23/2015</a:t>
+              <a:t>8/25/2015</a:t>
             </a:fld>
             <a:endParaRPr lang="en-US"/>
           </a:p>
@@ -3942,8 +3942,8 @@
         </p:blipFill>
         <p:spPr bwMode="auto">
           <a:xfrm>
-            <a:off x="34805" y="3581399"/>
-            <a:ext cx="5913172" cy="2643908"/>
+            <a:off x="60161" y="1817359"/>
+            <a:ext cx="4449675" cy="1989547"/>
           </a:xfrm>
           <a:prstGeom prst="rect">
             <a:avLst/>
@@ -3968,7 +3968,7 @@
         </p:nvSpPr>
         <p:spPr>
           <a:xfrm>
-            <a:off x="0" y="1987353"/>
+            <a:off x="-161307" y="1987353"/>
             <a:ext cx="29260800" cy="1754326"/>
           </a:xfrm>
           <a:prstGeom prst="rect">
@@ -3985,34 +3985,30 @@
             <a:pPr algn="ctr"/>
             <a:r>
               <a:rPr lang="en-US" sz="5400" dirty="0" smtClean="0"/>
-              <a:t>Chris Dances</a:t>
-            </a:r>
-          </a:p>
-          <a:p>
-            <a:pPr algn="ctr"/>
-            <a:r>
-              <a:rPr lang="en-US" sz="5400" dirty="0" smtClean="0"/>
-              <a:t>Advisors: Dr. </a:t>
-            </a:r>
-            <a:r>
-              <a:rPr lang="en-US" sz="5400" dirty="0" err="1" smtClean="0"/>
-              <a:t>Kostadin</a:t>
-            </a:r>
-            <a:r>
-              <a:rPr lang="en-US" sz="5400" dirty="0" smtClean="0"/>
-              <a:t> </a:t>
-            </a:r>
-            <a:r>
-              <a:rPr lang="en-US" sz="5400" dirty="0" err="1" smtClean="0"/>
-              <a:t>Ivanov</a:t>
-            </a:r>
-            <a:r>
-              <a:rPr lang="en-US" sz="5400" dirty="0" smtClean="0"/>
-              <a:t> &amp; Dr. Maria </a:t>
+              <a:t>Chris Dances and Maria </a:t>
             </a:r>
             <a:r>
               <a:rPr lang="en-US" sz="5400" dirty="0" err="1" smtClean="0"/>
               <a:t>Avramova</a:t>
+            </a:r>
+            <a:r>
+              <a:rPr lang="en-US" sz="5400" dirty="0" smtClean="0"/>
+              <a:t>, Penn State University</a:t>
+            </a:r>
+          </a:p>
+          <a:p>
+            <a:pPr algn="ctr"/>
+            <a:r>
+              <a:rPr lang="en-US" sz="5400" dirty="0" smtClean="0"/>
+              <a:t>Vincent </a:t>
+            </a:r>
+            <a:r>
+              <a:rPr lang="en-US" sz="5400" dirty="0" err="1" smtClean="0"/>
+              <a:t>Mousseau</a:t>
+            </a:r>
+            <a:r>
+              <a:rPr lang="en-US" sz="5400" dirty="0" smtClean="0"/>
+              <a:t>, Sandia National Laboratory</a:t>
             </a:r>
             <a:endParaRPr lang="en-US" sz="5400" dirty="0"/>
           </a:p>
@@ -4322,8 +4318,8 @@
           </a:p>
         </p:txBody>
       </p:sp>
-      <mc:AlternateContent xmlns:mc="http://schemas.openxmlformats.org/markup-compatibility/2006">
-        <mc:Choice xmlns:a14="http://schemas.microsoft.com/office/drawing/2010/main" Requires="a14">
+      <mc:AlternateContent xmlns:mc="http://schemas.openxmlformats.org/markup-compatibility/2006" xmlns:a14="http://schemas.microsoft.com/office/drawing/2010/main">
+        <mc:Choice Requires="a14">
           <p:graphicFrame>
             <p:nvGraphicFramePr>
               <p:cNvPr id="32" name="Table 31"/>
@@ -4875,7 +4871,7 @@
                                     <m:ctrlPr>
                                       <a:rPr lang="en-US" sz="2000" i="1">
                                         <a:effectLst/>
-                                        <a:latin typeface="+mn-lt"/>
+                                        <a:latin typeface="Cambria Math"/>
                                       </a:rPr>
                                     </m:ctrlPr>
                                   </m:sPrePr>
@@ -4884,7 +4880,7 @@
                                     <m:r>
                                       <a:rPr lang="en-US" sz="2000">
                                         <a:effectLst/>
-                                        <a:latin typeface="+mn-lt"/>
+                                        <a:latin typeface="Cambria Math"/>
                                       </a:rPr>
                                       <m:t>∘</m:t>
                                     </m:r>
@@ -4893,7 +4889,7 @@
                                     <m:r>
                                       <a:rPr lang="en-US" sz="2000">
                                         <a:effectLst/>
-                                        <a:latin typeface="+mn-lt"/>
+                                        <a:latin typeface="Cambria Math"/>
                                       </a:rPr>
                                       <m:t>𝐶</m:t>
                                     </m:r>
@@ -6529,7 +6525,7 @@
             </a:graphic>
           </p:graphicFrame>
         </mc:Choice>
-        <mc:Fallback>
+        <mc:Fallback xmlns="">
           <p:graphicFrame>
             <p:nvGraphicFramePr>
               <p:cNvPr id="32" name="Table 31"/>
@@ -8171,40 +8167,8 @@
                 <a:ea typeface="Calibri"/>
                 <a:cs typeface="Times New Roman"/>
               </a:rPr>
-              <a:t>Constant </a:t>
+              <a:t>Constant mass flow rate</a:t>
             </a:r>
-            <a:r>
-              <a:rPr lang="en-US" sz="2600" dirty="0" smtClean="0">
-                <a:ea typeface="Calibri"/>
-                <a:cs typeface="Times New Roman"/>
-              </a:rPr>
-              <a:t>ma</a:t>
-            </a:r>
-            <a:r>
-              <a:rPr lang="en-US" sz="2600" dirty="0" smtClean="0">
-                <a:ea typeface="Calibri"/>
-                <a:cs typeface="Times New Roman"/>
-              </a:rPr>
-              <a:t>ss </a:t>
-            </a:r>
-            <a:r>
-              <a:rPr lang="en-US" sz="2600" dirty="0" smtClean="0">
-                <a:ea typeface="Calibri"/>
-                <a:cs typeface="Times New Roman"/>
-              </a:rPr>
-              <a:t>flow </a:t>
-            </a:r>
-            <a:r>
-              <a:rPr lang="en-US" sz="2600" dirty="0" smtClean="0">
-                <a:ea typeface="Calibri"/>
-                <a:cs typeface="Times New Roman"/>
-              </a:rPr>
-              <a:t>rate</a:t>
-            </a:r>
-            <a:endParaRPr lang="en-US" sz="2600" dirty="0" smtClean="0">
-              <a:ea typeface="Calibri"/>
-              <a:cs typeface="Times New Roman"/>
-            </a:endParaRPr>
           </a:p>
           <a:p>
             <a:pPr marL="457200" marR="0" lvl="0" indent="-457200" algn="just">
@@ -8225,26 +8189,8 @@
                 <a:ea typeface="Calibri"/>
                 <a:cs typeface="Times New Roman"/>
               </a:rPr>
-              <a:t>Constant h</a:t>
+              <a:t>Constant heat generation rate </a:t>
             </a:r>
-            <a:r>
-              <a:rPr lang="en-US" sz="2600" dirty="0" smtClean="0">
-                <a:ea typeface="Calibri"/>
-                <a:cs typeface="Times New Roman"/>
-              </a:rPr>
-              <a:t>eat </a:t>
-            </a:r>
-            <a:r>
-              <a:rPr lang="en-US" sz="2600" dirty="0" smtClean="0">
-                <a:ea typeface="Calibri"/>
-                <a:cs typeface="Times New Roman"/>
-              </a:rPr>
-              <a:t>generation rate </a:t>
-            </a:r>
-            <a:endParaRPr lang="en-US" sz="2600" dirty="0" smtClean="0">
-              <a:ea typeface="Calibri"/>
-              <a:cs typeface="Times New Roman"/>
-            </a:endParaRPr>
           </a:p>
           <a:p>
             <a:pPr marL="457200" marR="0" lvl="0" indent="-457200" algn="just">
@@ -8265,21 +8211,7 @@
                 <a:ea typeface="Calibri"/>
                 <a:cs typeface="Times New Roman"/>
               </a:rPr>
-              <a:t>Constant </a:t>
-            </a:r>
-            <a:r>
-              <a:rPr lang="en-US" sz="2600" dirty="0" smtClean="0">
-                <a:ea typeface="Calibri"/>
-                <a:cs typeface="Times New Roman"/>
-              </a:rPr>
-              <a:t>material </a:t>
-            </a:r>
-            <a:r>
-              <a:rPr lang="en-US" sz="2600" dirty="0" smtClean="0">
-                <a:ea typeface="Calibri"/>
-                <a:cs typeface="Times New Roman"/>
-              </a:rPr>
-              <a:t>properties</a:t>
+              <a:t>Constant material properties</a:t>
             </a:r>
           </a:p>
           <a:p>
@@ -8318,10 +8250,6 @@
               </a:rPr>
               <a:t>liquid advection</a:t>
             </a:r>
-            <a:endParaRPr lang="en-US" sz="2600" dirty="0" smtClean="0">
-              <a:ea typeface="Calibri"/>
-              <a:cs typeface="Times New Roman"/>
-            </a:endParaRPr>
           </a:p>
           <a:p>
             <a:pPr marL="457200" marR="0" lvl="0" indent="-457200" algn="just">
@@ -8342,14 +8270,7 @@
                 <a:ea typeface="Calibri"/>
                 <a:cs typeface="Times New Roman"/>
               </a:rPr>
-              <a:t>Analytical solution for relative rod temperature in solid </a:t>
-            </a:r>
-            <a:r>
-              <a:rPr lang="en-US" sz="2600" dirty="0" smtClean="0">
-                <a:ea typeface="Calibri"/>
-                <a:cs typeface="Times New Roman"/>
-              </a:rPr>
-              <a:t>volume for each radial region</a:t>
+              <a:t>Analytical solution for relative rod temperature in solid volume for each radial region</a:t>
             </a:r>
           </a:p>
         </p:txBody>
@@ -8436,47 +8357,6 @@
           </a:p>
         </p:txBody>
       </p:sp>
-      <p:pic>
-        <p:nvPicPr>
-          <p:cNvPr id="38" name="Picture 2" descr="\\mnelabs02\users\ayp5082\Downloads\psu_blue.png"/>
-          <p:cNvPicPr>
-            <a:picLocks noChangeAspect="1" noChangeArrowheads="1"/>
-          </p:cNvPicPr>
-          <p:nvPr/>
-        </p:nvPicPr>
-        <p:blipFill>
-          <a:blip r:embed="rId2" cstate="print">
-            <a:extLst>
-              <a:ext uri="{28A0092B-C50C-407E-A947-70E740481C1C}">
-                <a14:useLocalDpi xmlns:a14="http://schemas.microsoft.com/office/drawing/2010/main" val="0"/>
-              </a:ext>
-            </a:extLst>
-          </a:blip>
-          <a:srcRect/>
-          <a:stretch>
-            <a:fillRect/>
-          </a:stretch>
-        </p:blipFill>
-        <p:spPr bwMode="auto">
-          <a:xfrm>
-            <a:off x="23347628" y="3429000"/>
-            <a:ext cx="5913172" cy="2643908"/>
-          </a:xfrm>
-          <a:prstGeom prst="rect">
-            <a:avLst/>
-          </a:prstGeom>
-          <a:noFill/>
-          <a:extLst>
-            <a:ext uri="{909E8E84-426E-40DD-AFC4-6F175D3DCCD1}">
-              <a14:hiddenFill xmlns:a14="http://schemas.microsoft.com/office/drawing/2010/main">
-                <a:solidFill>
-                  <a:srgbClr val="FFFFFF"/>
-                </a:solidFill>
-              </a14:hiddenFill>
-            </a:ext>
-          </a:extLst>
-        </p:spPr>
-      </p:pic>
       <p:sp>
         <p:nvSpPr>
           <p:cNvPr id="23" name="Rectangle 22"/>
@@ -8761,11 +8641,11 @@
             <a:pPr algn="ctr" hangingPunct="0"/>
             <a:r>
               <a:rPr lang="en-US" sz="6600" b="1" dirty="0"/>
-              <a:t>CTF RESIDUAL FORMULATION OF SOLID </a:t>
+              <a:t>CTF RESIDUAL FORMULATION OF </a:t>
             </a:r>
             <a:r>
               <a:rPr lang="en-US" sz="6600" b="1" dirty="0" smtClean="0"/>
-              <a:t>LIQUID COUPLING</a:t>
+              <a:t>SOLID LIQUID COUPLING</a:t>
             </a:r>
             <a:r>
               <a:rPr lang="en-US" sz="9600" dirty="0"/>
@@ -9204,8 +9084,8 @@
           </p:sp>
         </mc:Fallback>
       </mc:AlternateContent>
-      <mc:AlternateContent xmlns:mc="http://schemas.openxmlformats.org/markup-compatibility/2006">
-        <mc:Choice xmlns:a14="http://schemas.microsoft.com/office/drawing/2010/main" Requires="a14">
+      <mc:AlternateContent xmlns:mc="http://schemas.openxmlformats.org/markup-compatibility/2006" xmlns:a14="http://schemas.microsoft.com/office/drawing/2010/main">
+        <mc:Choice Requires="a14">
           <p:sp>
             <p:nvSpPr>
               <p:cNvPr id="12" name="Rectangle 11"/>
@@ -9423,7 +9303,7 @@
             </p:txBody>
           </p:sp>
         </mc:Choice>
-        <mc:Fallback>
+        <mc:Fallback xmlns="">
           <p:sp>
             <p:nvSpPr>
               <p:cNvPr id="12" name="Rectangle 11"/>
@@ -9462,8 +9342,8 @@
           </p:sp>
         </mc:Fallback>
       </mc:AlternateContent>
-      <mc:AlternateContent xmlns:mc="http://schemas.openxmlformats.org/markup-compatibility/2006">
-        <mc:Choice xmlns:a14="http://schemas.microsoft.com/office/drawing/2010/main" Requires="a14">
+      <mc:AlternateContent xmlns:mc="http://schemas.openxmlformats.org/markup-compatibility/2006" xmlns:a14="http://schemas.microsoft.com/office/drawing/2010/main">
+        <mc:Choice Requires="a14">
           <p:sp>
             <p:nvSpPr>
               <p:cNvPr id="13" name="Rectangle 12"/>
@@ -9580,7 +9460,7 @@
             </p:txBody>
           </p:sp>
         </mc:Choice>
-        <mc:Fallback>
+        <mc:Fallback xmlns="">
           <p:sp>
             <p:nvSpPr>
               <p:cNvPr id="13" name="Rectangle 12"/>
@@ -9619,8 +9499,8 @@
           </p:sp>
         </mc:Fallback>
       </mc:AlternateContent>
-      <mc:AlternateContent xmlns:mc="http://schemas.openxmlformats.org/markup-compatibility/2006">
-        <mc:Choice xmlns:a14="http://schemas.microsoft.com/office/drawing/2010/main" Requires="a14">
+      <mc:AlternateContent xmlns:mc="http://schemas.openxmlformats.org/markup-compatibility/2006" xmlns:a14="http://schemas.microsoft.com/office/drawing/2010/main">
+        <mc:Choice Requires="a14">
           <p:sp>
             <p:nvSpPr>
               <p:cNvPr id="14" name="Rectangle 13"/>
@@ -9878,7 +9758,7 @@
             </p:txBody>
           </p:sp>
         </mc:Choice>
-        <mc:Fallback>
+        <mc:Fallback xmlns="">
           <p:sp>
             <p:nvSpPr>
               <p:cNvPr id="14" name="Rectangle 13"/>
@@ -10723,8 +10603,8 @@
           </a:ln>
         </p:spPr>
       </p:pic>
-      <mc:AlternateContent xmlns:mc="http://schemas.openxmlformats.org/markup-compatibility/2006">
-        <mc:Choice xmlns:a14="http://schemas.microsoft.com/office/drawing/2010/main" Requires="a14">
+      <mc:AlternateContent xmlns:mc="http://schemas.openxmlformats.org/markup-compatibility/2006" xmlns:a14="http://schemas.microsoft.com/office/drawing/2010/main">
+        <mc:Choice Requires="a14">
           <p:sp>
             <p:nvSpPr>
               <p:cNvPr id="2" name="Rectangle 1"/>
@@ -10916,7 +10796,7 @@
             </p:txBody>
           </p:sp>
         </mc:Choice>
-        <mc:Fallback>
+        <mc:Fallback xmlns="">
           <p:sp>
             <p:nvSpPr>
               <p:cNvPr id="2" name="Rectangle 1"/>
@@ -11099,8 +10979,8 @@
           </a:p>
         </p:txBody>
       </p:sp>
-      <mc:AlternateContent xmlns:mc="http://schemas.openxmlformats.org/markup-compatibility/2006">
-        <mc:Choice xmlns:a14="http://schemas.microsoft.com/office/drawing/2010/main" Requires="a14">
+      <mc:AlternateContent xmlns:mc="http://schemas.openxmlformats.org/markup-compatibility/2006" xmlns:a14="http://schemas.microsoft.com/office/drawing/2010/main">
+        <mc:Choice Requires="a14">
           <p:sp>
             <p:nvSpPr>
               <p:cNvPr id="4" name="Rectangle 3"/>
@@ -11339,7 +11219,7 @@
             </p:txBody>
           </p:sp>
         </mc:Choice>
-        <mc:Fallback>
+        <mc:Fallback xmlns="">
           <p:sp>
             <p:nvSpPr>
               <p:cNvPr id="4" name="Rectangle 3"/>
@@ -11539,15 +11419,7 @@
                   <a:srgbClr val="003399"/>
                 </a:solidFill>
               </a:rPr>
-              <a:t>Analytical </a:t>
-            </a:r>
-            <a:r>
-              <a:rPr lang="en-US" sz="4000" b="1" dirty="0" smtClean="0">
-                <a:solidFill>
-                  <a:srgbClr val="003399"/>
-                </a:solidFill>
-              </a:rPr>
-              <a:t>Result for any Axial Level</a:t>
+              <a:t>Analytical Result for any Axial Level</a:t>
             </a:r>
             <a:endParaRPr lang="en-US" sz="4000" b="1" dirty="0">
               <a:solidFill>
@@ -11557,8 +11429,8 @@
           </a:p>
         </p:txBody>
       </p:sp>
-      <mc:AlternateContent xmlns:mc="http://schemas.openxmlformats.org/markup-compatibility/2006">
-        <mc:Choice xmlns:a14="http://schemas.microsoft.com/office/drawing/2010/main" Requires="a14">
+      <mc:AlternateContent xmlns:mc="http://schemas.openxmlformats.org/markup-compatibility/2006" xmlns:a14="http://schemas.microsoft.com/office/drawing/2010/main">
+        <mc:Choice Requires="a14">
           <p:sp>
             <p:nvSpPr>
               <p:cNvPr id="67" name="TextBox 66"/>
@@ -11897,7 +11769,7 @@
             </p:txBody>
           </p:sp>
         </mc:Choice>
-        <mc:Fallback>
+        <mc:Fallback xmlns="">
           <p:sp>
             <p:nvSpPr>
               <p:cNvPr id="67" name="TextBox 66"/>
@@ -11965,31 +11837,7 @@
                   <a:srgbClr val="003399"/>
                 </a:solidFill>
               </a:rPr>
-              <a:t>2D </a:t>
-            </a:r>
-            <a:r>
-              <a:rPr lang="en-US" sz="4000" b="1" dirty="0" smtClean="0">
-                <a:solidFill>
-                  <a:srgbClr val="003399"/>
-                </a:solidFill>
-              </a:rPr>
-              <a:t>Map of </a:t>
-            </a:r>
-            <a:r>
-              <a:rPr lang="en-US" sz="4000" b="1" dirty="0" smtClean="0">
-                <a:solidFill>
-                  <a:srgbClr val="003399"/>
-                </a:solidFill>
-              </a:rPr>
-              <a:t>Rod </a:t>
-            </a:r>
-            <a:r>
-              <a:rPr lang="en-US" sz="4000" b="1" dirty="0" smtClean="0">
-                <a:solidFill>
-                  <a:srgbClr val="003399"/>
-                </a:solidFill>
-              </a:rPr>
-              <a:t>Temperature</a:t>
+              <a:t>2D Map of Rod Temperature</a:t>
             </a:r>
             <a:endParaRPr lang="en-US" sz="4000" b="1" dirty="0">
               <a:solidFill>
@@ -12106,23 +11954,7 @@
                   <a:srgbClr val="003399"/>
                 </a:solidFill>
               </a:rPr>
-              <a:t>Convergence </a:t>
-            </a:r>
-            <a:r>
-              <a:rPr lang="en-US" sz="4000" b="1" dirty="0" smtClean="0">
-                <a:solidFill>
-                  <a:srgbClr val="003399"/>
-                </a:solidFill>
-              </a:rPr>
-              <a:t>of Error for </a:t>
-            </a:r>
-            <a:r>
-              <a:rPr lang="en-US" sz="4000" b="1" dirty="0" smtClean="0">
-                <a:solidFill>
-                  <a:srgbClr val="003399"/>
-                </a:solidFill>
-              </a:rPr>
-              <a:t>Finite Difference Solution</a:t>
+              <a:t>Convergence of Error for Finite Difference Solution</a:t>
             </a:r>
             <a:endParaRPr lang="en-US" sz="4000" b="1" dirty="0">
               <a:solidFill>

</xml_diff>